<commit_message>
Fixes and added outline
</commit_message>
<xml_diff>
--- a/2019-OracleCodeOne-HOL.pptx
+++ b/2019-OracleCodeOne-HOL.pptx
@@ -433,7 +433,7 @@
               <a:pPr>
                 <a:defRPr/>
               </a:pPr>
-              <a:t>9/5/19</a:t>
+              <a:t>9/6/2019</a:t>
             </a:fld>
             <a:endParaRPr lang="en-US"/>
           </a:p>
@@ -577,7 +577,7 @@
           </a:ln>
           <a:effectLst/>
           <a:extLst>
-            <a:ext uri="{91240B29-F687-4f45-9708-019B960494DF}">
+            <a:ext uri="{91240B29-F687-4F45-9708-019B960494DF}">
               <a14:hiddenLine xmlns:a14="http://schemas.microsoft.com/office/drawing/2010/main" w="9525" cap="flat">
                 <a:solidFill>
                   <a:srgbClr val="808080"/>
@@ -587,7 +587,7 @@
                 <a:tailEnd/>
               </a14:hiddenLine>
             </a:ext>
-            <a:ext uri="{AF507438-7753-43e0-B8FC-AC1667EBCBE1}">
+            <a:ext uri="{AF507438-7753-43E0-B8FC-AC1667EBCBE1}">
               <a14:hiddenEffects xmlns:a14="http://schemas.microsoft.com/office/drawing/2010/main">
                 <a:effectLst>
                   <a:outerShdw blurRad="63500" dist="38099" dir="2700000" algn="ctr" rotWithShape="0">
@@ -637,7 +637,7 @@
           </a:ln>
           <a:effectLst/>
           <a:extLst>
-            <a:ext uri="{91240B29-F687-4f45-9708-019B960494DF}">
+            <a:ext uri="{91240B29-F687-4F45-9708-019B960494DF}">
               <a14:hiddenLine xmlns:a14="http://schemas.microsoft.com/office/drawing/2010/main" w="9525" cap="flat">
                 <a:solidFill>
                   <a:srgbClr val="808080"/>
@@ -647,7 +647,7 @@
                 <a:tailEnd/>
               </a14:hiddenLine>
             </a:ext>
-            <a:ext uri="{AF507438-7753-43e0-B8FC-AC1667EBCBE1}">
+            <a:ext uri="{AF507438-7753-43E0-B8FC-AC1667EBCBE1}">
               <a14:hiddenEffects xmlns:a14="http://schemas.microsoft.com/office/drawing/2010/main">
                 <a:effectLst>
                   <a:outerShdw blurRad="63500" dist="38099" dir="2700000" algn="ctr" rotWithShape="0">
@@ -697,7 +697,7 @@
           </a:ln>
           <a:effectLst/>
           <a:extLst>
-            <a:ext uri="{91240B29-F687-4f45-9708-019B960494DF}">
+            <a:ext uri="{91240B29-F687-4F45-9708-019B960494DF}">
               <a14:hiddenLine xmlns:a14="http://schemas.microsoft.com/office/drawing/2010/main" w="9525" cap="flat">
                 <a:solidFill>
                   <a:srgbClr val="808080"/>
@@ -707,7 +707,7 @@
                 <a:tailEnd/>
               </a14:hiddenLine>
             </a:ext>
-            <a:ext uri="{AF507438-7753-43e0-B8FC-AC1667EBCBE1}">
+            <a:ext uri="{AF507438-7753-43E0-B8FC-AC1667EBCBE1}">
               <a14:hiddenEffects xmlns:a14="http://schemas.microsoft.com/office/drawing/2010/main">
                 <a:effectLst>
                   <a:outerShdw blurRad="63500" dist="38099" dir="2700000" algn="ctr" rotWithShape="0">
@@ -757,7 +757,7 @@
           </a:ln>
           <a:effectLst/>
           <a:extLst>
-            <a:ext uri="{91240B29-F687-4f45-9708-019B960494DF}">
+            <a:ext uri="{91240B29-F687-4F45-9708-019B960494DF}">
               <a14:hiddenLine xmlns:a14="http://schemas.microsoft.com/office/drawing/2010/main" w="9525" cap="flat">
                 <a:solidFill>
                   <a:srgbClr val="808080"/>
@@ -767,7 +767,7 @@
                 <a:tailEnd/>
               </a14:hiddenLine>
             </a:ext>
-            <a:ext uri="{AF507438-7753-43e0-B8FC-AC1667EBCBE1}">
+            <a:ext uri="{AF507438-7753-43E0-B8FC-AC1667EBCBE1}">
               <a14:hiddenEffects xmlns:a14="http://schemas.microsoft.com/office/drawing/2010/main">
                 <a:effectLst>
                   <a:outerShdw blurRad="63500" dist="38099" dir="2700000" algn="ctr" rotWithShape="0">
@@ -815,14 +815,14 @@
           </a:ln>
           <a:effectLst/>
           <a:extLst>
-            <a:ext uri="{909E8E84-426E-40dd-AFC4-6F175D3DCCD1}">
+            <a:ext uri="{909E8E84-426E-40DD-AFC4-6F175D3DCCD1}">
               <a14:hiddenFill xmlns:a14="http://schemas.microsoft.com/office/drawing/2010/main">
                 <a:solidFill>
                   <a:srgbClr val="FFFFFF"/>
                 </a:solidFill>
               </a14:hiddenFill>
             </a:ext>
-            <a:ext uri="{91240B29-F687-4f45-9708-019B960494DF}">
+            <a:ext uri="{91240B29-F687-4F45-9708-019B960494DF}">
               <a14:hiddenLine xmlns:a14="http://schemas.microsoft.com/office/drawing/2010/main" w="9525" cap="flat">
                 <a:solidFill>
                   <a:srgbClr val="808080"/>
@@ -832,7 +832,7 @@
                 <a:tailEnd/>
               </a14:hiddenLine>
             </a:ext>
-            <a:ext uri="{AF507438-7753-43e0-B8FC-AC1667EBCBE1}">
+            <a:ext uri="{AF507438-7753-43E0-B8FC-AC1667EBCBE1}">
               <a14:hiddenEffects xmlns:a14="http://schemas.microsoft.com/office/drawing/2010/main">
                 <a:effectLst>
                   <a:outerShdw blurRad="63500" dist="38099" dir="2700000" algn="ctr" rotWithShape="0">
@@ -844,7 +844,7 @@
               </a14:hiddenEffects>
             </a:ext>
             <a:ext uri="{FAA26D3D-D897-4be2-8F04-BA451C77F1D7}">
-              <ma14:placeholderFlag xmlns:ma14="http://schemas.microsoft.com/office/mac/drawingml/2011/main" val="1"/>
+              <ma14:placeholderFlag xmlns:ma14="http://schemas.microsoft.com/office/mac/drawingml/2011/main" xmlns="" val="1"/>
             </a:ext>
           </a:extLst>
         </p:spPr>
@@ -873,14 +873,14 @@
           </a:ln>
           <a:effectLst/>
           <a:extLst>
-            <a:ext uri="{909E8E84-426E-40dd-AFC4-6F175D3DCCD1}">
+            <a:ext uri="{909E8E84-426E-40DD-AFC4-6F175D3DCCD1}">
               <a14:hiddenFill xmlns:a14="http://schemas.microsoft.com/office/drawing/2010/main">
                 <a:solidFill>
                   <a:srgbClr val="FFFFFF"/>
                 </a:solidFill>
               </a14:hiddenFill>
             </a:ext>
-            <a:ext uri="{91240B29-F687-4f45-9708-019B960494DF}">
+            <a:ext uri="{91240B29-F687-4F45-9708-019B960494DF}">
               <a14:hiddenLine xmlns:a14="http://schemas.microsoft.com/office/drawing/2010/main" w="9525" cap="flat">
                 <a:solidFill>
                   <a:srgbClr val="808080"/>
@@ -890,7 +890,7 @@
                 <a:tailEnd/>
               </a14:hiddenLine>
             </a:ext>
-            <a:ext uri="{AF507438-7753-43e0-B8FC-AC1667EBCBE1}">
+            <a:ext uri="{AF507438-7753-43E0-B8FC-AC1667EBCBE1}">
               <a14:hiddenEffects xmlns:a14="http://schemas.microsoft.com/office/drawing/2010/main">
                 <a:effectLst>
                   <a:outerShdw blurRad="63500" dist="38099" dir="2700000" algn="ctr" rotWithShape="0">
@@ -902,7 +902,7 @@
               </a14:hiddenEffects>
             </a:ext>
             <a:ext uri="{FAA26D3D-D897-4be2-8F04-BA451C77F1D7}">
-              <ma14:placeholderFlag xmlns:ma14="http://schemas.microsoft.com/office/mac/drawingml/2011/main" val="1"/>
+              <ma14:placeholderFlag xmlns:ma14="http://schemas.microsoft.com/office/mac/drawingml/2011/main" xmlns="" val="1"/>
             </a:ext>
           </a:extLst>
         </p:spPr>
@@ -941,14 +941,14 @@
           </a:ln>
           <a:effectLst/>
           <a:extLst>
-            <a:ext uri="{909E8E84-426E-40dd-AFC4-6F175D3DCCD1}">
+            <a:ext uri="{909E8E84-426E-40DD-AFC4-6F175D3DCCD1}">
               <a14:hiddenFill xmlns:a14="http://schemas.microsoft.com/office/drawing/2010/main">
                 <a:solidFill>
                   <a:srgbClr val="FFFFFF"/>
                 </a:solidFill>
               </a14:hiddenFill>
             </a:ext>
-            <a:ext uri="{91240B29-F687-4f45-9708-019B960494DF}">
+            <a:ext uri="{91240B29-F687-4F45-9708-019B960494DF}">
               <a14:hiddenLine xmlns:a14="http://schemas.microsoft.com/office/drawing/2010/main" w="9525" cap="flat">
                 <a:solidFill>
                   <a:srgbClr val="808080"/>
@@ -958,7 +958,7 @@
                 <a:tailEnd/>
               </a14:hiddenLine>
             </a:ext>
-            <a:ext uri="{AF507438-7753-43e0-B8FC-AC1667EBCBE1}">
+            <a:ext uri="{AF507438-7753-43E0-B8FC-AC1667EBCBE1}">
               <a14:hiddenEffects xmlns:a14="http://schemas.microsoft.com/office/drawing/2010/main">
                 <a:effectLst>
                   <a:outerShdw blurRad="63500" dist="38099" dir="2700000" algn="ctr" rotWithShape="0">
@@ -1004,14 +1004,14 @@
           </a:ln>
           <a:effectLst/>
           <a:extLst>
-            <a:ext uri="{909E8E84-426E-40dd-AFC4-6F175D3DCCD1}">
+            <a:ext uri="{909E8E84-426E-40DD-AFC4-6F175D3DCCD1}">
               <a14:hiddenFill xmlns:a14="http://schemas.microsoft.com/office/drawing/2010/main">
                 <a:solidFill>
                   <a:srgbClr val="FFFFFF"/>
                 </a:solidFill>
               </a14:hiddenFill>
             </a:ext>
-            <a:ext uri="{91240B29-F687-4f45-9708-019B960494DF}">
+            <a:ext uri="{91240B29-F687-4F45-9708-019B960494DF}">
               <a14:hiddenLine xmlns:a14="http://schemas.microsoft.com/office/drawing/2010/main" w="9525" cap="flat">
                 <a:solidFill>
                   <a:srgbClr val="808080"/>
@@ -1021,7 +1021,7 @@
                 <a:tailEnd/>
               </a14:hiddenLine>
             </a:ext>
-            <a:ext uri="{AF507438-7753-43e0-B8FC-AC1667EBCBE1}">
+            <a:ext uri="{AF507438-7753-43E0-B8FC-AC1667EBCBE1}">
               <a14:hiddenEffects xmlns:a14="http://schemas.microsoft.com/office/drawing/2010/main">
                 <a:effectLst>
                   <a:outerShdw blurRad="63500" dist="38099" dir="2700000" algn="ctr" rotWithShape="0">
@@ -1067,14 +1067,14 @@
           </a:ln>
           <a:effectLst/>
           <a:extLst>
-            <a:ext uri="{909E8E84-426E-40dd-AFC4-6F175D3DCCD1}">
+            <a:ext uri="{909E8E84-426E-40DD-AFC4-6F175D3DCCD1}">
               <a14:hiddenFill xmlns:a14="http://schemas.microsoft.com/office/drawing/2010/main">
                 <a:solidFill>
                   <a:srgbClr val="FFFFFF"/>
                 </a:solidFill>
               </a14:hiddenFill>
             </a:ext>
-            <a:ext uri="{91240B29-F687-4f45-9708-019B960494DF}">
+            <a:ext uri="{91240B29-F687-4F45-9708-019B960494DF}">
               <a14:hiddenLine xmlns:a14="http://schemas.microsoft.com/office/drawing/2010/main" w="9525" cap="flat">
                 <a:solidFill>
                   <a:srgbClr val="808080"/>
@@ -1084,7 +1084,7 @@
                 <a:tailEnd/>
               </a14:hiddenLine>
             </a:ext>
-            <a:ext uri="{AF507438-7753-43e0-B8FC-AC1667EBCBE1}">
+            <a:ext uri="{AF507438-7753-43E0-B8FC-AC1667EBCBE1}">
               <a14:hiddenEffects xmlns:a14="http://schemas.microsoft.com/office/drawing/2010/main">
                 <a:effectLst>
                   <a:outerShdw blurRad="63500" dist="38099" dir="2700000" algn="ctr" rotWithShape="0">
@@ -1132,14 +1132,14 @@
           </a:ln>
           <a:effectLst/>
           <a:extLst>
-            <a:ext uri="{909E8E84-426E-40dd-AFC4-6F175D3DCCD1}">
+            <a:ext uri="{909E8E84-426E-40DD-AFC4-6F175D3DCCD1}">
               <a14:hiddenFill xmlns:a14="http://schemas.microsoft.com/office/drawing/2010/main">
                 <a:solidFill>
                   <a:srgbClr val="FFFFFF"/>
                 </a:solidFill>
               </a14:hiddenFill>
             </a:ext>
-            <a:ext uri="{91240B29-F687-4f45-9708-019B960494DF}">
+            <a:ext uri="{91240B29-F687-4F45-9708-019B960494DF}">
               <a14:hiddenLine xmlns:a14="http://schemas.microsoft.com/office/drawing/2010/main" w="9525" cap="flat">
                 <a:solidFill>
                   <a:srgbClr val="808080"/>
@@ -1149,7 +1149,7 @@
                 <a:tailEnd/>
               </a14:hiddenLine>
             </a:ext>
-            <a:ext uri="{AF507438-7753-43e0-B8FC-AC1667EBCBE1}">
+            <a:ext uri="{AF507438-7753-43E0-B8FC-AC1667EBCBE1}">
               <a14:hiddenEffects xmlns:a14="http://schemas.microsoft.com/office/drawing/2010/main">
                 <a:effectLst>
                   <a:outerShdw blurRad="63500" dist="38099" dir="2700000" algn="ctr" rotWithShape="0">
@@ -1161,7 +1161,7 @@
               </a14:hiddenEffects>
             </a:ext>
             <a:ext uri="{FAA26D3D-D897-4be2-8F04-BA451C77F1D7}">
-              <ma14:placeholderFlag xmlns:ma14="http://schemas.microsoft.com/office/mac/drawingml/2011/main" val="1"/>
+              <ma14:placeholderFlag xmlns:ma14="http://schemas.microsoft.com/office/mac/drawingml/2011/main" xmlns="" val="1"/>
             </a:ext>
           </a:extLst>
         </p:spPr>
@@ -2418,11 +2418,7 @@
           <a:p>
             <a:r>
               <a:rPr lang="en-US" dirty="0" smtClean="0"/>
-              <a:t>A</a:t>
-            </a:r>
-            <a:r>
-              <a:rPr lang="en-US" dirty="0" smtClean="0"/>
-              <a:t>,B,C</a:t>
+              <a:t>A,B,C</a:t>
             </a:r>
             <a:endParaRPr lang="en-US" dirty="0"/>
           </a:p>
@@ -7981,14 +7977,14 @@
           </a:ln>
           <a:effectLst/>
           <a:extLst>
-            <a:ext uri="{909E8E84-426E-40dd-AFC4-6F175D3DCCD1}">
+            <a:ext uri="{909E8E84-426E-40DD-AFC4-6F175D3DCCD1}">
               <a14:hiddenFill xmlns:a14="http://schemas.microsoft.com/office/drawing/2010/main">
                 <a:solidFill>
                   <a:srgbClr val="FFFFFF"/>
                 </a:solidFill>
               </a14:hiddenFill>
             </a:ext>
-            <a:ext uri="{91240B29-F687-4f45-9708-019B960494DF}">
+            <a:ext uri="{91240B29-F687-4F45-9708-019B960494DF}">
               <a14:hiddenLine xmlns:a14="http://schemas.microsoft.com/office/drawing/2010/main" w="9525" cap="flat">
                 <a:solidFill>
                   <a:srgbClr val="808080"/>
@@ -7998,7 +7994,7 @@
                 <a:tailEnd/>
               </a14:hiddenLine>
             </a:ext>
-            <a:ext uri="{AF507438-7753-43e0-B8FC-AC1667EBCBE1}">
+            <a:ext uri="{AF507438-7753-43E0-B8FC-AC1667EBCBE1}">
               <a14:hiddenEffects xmlns:a14="http://schemas.microsoft.com/office/drawing/2010/main">
                 <a:effectLst>
                   <a:outerShdw blurRad="63500" dist="38099" dir="2700000" algn="ctr" rotWithShape="0">
@@ -8010,7 +8006,7 @@
               </a14:hiddenEffects>
             </a:ext>
             <a:ext uri="{FAA26D3D-D897-4be2-8F04-BA451C77F1D7}">
-              <ma14:placeholderFlag xmlns:ma14="http://schemas.microsoft.com/office/mac/drawingml/2011/main" val="1"/>
+              <ma14:placeholderFlag xmlns:ma14="http://schemas.microsoft.com/office/mac/drawingml/2011/main" xmlns="" val="1"/>
             </a:ext>
           </a:extLst>
         </p:spPr>
@@ -8054,14 +8050,14 @@
           </a:ln>
           <a:effectLst/>
           <a:extLst>
-            <a:ext uri="{909E8E84-426E-40dd-AFC4-6F175D3DCCD1}">
+            <a:ext uri="{909E8E84-426E-40DD-AFC4-6F175D3DCCD1}">
               <a14:hiddenFill xmlns:a14="http://schemas.microsoft.com/office/drawing/2010/main">
                 <a:solidFill>
                   <a:srgbClr val="FFFFFF"/>
                 </a:solidFill>
               </a14:hiddenFill>
             </a:ext>
-            <a:ext uri="{91240B29-F687-4f45-9708-019B960494DF}">
+            <a:ext uri="{91240B29-F687-4F45-9708-019B960494DF}">
               <a14:hiddenLine xmlns:a14="http://schemas.microsoft.com/office/drawing/2010/main" w="9525" cap="flat">
                 <a:solidFill>
                   <a:srgbClr val="808080"/>
@@ -8071,7 +8067,7 @@
                 <a:tailEnd/>
               </a14:hiddenLine>
             </a:ext>
-            <a:ext uri="{AF507438-7753-43e0-B8FC-AC1667EBCBE1}">
+            <a:ext uri="{AF507438-7753-43E0-B8FC-AC1667EBCBE1}">
               <a14:hiddenEffects xmlns:a14="http://schemas.microsoft.com/office/drawing/2010/main">
                 <a:effectLst>
                   <a:outerShdw blurRad="63500" dist="38099" dir="2700000" algn="ctr" rotWithShape="0">
@@ -8083,7 +8079,7 @@
               </a14:hiddenEffects>
             </a:ext>
             <a:ext uri="{FAA26D3D-D897-4be2-8F04-BA451C77F1D7}">
-              <ma14:placeholderFlag xmlns:ma14="http://schemas.microsoft.com/office/mac/drawingml/2011/main" val="1"/>
+              <ma14:placeholderFlag xmlns:ma14="http://schemas.microsoft.com/office/mac/drawingml/2011/main" xmlns="" val="1"/>
             </a:ext>
           </a:extLst>
         </p:spPr>
@@ -8181,14 +8177,14 @@
           </a:ln>
           <a:effectLst/>
           <a:extLst>
-            <a:ext uri="{909E8E84-426E-40dd-AFC4-6F175D3DCCD1}">
+            <a:ext uri="{909E8E84-426E-40DD-AFC4-6F175D3DCCD1}">
               <a14:hiddenFill xmlns:a14="http://schemas.microsoft.com/office/drawing/2010/main">
                 <a:solidFill>
                   <a:srgbClr val="FFFFFF"/>
                 </a:solidFill>
               </a14:hiddenFill>
             </a:ext>
-            <a:ext uri="{91240B29-F687-4f45-9708-019B960494DF}">
+            <a:ext uri="{91240B29-F687-4F45-9708-019B960494DF}">
               <a14:hiddenLine xmlns:a14="http://schemas.microsoft.com/office/drawing/2010/main" w="9525" cap="flat">
                 <a:solidFill>
                   <a:srgbClr val="808080"/>
@@ -8198,7 +8194,7 @@
                 <a:tailEnd/>
               </a14:hiddenLine>
             </a:ext>
-            <a:ext uri="{AF507438-7753-43e0-B8FC-AC1667EBCBE1}">
+            <a:ext uri="{AF507438-7753-43E0-B8FC-AC1667EBCBE1}">
               <a14:hiddenEffects xmlns:a14="http://schemas.microsoft.com/office/drawing/2010/main">
                 <a:effectLst>
                   <a:outerShdw blurRad="63500" dist="38099" dir="2700000" algn="ctr" rotWithShape="0">
@@ -8244,14 +8240,14 @@
           </a:ln>
           <a:effectLst/>
           <a:extLst>
-            <a:ext uri="{909E8E84-426E-40dd-AFC4-6F175D3DCCD1}">
+            <a:ext uri="{909E8E84-426E-40DD-AFC4-6F175D3DCCD1}">
               <a14:hiddenFill xmlns:a14="http://schemas.microsoft.com/office/drawing/2010/main">
                 <a:solidFill>
                   <a:srgbClr val="FFFFFF"/>
                 </a:solidFill>
               </a14:hiddenFill>
             </a:ext>
-            <a:ext uri="{91240B29-F687-4f45-9708-019B960494DF}">
+            <a:ext uri="{91240B29-F687-4F45-9708-019B960494DF}">
               <a14:hiddenLine xmlns:a14="http://schemas.microsoft.com/office/drawing/2010/main" w="9525" cap="flat">
                 <a:solidFill>
                   <a:srgbClr val="808080"/>
@@ -8261,7 +8257,7 @@
                 <a:tailEnd/>
               </a14:hiddenLine>
             </a:ext>
-            <a:ext uri="{AF507438-7753-43e0-B8FC-AC1667EBCBE1}">
+            <a:ext uri="{AF507438-7753-43E0-B8FC-AC1667EBCBE1}">
               <a14:hiddenEffects xmlns:a14="http://schemas.microsoft.com/office/drawing/2010/main">
                 <a:effectLst>
                   <a:outerShdw blurRad="63500" dist="38099" dir="2700000" algn="ctr" rotWithShape="0">
@@ -8309,14 +8305,14 @@
           </a:ln>
           <a:effectLst/>
           <a:extLst>
-            <a:ext uri="{909E8E84-426E-40dd-AFC4-6F175D3DCCD1}">
+            <a:ext uri="{909E8E84-426E-40DD-AFC4-6F175D3DCCD1}">
               <a14:hiddenFill xmlns:a14="http://schemas.microsoft.com/office/drawing/2010/main">
                 <a:solidFill>
                   <a:srgbClr val="FFFFFF"/>
                 </a:solidFill>
               </a14:hiddenFill>
             </a:ext>
-            <a:ext uri="{91240B29-F687-4f45-9708-019B960494DF}">
+            <a:ext uri="{91240B29-F687-4F45-9708-019B960494DF}">
               <a14:hiddenLine xmlns:a14="http://schemas.microsoft.com/office/drawing/2010/main" w="9525" cap="flat">
                 <a:solidFill>
                   <a:srgbClr val="808080"/>
@@ -8326,7 +8322,7 @@
                 <a:tailEnd/>
               </a14:hiddenLine>
             </a:ext>
-            <a:ext uri="{AF507438-7753-43e0-B8FC-AC1667EBCBE1}">
+            <a:ext uri="{AF507438-7753-43E0-B8FC-AC1667EBCBE1}">
               <a14:hiddenEffects xmlns:a14="http://schemas.microsoft.com/office/drawing/2010/main">
                 <a:effectLst>
                   <a:outerShdw blurRad="63500" dist="38099" dir="2700000" algn="ctr" rotWithShape="0">
@@ -8338,7 +8334,7 @@
               </a14:hiddenEffects>
             </a:ext>
             <a:ext uri="{FAA26D3D-D897-4be2-8F04-BA451C77F1D7}">
-              <ma14:placeholderFlag xmlns:ma14="http://schemas.microsoft.com/office/mac/drawingml/2011/main" val="1"/>
+              <ma14:placeholderFlag xmlns:ma14="http://schemas.microsoft.com/office/mac/drawingml/2011/main" xmlns="" val="1"/>
             </a:ext>
           </a:extLst>
         </p:spPr>
@@ -8407,7 +8403,7 @@
           <a:effectLst/>
           <a:extLst>
             <a:ext uri="{FAA26D3D-D897-4be2-8F04-BA451C77F1D7}">
-              <ma14:placeholderFlag xmlns:ma14="http://schemas.microsoft.com/office/mac/drawingml/2011/main" val="1"/>
+              <ma14:placeholderFlag xmlns:ma14="http://schemas.microsoft.com/office/mac/drawingml/2011/main" xmlns="" val="1"/>
             </a:ext>
           </a:extLst>
         </p:spPr>
@@ -9311,14 +9307,14 @@
           </a:ln>
           <a:effectLst/>
           <a:extLst>
-            <a:ext uri="{909E8E84-426E-40dd-AFC4-6F175D3DCCD1}">
+            <a:ext uri="{909E8E84-426E-40DD-AFC4-6F175D3DCCD1}">
               <a14:hiddenFill xmlns:a14="http://schemas.microsoft.com/office/drawing/2010/main">
                 <a:solidFill>
                   <a:srgbClr val="FFFFFF"/>
                 </a:solidFill>
               </a14:hiddenFill>
             </a:ext>
-            <a:ext uri="{91240B29-F687-4f45-9708-019B960494DF}">
+            <a:ext uri="{91240B29-F687-4F45-9708-019B960494DF}">
               <a14:hiddenLine xmlns:a14="http://schemas.microsoft.com/office/drawing/2010/main" w="9525" cap="flat">
                 <a:solidFill>
                   <a:srgbClr val="808080"/>
@@ -9328,7 +9324,7 @@
                 <a:tailEnd/>
               </a14:hiddenLine>
             </a:ext>
-            <a:ext uri="{AF507438-7753-43e0-B8FC-AC1667EBCBE1}">
+            <a:ext uri="{AF507438-7753-43E0-B8FC-AC1667EBCBE1}">
               <a14:hiddenEffects xmlns:a14="http://schemas.microsoft.com/office/drawing/2010/main">
                 <a:effectLst>
                   <a:outerShdw blurRad="63500" dist="38099" dir="2700000" algn="ctr" rotWithShape="0">
@@ -9340,7 +9336,7 @@
               </a14:hiddenEffects>
             </a:ext>
             <a:ext uri="{FAA26D3D-D897-4be2-8F04-BA451C77F1D7}">
-              <ma14:placeholderFlag xmlns:ma14="http://schemas.microsoft.com/office/mac/drawingml/2011/main" val="1"/>
+              <ma14:placeholderFlag xmlns:ma14="http://schemas.microsoft.com/office/mac/drawingml/2011/main" xmlns="" val="1"/>
             </a:ext>
           </a:extLst>
         </p:spPr>
@@ -9624,7 +9620,7 @@
   <p:timing>
     <p:tnLst>
       <p:par>
-        <p:cTn xmlns:p14="http://schemas.microsoft.com/office/powerpoint/2010/main" id="1" dur="indefinite" restart="never" nodeType="tmRoot"/>
+        <p:cTn id="1" dur="indefinite" restart="never" nodeType="tmRoot"/>
       </p:par>
     </p:tnLst>
   </p:timing>
@@ -9731,7 +9727,7 @@
           </a:prstGeom>
           <a:noFill/>
           <a:extLst>
-            <a:ext uri="{909E8E84-426E-40dd-AFC4-6F175D3DCCD1}">
+            <a:ext uri="{909E8E84-426E-40DD-AFC4-6F175D3DCCD1}">
               <a14:hiddenFill xmlns:a14="http://schemas.microsoft.com/office/drawing/2010/main">
                 <a:solidFill>
                   <a:srgbClr val="FFFFFF"/>
@@ -9754,7 +9750,7 @@
   <p:timing>
     <p:tnLst>
       <p:par>
-        <p:cTn xmlns:p14="http://schemas.microsoft.com/office/powerpoint/2010/main" id="1" dur="indefinite" restart="never" nodeType="tmRoot"/>
+        <p:cTn id="1" dur="indefinite" restart="never" nodeType="tmRoot"/>
       </p:par>
     </p:tnLst>
   </p:timing>
@@ -10598,7 +10594,7 @@
         </p:nvGraphicFramePr>
         <p:xfrm>
           <a:off x="838200" y="1276350"/>
-          <a:ext cx="7504114" cy="2926079"/>
+          <a:ext cx="7504114" cy="2926080"/>
         </p:xfrm>
         <a:graphic>
           <a:graphicData uri="http://schemas.openxmlformats.org/drawingml/2006/table">
@@ -10818,7 +10814,7 @@
           <a:p>
             <a:r>
               <a:rPr lang="en-US" dirty="0" smtClean="0"/>
-              <a:t>Modules</a:t>
+              <a:t>II. Modules</a:t>
             </a:r>
             <a:endParaRPr lang="en-US" dirty="0"/>
           </a:p>
@@ -10890,7 +10886,7 @@
   <p:timing>
     <p:tnLst>
       <p:par>
-        <p:cTn xmlns:p14="http://schemas.microsoft.com/office/powerpoint/2010/main" id="1" dur="indefinite" restart="never" nodeType="tmRoot"/>
+        <p:cTn id="1" dur="indefinite" restart="never" nodeType="tmRoot"/>
       </p:par>
     </p:tnLst>
   </p:timing>
@@ -10994,7 +10990,7 @@
           </a:ln>
           <a:effectLst/>
           <a:extLst>
-            <a:ext uri="{AF507438-7753-43e0-B8FC-AC1667EBCBE1}">
+            <a:ext uri="{AF507438-7753-43E0-B8FC-AC1667EBCBE1}">
               <a14:hiddenEffects xmlns:a14="http://schemas.microsoft.com/office/drawing/2010/main">
                 <a:effectLst>
                   <a:outerShdw blurRad="63500" dist="38099" dir="2700000" algn="ctr" rotWithShape="0">
@@ -11510,7 +11506,7 @@
           </a:ln>
           <a:effectLst/>
           <a:extLst>
-            <a:ext uri="{AF507438-7753-43e0-B8FC-AC1667EBCBE1}">
+            <a:ext uri="{AF507438-7753-43E0-B8FC-AC1667EBCBE1}">
               <a14:hiddenEffects xmlns:a14="http://schemas.microsoft.com/office/drawing/2010/main">
                 <a:effectLst>
                   <a:outerShdw blurRad="63500" dist="38099" dir="2700000" algn="ctr" rotWithShape="0">
@@ -11537,7 +11533,7 @@
   <p:timing>
     <p:tnLst>
       <p:par>
-        <p:cTn xmlns:p14="http://schemas.microsoft.com/office/powerpoint/2010/main" id="1" dur="indefinite" restart="never" nodeType="tmRoot"/>
+        <p:cTn id="1" dur="indefinite" restart="never" nodeType="tmRoot"/>
       </p:par>
     </p:tnLst>
   </p:timing>
@@ -11713,7 +11709,7 @@
   <p:timing>
     <p:tnLst>
       <p:par>
-        <p:cTn xmlns:p14="http://schemas.microsoft.com/office/powerpoint/2010/main" id="1" dur="indefinite" restart="never" nodeType="tmRoot"/>
+        <p:cTn id="1" dur="indefinite" restart="never" nodeType="tmRoot"/>
       </p:par>
     </p:tnLst>
   </p:timing>
@@ -12047,7 +12043,7 @@
   <p:timing>
     <p:tnLst>
       <p:par>
-        <p:cTn xmlns:p14="http://schemas.microsoft.com/office/powerpoint/2010/main" id="1" dur="indefinite" restart="never" nodeType="tmRoot"/>
+        <p:cTn id="1" dur="indefinite" restart="never" nodeType="tmRoot"/>
       </p:par>
     </p:tnLst>
   </p:timing>
@@ -12207,7 +12203,7 @@
   <p:timing>
     <p:tnLst>
       <p:par>
-        <p:cTn xmlns:p14="http://schemas.microsoft.com/office/powerpoint/2010/main" id="1" dur="indefinite" restart="never" nodeType="tmRoot"/>
+        <p:cTn id="1" dur="indefinite" restart="never" nodeType="tmRoot"/>
       </p:par>
     </p:tnLst>
   </p:timing>
@@ -12536,7 +12532,7 @@
   <p:timing>
     <p:tnLst>
       <p:par>
-        <p:cTn xmlns:p14="http://schemas.microsoft.com/office/powerpoint/2010/main" id="1" dur="indefinite" restart="never" nodeType="tmRoot"/>
+        <p:cTn id="1" dur="indefinite" restart="never" nodeType="tmRoot"/>
       </p:par>
     </p:tnLst>
   </p:timing>
@@ -12668,7 +12664,7 @@
   <p:timing>
     <p:tnLst>
       <p:par>
-        <p:cTn xmlns:p14="http://schemas.microsoft.com/office/powerpoint/2010/main" id="1" dur="indefinite" restart="never" nodeType="tmRoot"/>
+        <p:cTn id="1" dur="indefinite" restart="never" nodeType="tmRoot"/>
       </p:par>
     </p:tnLst>
   </p:timing>
@@ -12823,7 +12819,7 @@
   <p:timing>
     <p:tnLst>
       <p:par>
-        <p:cTn xmlns:p14="http://schemas.microsoft.com/office/powerpoint/2010/main" id="1" dur="indefinite" restart="never" nodeType="tmRoot"/>
+        <p:cTn id="1" dur="indefinite" restart="never" nodeType="tmRoot"/>
       </p:par>
     </p:tnLst>
   </p:timing>
@@ -12900,8 +12896,25 @@
           <a:p>
             <a:r>
               <a:rPr lang="en-US" dirty="0" smtClean="0"/>
-              <a:t>Which module command allows callers to access a package?</a:t>
-            </a:r>
+              <a:t>Given a module, which command </a:t>
+            </a:r>
+            <a:r>
+              <a:rPr lang="en-US" dirty="0" smtClean="0"/>
+              <a:t>allows </a:t>
+            </a:r>
+            <a:r>
+              <a:rPr lang="en-US" dirty="0" smtClean="0"/>
+              <a:t>other modules to </a:t>
+            </a:r>
+            <a:r>
+              <a:rPr lang="en-US" dirty="0" smtClean="0"/>
+              <a:t>access a </a:t>
+            </a:r>
+            <a:r>
+              <a:rPr lang="en-US" dirty="0" smtClean="0"/>
+              <a:t>package it defines?</a:t>
+            </a:r>
+            <a:endParaRPr lang="en-US" dirty="0" smtClean="0"/>
           </a:p>
           <a:p>
             <a:pPr marL="514100" indent="-514100">
@@ -13028,14 +13041,14 @@
           </a:ln>
           <a:effectLst/>
           <a:extLst>
-            <a:ext uri="{909E8E84-426E-40dd-AFC4-6F175D3DCCD1}">
+            <a:ext uri="{909E8E84-426E-40DD-AFC4-6F175D3DCCD1}">
               <a14:hiddenFill xmlns:a14="http://schemas.microsoft.com/office/drawing/2010/main">
                 <a:solidFill>
                   <a:srgbClr val="FFFFFF"/>
                 </a:solidFill>
               </a14:hiddenFill>
             </a:ext>
-            <a:ext uri="{91240B29-F687-4f45-9708-019B960494DF}">
+            <a:ext uri="{91240B29-F687-4F45-9708-019B960494DF}">
               <a14:hiddenLine xmlns:a14="http://schemas.microsoft.com/office/drawing/2010/main" w="9525" cap="flat">
                 <a:solidFill>
                   <a:srgbClr val="808080"/>
@@ -13045,7 +13058,7 @@
                 <a:tailEnd/>
               </a14:hiddenLine>
             </a:ext>
-            <a:ext uri="{AF507438-7753-43e0-B8FC-AC1667EBCBE1}">
+            <a:ext uri="{AF507438-7753-43E0-B8FC-AC1667EBCBE1}">
               <a14:hiddenEffects xmlns:a14="http://schemas.microsoft.com/office/drawing/2010/main">
                 <a:effectLst>
                   <a:outerShdw blurRad="63500" dist="38099" dir="2700000" algn="ctr" rotWithShape="0">
@@ -13057,7 +13070,7 @@
               </a14:hiddenEffects>
             </a:ext>
             <a:ext uri="{FAA26D3D-D897-4be2-8F04-BA451C77F1D7}">
-              <ma14:placeholderFlag xmlns:ma14="http://schemas.microsoft.com/office/mac/drawingml/2011/main" val="1"/>
+              <ma14:placeholderFlag xmlns:ma14="http://schemas.microsoft.com/office/mac/drawingml/2011/main" xmlns="" val="1"/>
             </a:ext>
           </a:extLst>
         </p:spPr>
@@ -13307,7 +13320,7 @@
   <p:timing>
     <p:tnLst>
       <p:par>
-        <p:cTn xmlns:p14="http://schemas.microsoft.com/office/powerpoint/2010/main" id="1" dur="indefinite" restart="never" nodeType="tmRoot"/>
+        <p:cTn id="1" dur="indefinite" restart="never" nodeType="tmRoot"/>
       </p:par>
     </p:tnLst>
   </p:timing>
@@ -13509,14 +13522,14 @@
           </a:ln>
           <a:effectLst/>
           <a:extLst>
-            <a:ext uri="{909E8E84-426E-40dd-AFC4-6F175D3DCCD1}">
+            <a:ext uri="{909E8E84-426E-40DD-AFC4-6F175D3DCCD1}">
               <a14:hiddenFill xmlns:a14="http://schemas.microsoft.com/office/drawing/2010/main">
                 <a:solidFill>
                   <a:srgbClr val="FFFFFF"/>
                 </a:solidFill>
               </a14:hiddenFill>
             </a:ext>
-            <a:ext uri="{91240B29-F687-4f45-9708-019B960494DF}">
+            <a:ext uri="{91240B29-F687-4F45-9708-019B960494DF}">
               <a14:hiddenLine xmlns:a14="http://schemas.microsoft.com/office/drawing/2010/main" w="9525" cap="flat">
                 <a:solidFill>
                   <a:srgbClr val="808080"/>
@@ -13526,7 +13539,7 @@
                 <a:tailEnd/>
               </a14:hiddenLine>
             </a:ext>
-            <a:ext uri="{AF507438-7753-43e0-B8FC-AC1667EBCBE1}">
+            <a:ext uri="{AF507438-7753-43E0-B8FC-AC1667EBCBE1}">
               <a14:hiddenEffects xmlns:a14="http://schemas.microsoft.com/office/drawing/2010/main">
                 <a:effectLst>
                   <a:outerShdw blurRad="63500" dist="38099" dir="2700000" algn="ctr" rotWithShape="0">
@@ -13538,7 +13551,7 @@
               </a14:hiddenEffects>
             </a:ext>
             <a:ext uri="{FAA26D3D-D897-4be2-8F04-BA451C77F1D7}">
-              <ma14:placeholderFlag xmlns:ma14="http://schemas.microsoft.com/office/mac/drawingml/2011/main" val="1"/>
+              <ma14:placeholderFlag xmlns:ma14="http://schemas.microsoft.com/office/mac/drawingml/2011/main" xmlns="" val="1"/>
             </a:ext>
           </a:extLst>
         </p:spPr>
@@ -13788,7 +13801,7 @@
   <p:timing>
     <p:tnLst>
       <p:par>
-        <p:cTn xmlns:p14="http://schemas.microsoft.com/office/powerpoint/2010/main" id="1" dur="indefinite" restart="never" nodeType="tmRoot"/>
+        <p:cTn id="1" dur="indefinite" restart="never" nodeType="tmRoot"/>
       </p:par>
     </p:tnLst>
   </p:timing>
@@ -13993,14 +14006,14 @@
           </a:ln>
           <a:effectLst/>
           <a:extLst>
-            <a:ext uri="{909E8E84-426E-40dd-AFC4-6F175D3DCCD1}">
+            <a:ext uri="{909E8E84-426E-40DD-AFC4-6F175D3DCCD1}">
               <a14:hiddenFill xmlns:a14="http://schemas.microsoft.com/office/drawing/2010/main">
                 <a:solidFill>
                   <a:srgbClr val="FFFFFF"/>
                 </a:solidFill>
               </a14:hiddenFill>
             </a:ext>
-            <a:ext uri="{91240B29-F687-4f45-9708-019B960494DF}">
+            <a:ext uri="{91240B29-F687-4F45-9708-019B960494DF}">
               <a14:hiddenLine xmlns:a14="http://schemas.microsoft.com/office/drawing/2010/main" w="9525" cap="flat">
                 <a:solidFill>
                   <a:srgbClr val="808080"/>
@@ -14010,7 +14023,7 @@
                 <a:tailEnd/>
               </a14:hiddenLine>
             </a:ext>
-            <a:ext uri="{AF507438-7753-43e0-B8FC-AC1667EBCBE1}">
+            <a:ext uri="{AF507438-7753-43E0-B8FC-AC1667EBCBE1}">
               <a14:hiddenEffects xmlns:a14="http://schemas.microsoft.com/office/drawing/2010/main">
                 <a:effectLst>
                   <a:outerShdw blurRad="63500" dist="38099" dir="2700000" algn="ctr" rotWithShape="0">
@@ -14022,7 +14035,7 @@
               </a14:hiddenEffects>
             </a:ext>
             <a:ext uri="{FAA26D3D-D897-4be2-8F04-BA451C77F1D7}">
-              <ma14:placeholderFlag xmlns:ma14="http://schemas.microsoft.com/office/mac/drawingml/2011/main" val="1"/>
+              <ma14:placeholderFlag xmlns:ma14="http://schemas.microsoft.com/office/mac/drawingml/2011/main" xmlns="" val="1"/>
             </a:ext>
           </a:extLst>
         </p:spPr>
@@ -14272,7 +14285,7 @@
   <p:timing>
     <p:tnLst>
       <p:par>
-        <p:cTn xmlns:p14="http://schemas.microsoft.com/office/powerpoint/2010/main" id="1" dur="indefinite" restart="never" nodeType="tmRoot"/>
+        <p:cTn id="1" dur="indefinite" restart="never" nodeType="tmRoot"/>
       </p:par>
     </p:tnLst>
   </p:timing>
@@ -14346,15 +14359,7 @@
           <a:p>
             <a:r>
               <a:rPr lang="en-US" dirty="0" smtClean="0"/>
-              <a:t>Which are true of the </a:t>
-            </a:r>
-            <a:r>
-              <a:rPr lang="en-US" dirty="0" smtClean="0"/>
-              <a:t>module-info</a:t>
-            </a:r>
-            <a:r>
-              <a:rPr lang="en-US" dirty="0" smtClean="0"/>
-              <a:t>?</a:t>
+              <a:t>Which are true of the module-info?</a:t>
             </a:r>
           </a:p>
           <a:p>
@@ -14478,14 +14483,14 @@
           </a:ln>
           <a:effectLst/>
           <a:extLst>
-            <a:ext uri="{909E8E84-426E-40dd-AFC4-6F175D3DCCD1}">
+            <a:ext uri="{909E8E84-426E-40DD-AFC4-6F175D3DCCD1}">
               <a14:hiddenFill xmlns:a14="http://schemas.microsoft.com/office/drawing/2010/main">
                 <a:solidFill>
                   <a:srgbClr val="FFFFFF"/>
                 </a:solidFill>
               </a14:hiddenFill>
             </a:ext>
-            <a:ext uri="{91240B29-F687-4f45-9708-019B960494DF}">
+            <a:ext uri="{91240B29-F687-4F45-9708-019B960494DF}">
               <a14:hiddenLine xmlns:a14="http://schemas.microsoft.com/office/drawing/2010/main" w="9525" cap="flat">
                 <a:solidFill>
                   <a:srgbClr val="808080"/>
@@ -14495,7 +14500,7 @@
                 <a:tailEnd/>
               </a14:hiddenLine>
             </a:ext>
-            <a:ext uri="{AF507438-7753-43e0-B8FC-AC1667EBCBE1}">
+            <a:ext uri="{AF507438-7753-43E0-B8FC-AC1667EBCBE1}">
               <a14:hiddenEffects xmlns:a14="http://schemas.microsoft.com/office/drawing/2010/main">
                 <a:effectLst>
                   <a:outerShdw blurRad="63500" dist="38099" dir="2700000" algn="ctr" rotWithShape="0">
@@ -14507,7 +14512,7 @@
               </a14:hiddenEffects>
             </a:ext>
             <a:ext uri="{FAA26D3D-D897-4be2-8F04-BA451C77F1D7}">
-              <ma14:placeholderFlag xmlns:ma14="http://schemas.microsoft.com/office/mac/drawingml/2011/main" val="1"/>
+              <ma14:placeholderFlag xmlns:ma14="http://schemas.microsoft.com/office/mac/drawingml/2011/main" xmlns="" val="1"/>
             </a:ext>
           </a:extLst>
         </p:spPr>
@@ -14757,7 +14762,7 @@
   <p:timing>
     <p:tnLst>
       <p:par>
-        <p:cTn xmlns:p14="http://schemas.microsoft.com/office/powerpoint/2010/main" id="1" dur="indefinite" restart="never" nodeType="tmRoot"/>
+        <p:cTn id="1" dur="indefinite" restart="never" nodeType="tmRoot"/>
       </p:par>
     </p:tnLst>
   </p:timing>
@@ -14798,7 +14803,7 @@
           <a:p>
             <a:r>
               <a:rPr lang="en-US" dirty="0" smtClean="0"/>
-              <a:t>Required Software for Today</a:t>
+              <a:t>III. Lab #1</a:t>
             </a:r>
             <a:endParaRPr lang="en-US" dirty="0"/>
           </a:p>
@@ -14824,12 +14829,30 @@
               <a:buChar char="•"/>
             </a:pPr>
             <a:r>
+              <a:rPr lang="en-US" dirty="0"/>
+              <a:t>Required Software for </a:t>
+            </a:r>
+            <a:r>
               <a:rPr lang="en-US" dirty="0" smtClean="0"/>
-              <a:t>Java 11</a:t>
-            </a:r>
-          </a:p>
-          <a:p>
-            <a:pPr marL="456977" indent="-456977">
+              <a:t>Today</a:t>
+            </a:r>
+          </a:p>
+          <a:p>
+            <a:pPr marL="782258" lvl="1" indent="-456977">
+              <a:buFont typeface="Arial"/>
+              <a:buChar char="•"/>
+            </a:pPr>
+            <a:r>
+              <a:rPr lang="en-US" dirty="0" smtClean="0"/>
+              <a:t>Java </a:t>
+            </a:r>
+            <a:r>
+              <a:rPr lang="en-US" dirty="0" smtClean="0"/>
+              <a:t>11</a:t>
+            </a:r>
+          </a:p>
+          <a:p>
+            <a:pPr marL="782258" lvl="1" indent="-456977">
               <a:buFont typeface="Arial"/>
               <a:buChar char="•"/>
             </a:pPr>
@@ -14899,7 +14922,7 @@
   <p:timing>
     <p:tnLst>
       <p:par>
-        <p:cTn xmlns:p14="http://schemas.microsoft.com/office/powerpoint/2010/main" id="1" dur="indefinite" restart="never" nodeType="tmRoot"/>
+        <p:cTn id="1" dur="indefinite" restart="never" nodeType="tmRoot"/>
       </p:par>
     </p:tnLst>
   </p:timing>
@@ -15061,7 +15084,7 @@
   <p:timing>
     <p:tnLst>
       <p:par>
-        <p:cTn xmlns:p14="http://schemas.microsoft.com/office/powerpoint/2010/main" id="1" dur="indefinite" restart="never" nodeType="tmRoot"/>
+        <p:cTn id="1" dur="indefinite" restart="never" nodeType="tmRoot"/>
       </p:par>
     </p:tnLst>
   </p:timing>
@@ -15203,7 +15226,7 @@
   <p:timing>
     <p:tnLst>
       <p:par>
-        <p:cTn xmlns:p14="http://schemas.microsoft.com/office/powerpoint/2010/main" id="1" dur="indefinite" restart="never" nodeType="tmRoot"/>
+        <p:cTn id="1" dur="indefinite" restart="never" nodeType="tmRoot"/>
       </p:par>
     </p:tnLst>
   </p:timing>
@@ -15244,7 +15267,11 @@
           <a:p>
             <a:r>
               <a:rPr lang="en-US" dirty="0" smtClean="0"/>
-              <a:t>Small Features</a:t>
+              <a:t>IV. Small </a:t>
+            </a:r>
+            <a:r>
+              <a:rPr lang="en-US" dirty="0" smtClean="0"/>
+              <a:t>Features</a:t>
             </a:r>
             <a:endParaRPr lang="en-US" dirty="0"/>
           </a:p>
@@ -15399,7 +15426,7 @@
   <p:timing>
     <p:tnLst>
       <p:par>
-        <p:cTn xmlns:p14="http://schemas.microsoft.com/office/powerpoint/2010/main" id="1" dur="indefinite" restart="never" nodeType="tmRoot"/>
+        <p:cTn id="1" dur="indefinite" restart="never" nodeType="tmRoot"/>
       </p:par>
     </p:tnLst>
   </p:timing>
@@ -15563,7 +15590,7 @@
   <p:timing>
     <p:tnLst>
       <p:par>
-        <p:cTn xmlns:p14="http://schemas.microsoft.com/office/powerpoint/2010/main" id="1" dur="indefinite" restart="never" nodeType="tmRoot"/>
+        <p:cTn id="1" dur="indefinite" restart="never" nodeType="tmRoot"/>
       </p:par>
     </p:tnLst>
   </p:timing>
@@ -15710,7 +15737,7 @@
   <p:timing>
     <p:tnLst>
       <p:par>
-        <p:cTn xmlns:p14="http://schemas.microsoft.com/office/powerpoint/2010/main" id="1" dur="indefinite" restart="never" nodeType="tmRoot"/>
+        <p:cTn id="1" dur="indefinite" restart="never" nodeType="tmRoot"/>
       </p:par>
     </p:tnLst>
   </p:timing>
@@ -16105,7 +16132,7 @@
   <p:timing>
     <p:tnLst>
       <p:par>
-        <p:cTn xmlns:p14="http://schemas.microsoft.com/office/powerpoint/2010/main" id="1" dur="indefinite" restart="never" nodeType="tmRoot"/>
+        <p:cTn id="1" dur="indefinite" restart="never" nodeType="tmRoot"/>
       </p:par>
     </p:tnLst>
   </p:timing>
@@ -16477,7 +16504,7 @@
   <p:timing>
     <p:tnLst>
       <p:par>
-        <p:cTn xmlns:p14="http://schemas.microsoft.com/office/powerpoint/2010/main" id="1" dur="indefinite" restart="never" nodeType="tmRoot"/>
+        <p:cTn id="1" dur="indefinite" restart="never" nodeType="tmRoot"/>
       </p:par>
     </p:tnLst>
   </p:timing>
@@ -16634,7 +16661,7 @@
   <p:timing>
     <p:tnLst>
       <p:par>
-        <p:cTn xmlns:p14="http://schemas.microsoft.com/office/powerpoint/2010/main" id="1" dur="indefinite" restart="never" nodeType="tmRoot"/>
+        <p:cTn id="1" dur="indefinite" restart="never" nodeType="tmRoot"/>
       </p:par>
     </p:tnLst>
   </p:timing>
@@ -16911,7 +16938,7 @@
   <p:timing>
     <p:tnLst>
       <p:par>
-        <p:cTn xmlns:p14="http://schemas.microsoft.com/office/powerpoint/2010/main" id="1" dur="indefinite" restart="never" nodeType="tmRoot"/>
+        <p:cTn id="1" dur="indefinite" restart="never" nodeType="tmRoot"/>
       </p:par>
     </p:tnLst>
   </p:timing>
@@ -17194,7 +17221,7 @@
   <p:timing>
     <p:tnLst>
       <p:par>
-        <p:cTn xmlns:p14="http://schemas.microsoft.com/office/powerpoint/2010/main" id="1" dur="indefinite" restart="never" nodeType="tmRoot"/>
+        <p:cTn id="1" dur="indefinite" restart="never" nodeType="tmRoot"/>
       </p:par>
     </p:tnLst>
   </p:timing>
@@ -17435,7 +17462,7 @@
   <p:timing>
     <p:tnLst>
       <p:par>
-        <p:cTn xmlns:p14="http://schemas.microsoft.com/office/powerpoint/2010/main" id="1" dur="indefinite" restart="never" nodeType="tmRoot"/>
+        <p:cTn id="1" dur="indefinite" restart="never" nodeType="tmRoot"/>
       </p:par>
     </p:tnLst>
   </p:timing>
@@ -17539,14 +17566,14 @@
             <a:noFill/>
           </a:ln>
           <a:extLst>
-            <a:ext uri="{909E8E84-426E-40dd-AFC4-6F175D3DCCD1}">
+            <a:ext uri="{909E8E84-426E-40DD-AFC4-6F175D3DCCD1}">
               <a14:hiddenFill xmlns:a14="http://schemas.microsoft.com/office/drawing/2010/main">
                 <a:solidFill>
                   <a:srgbClr val="FFFFFF"/>
                 </a:solidFill>
               </a14:hiddenFill>
             </a:ext>
-            <a:ext uri="{91240B29-F687-4f45-9708-019B960494DF}">
+            <a:ext uri="{91240B29-F687-4F45-9708-019B960494DF}">
               <a14:hiddenLine xmlns:a14="http://schemas.microsoft.com/office/drawing/2010/main" w="9525">
                 <a:solidFill>
                   <a:srgbClr val="000000"/>
@@ -18022,14 +18049,14 @@
             <a:noFill/>
           </a:ln>
           <a:extLst>
-            <a:ext uri="{909E8E84-426E-40dd-AFC4-6F175D3DCCD1}">
+            <a:ext uri="{909E8E84-426E-40DD-AFC4-6F175D3DCCD1}">
               <a14:hiddenFill xmlns:a14="http://schemas.microsoft.com/office/drawing/2010/main">
                 <a:solidFill>
                   <a:srgbClr val="FFFFFF"/>
                 </a:solidFill>
               </a14:hiddenFill>
             </a:ext>
-            <a:ext uri="{91240B29-F687-4f45-9708-019B960494DF}">
+            <a:ext uri="{91240B29-F687-4F45-9708-019B960494DF}">
               <a14:hiddenLine xmlns:a14="http://schemas.microsoft.com/office/drawing/2010/main" w="9525">
                 <a:solidFill>
                   <a:srgbClr val="000000"/>
@@ -18071,7 +18098,7 @@
   <p:timing>
     <p:tnLst>
       <p:par>
-        <p:cTn xmlns:p14="http://schemas.microsoft.com/office/powerpoint/2010/main" id="1" dur="indefinite" restart="never" nodeType="tmRoot">
+        <p:cTn id="1" dur="indefinite" restart="never" nodeType="tmRoot">
           <p:childTnLst>
             <p:seq concurrent="1" nextAc="seek">
               <p:cTn id="2" dur="indefinite" nodeType="mainSeq">
@@ -18402,7 +18429,7 @@
   <p:timing>
     <p:tnLst>
       <p:par>
-        <p:cTn xmlns:p14="http://schemas.microsoft.com/office/powerpoint/2010/main" id="1" dur="indefinite" restart="never" nodeType="tmRoot"/>
+        <p:cTn id="1" dur="indefinite" restart="never" nodeType="tmRoot"/>
       </p:par>
     </p:tnLst>
   </p:timing>
@@ -18628,14 +18655,14 @@
           </a:ln>
           <a:effectLst/>
           <a:extLst>
-            <a:ext uri="{909E8E84-426E-40dd-AFC4-6F175D3DCCD1}">
+            <a:ext uri="{909E8E84-426E-40DD-AFC4-6F175D3DCCD1}">
               <a14:hiddenFill xmlns:a14="http://schemas.microsoft.com/office/drawing/2010/main">
                 <a:solidFill>
                   <a:srgbClr val="FFFFFF"/>
                 </a:solidFill>
               </a14:hiddenFill>
             </a:ext>
-            <a:ext uri="{91240B29-F687-4f45-9708-019B960494DF}">
+            <a:ext uri="{91240B29-F687-4F45-9708-019B960494DF}">
               <a14:hiddenLine xmlns:a14="http://schemas.microsoft.com/office/drawing/2010/main" w="9525" cap="flat">
                 <a:solidFill>
                   <a:srgbClr val="808080"/>
@@ -18645,7 +18672,7 @@
                 <a:tailEnd/>
               </a14:hiddenLine>
             </a:ext>
-            <a:ext uri="{AF507438-7753-43e0-B8FC-AC1667EBCBE1}">
+            <a:ext uri="{AF507438-7753-43E0-B8FC-AC1667EBCBE1}">
               <a14:hiddenEffects xmlns:a14="http://schemas.microsoft.com/office/drawing/2010/main">
                 <a:effectLst>
                   <a:outerShdw blurRad="63500" dist="38099" dir="2700000" algn="ctr" rotWithShape="0">
@@ -18657,7 +18684,7 @@
               </a14:hiddenEffects>
             </a:ext>
             <a:ext uri="{FAA26D3D-D897-4be2-8F04-BA451C77F1D7}">
-              <ma14:placeholderFlag xmlns:ma14="http://schemas.microsoft.com/office/mac/drawingml/2011/main" val="1"/>
+              <ma14:placeholderFlag xmlns:ma14="http://schemas.microsoft.com/office/mac/drawingml/2011/main" xmlns="" val="1"/>
             </a:ext>
           </a:extLst>
         </p:spPr>
@@ -18924,7 +18951,7 @@
   <p:timing>
     <p:tnLst>
       <p:par>
-        <p:cTn xmlns:p14="http://schemas.microsoft.com/office/powerpoint/2010/main" id="1" dur="indefinite" restart="never" nodeType="tmRoot"/>
+        <p:cTn id="1" dur="indefinite" restart="never" nodeType="tmRoot"/>
       </p:par>
     </p:tnLst>
   </p:timing>
@@ -19140,14 +19167,14 @@
           </a:ln>
           <a:effectLst/>
           <a:extLst>
-            <a:ext uri="{909E8E84-426E-40dd-AFC4-6F175D3DCCD1}">
+            <a:ext uri="{909E8E84-426E-40DD-AFC4-6F175D3DCCD1}">
               <a14:hiddenFill xmlns:a14="http://schemas.microsoft.com/office/drawing/2010/main">
                 <a:solidFill>
                   <a:srgbClr val="FFFFFF"/>
                 </a:solidFill>
               </a14:hiddenFill>
             </a:ext>
-            <a:ext uri="{91240B29-F687-4f45-9708-019B960494DF}">
+            <a:ext uri="{91240B29-F687-4F45-9708-019B960494DF}">
               <a14:hiddenLine xmlns:a14="http://schemas.microsoft.com/office/drawing/2010/main" w="9525" cap="flat">
                 <a:solidFill>
                   <a:srgbClr val="808080"/>
@@ -19157,7 +19184,7 @@
                 <a:tailEnd/>
               </a14:hiddenLine>
             </a:ext>
-            <a:ext uri="{AF507438-7753-43e0-B8FC-AC1667EBCBE1}">
+            <a:ext uri="{AF507438-7753-43E0-B8FC-AC1667EBCBE1}">
               <a14:hiddenEffects xmlns:a14="http://schemas.microsoft.com/office/drawing/2010/main">
                 <a:effectLst>
                   <a:outerShdw blurRad="63500" dist="38099" dir="2700000" algn="ctr" rotWithShape="0">
@@ -19169,7 +19196,7 @@
               </a14:hiddenEffects>
             </a:ext>
             <a:ext uri="{FAA26D3D-D897-4be2-8F04-BA451C77F1D7}">
-              <ma14:placeholderFlag xmlns:ma14="http://schemas.microsoft.com/office/mac/drawingml/2011/main" val="1"/>
+              <ma14:placeholderFlag xmlns:ma14="http://schemas.microsoft.com/office/mac/drawingml/2011/main" xmlns="" val="1"/>
             </a:ext>
           </a:extLst>
         </p:spPr>
@@ -19436,7 +19463,7 @@
   <p:timing>
     <p:tnLst>
       <p:par>
-        <p:cTn xmlns:p14="http://schemas.microsoft.com/office/powerpoint/2010/main" id="1" dur="indefinite" restart="never" nodeType="tmRoot"/>
+        <p:cTn id="1" dur="indefinite" restart="never" nodeType="tmRoot"/>
       </p:par>
     </p:tnLst>
   </p:timing>
@@ -19488,7 +19515,6 @@
               <a:rPr lang="en-US" dirty="0"/>
               <a:t>4</a:t>
             </a:r>
-            <a:endParaRPr lang="en-US" dirty="0"/>
           </a:p>
         </p:txBody>
       </p:sp>
@@ -19619,14 +19645,14 @@
           </a:ln>
           <a:effectLst/>
           <a:extLst>
-            <a:ext uri="{909E8E84-426E-40dd-AFC4-6F175D3DCCD1}">
+            <a:ext uri="{909E8E84-426E-40DD-AFC4-6F175D3DCCD1}">
               <a14:hiddenFill xmlns:a14="http://schemas.microsoft.com/office/drawing/2010/main">
                 <a:solidFill>
                   <a:srgbClr val="FFFFFF"/>
                 </a:solidFill>
               </a14:hiddenFill>
             </a:ext>
-            <a:ext uri="{91240B29-F687-4f45-9708-019B960494DF}">
+            <a:ext uri="{91240B29-F687-4F45-9708-019B960494DF}">
               <a14:hiddenLine xmlns:a14="http://schemas.microsoft.com/office/drawing/2010/main" w="9525" cap="flat">
                 <a:solidFill>
                   <a:srgbClr val="808080"/>
@@ -19636,7 +19662,7 @@
                 <a:tailEnd/>
               </a14:hiddenLine>
             </a:ext>
-            <a:ext uri="{AF507438-7753-43e0-B8FC-AC1667EBCBE1}">
+            <a:ext uri="{AF507438-7753-43E0-B8FC-AC1667EBCBE1}">
               <a14:hiddenEffects xmlns:a14="http://schemas.microsoft.com/office/drawing/2010/main">
                 <a:effectLst>
                   <a:outerShdw blurRad="63500" dist="38099" dir="2700000" algn="ctr" rotWithShape="0">
@@ -19648,7 +19674,7 @@
               </a14:hiddenEffects>
             </a:ext>
             <a:ext uri="{FAA26D3D-D897-4be2-8F04-BA451C77F1D7}">
-              <ma14:placeholderFlag xmlns:ma14="http://schemas.microsoft.com/office/mac/drawingml/2011/main" val="1"/>
+              <ma14:placeholderFlag xmlns:ma14="http://schemas.microsoft.com/office/mac/drawingml/2011/main" xmlns="" val="1"/>
             </a:ext>
           </a:extLst>
         </p:spPr>
@@ -20086,7 +20112,7 @@
   <p:timing>
     <p:tnLst>
       <p:par>
-        <p:cTn xmlns:p14="http://schemas.microsoft.com/office/powerpoint/2010/main" id="1" dur="indefinite" restart="never" nodeType="tmRoot"/>
+        <p:cTn id="1" dur="indefinite" restart="never" nodeType="tmRoot"/>
       </p:par>
     </p:tnLst>
   </p:timing>
@@ -20196,14 +20222,14 @@
             <a:noFill/>
           </a:ln>
           <a:extLst>
-            <a:ext uri="{909E8E84-426E-40dd-AFC4-6F175D3DCCD1}">
+            <a:ext uri="{909E8E84-426E-40DD-AFC4-6F175D3DCCD1}">
               <a14:hiddenFill xmlns:a14="http://schemas.microsoft.com/office/drawing/2010/main">
                 <a:solidFill>
                   <a:srgbClr val="FFFFFF"/>
                 </a:solidFill>
               </a14:hiddenFill>
             </a:ext>
-            <a:ext uri="{91240B29-F687-4f45-9708-019B960494DF}">
+            <a:ext uri="{91240B29-F687-4F45-9708-019B960494DF}">
               <a14:hiddenLine xmlns:a14="http://schemas.microsoft.com/office/drawing/2010/main" w="9525">
                 <a:solidFill>
                   <a:srgbClr val="000000"/>
@@ -20229,7 +20255,7 @@
   <p:timing>
     <p:tnLst>
       <p:par>
-        <p:cTn xmlns:p14="http://schemas.microsoft.com/office/powerpoint/2010/main" id="1" dur="indefinite" restart="never" nodeType="tmRoot"/>
+        <p:cTn id="1" dur="indefinite" restart="never" nodeType="tmRoot"/>
       </p:par>
     </p:tnLst>
   </p:timing>
@@ -20429,7 +20455,7 @@
   <p:timing>
     <p:tnLst>
       <p:par>
-        <p:cTn xmlns:p14="http://schemas.microsoft.com/office/powerpoint/2010/main" id="1" dur="indefinite" restart="never" nodeType="tmRoot"/>
+        <p:cTn id="1" dur="indefinite" restart="never" nodeType="tmRoot"/>
       </p:par>
     </p:tnLst>
   </p:timing>
@@ -20469,13 +20495,10 @@
           <a:lstStyle/>
           <a:p>
             <a:r>
-              <a:rPr lang="en-US" dirty="0" err="1"/>
-              <a:t>Vars</a:t>
-            </a:r>
-            <a:r>
-              <a:rPr lang="en-US" dirty="0"/>
-              <a:t>/Streams</a:t>
-            </a:r>
+              <a:rPr lang="en-US" dirty="0" smtClean="0"/>
+              <a:t>V. Var/Stream Changes</a:t>
+            </a:r>
+            <a:endParaRPr lang="en-US" dirty="0"/>
           </a:p>
         </p:txBody>
       </p:sp>
@@ -20601,7 +20624,7 @@
   <p:timing>
     <p:tnLst>
       <p:par>
-        <p:cTn xmlns:p14="http://schemas.microsoft.com/office/powerpoint/2010/main" id="1" dur="indefinite" restart="never" nodeType="tmRoot"/>
+        <p:cTn id="1" dur="indefinite" restart="never" nodeType="tmRoot"/>
       </p:par>
     </p:tnLst>
   </p:timing>
@@ -20855,7 +20878,7 @@
   <p:timing>
     <p:tnLst>
       <p:par>
-        <p:cTn xmlns:p14="http://schemas.microsoft.com/office/powerpoint/2010/main" id="1" dur="indefinite" restart="never" nodeType="tmRoot">
+        <p:cTn id="1" dur="indefinite" restart="never" nodeType="tmRoot">
           <p:childTnLst>
             <p:seq concurrent="1" nextAc="seek">
               <p:cTn id="2" dur="indefinite" nodeType="mainSeq">
@@ -21421,7 +21444,7 @@
   <p:timing>
     <p:tnLst>
       <p:par>
-        <p:cTn xmlns:p14="http://schemas.microsoft.com/office/powerpoint/2010/main" id="1" dur="indefinite" restart="never" nodeType="tmRoot">
+        <p:cTn id="1" dur="indefinite" restart="never" nodeType="tmRoot">
           <p:childTnLst>
             <p:seq concurrent="1" nextAc="seek">
               <p:cTn id="2" dur="indefinite" nodeType="mainSeq">
@@ -21926,7 +21949,7 @@
   <p:timing>
     <p:tnLst>
       <p:par>
-        <p:cTn xmlns:p14="http://schemas.microsoft.com/office/powerpoint/2010/main" id="1" dur="indefinite" restart="never" nodeType="tmRoot"/>
+        <p:cTn id="1" dur="indefinite" restart="never" nodeType="tmRoot"/>
       </p:par>
     </p:tnLst>
   </p:timing>
@@ -22147,7 +22170,7 @@
   <p:timing>
     <p:tnLst>
       <p:par>
-        <p:cTn xmlns:p14="http://schemas.microsoft.com/office/powerpoint/2010/main" id="1" dur="indefinite" restart="never" nodeType="tmRoot">
+        <p:cTn id="1" dur="indefinite" restart="never" nodeType="tmRoot">
           <p:childTnLst>
             <p:seq concurrent="1" nextAc="seek">
               <p:cTn id="2" dur="indefinite" nodeType="mainSeq">
@@ -22691,7 +22714,7 @@
   <p:timing>
     <p:tnLst>
       <p:par>
-        <p:cTn xmlns:p14="http://schemas.microsoft.com/office/powerpoint/2010/main" id="1" dur="indefinite" restart="never" nodeType="tmRoot">
+        <p:cTn id="1" dur="indefinite" restart="never" nodeType="tmRoot">
           <p:childTnLst>
             <p:seq concurrent="1" nextAc="seek">
               <p:cTn id="2" dur="indefinite" nodeType="mainSeq">
@@ -23209,7 +23232,7 @@
   <p:timing>
     <p:tnLst>
       <p:par>
-        <p:cTn xmlns:p14="http://schemas.microsoft.com/office/powerpoint/2010/main" id="1" dur="indefinite" restart="never" nodeType="tmRoot">
+        <p:cTn id="1" dur="indefinite" restart="never" nodeType="tmRoot">
           <p:childTnLst>
             <p:seq concurrent="1" nextAc="seek">
               <p:cTn id="2" dur="indefinite" nodeType="mainSeq">
@@ -23601,7 +23624,7 @@
   <p:timing>
     <p:tnLst>
       <p:par>
-        <p:cTn xmlns:p14="http://schemas.microsoft.com/office/powerpoint/2010/main" id="1" dur="indefinite" restart="never" nodeType="tmRoot">
+        <p:cTn id="1" dur="indefinite" restart="never" nodeType="tmRoot">
           <p:childTnLst>
             <p:seq concurrent="1" nextAc="seek">
               <p:cTn id="2" dur="indefinite" nodeType="mainSeq">
@@ -23921,7 +23944,7 @@
   <p:timing>
     <p:tnLst>
       <p:par>
-        <p:cTn xmlns:p14="http://schemas.microsoft.com/office/powerpoint/2010/main" id="1" dur="indefinite" restart="never" nodeType="tmRoot"/>
+        <p:cTn id="1" dur="indefinite" restart="never" nodeType="tmRoot"/>
       </p:par>
     </p:tnLst>
   </p:timing>
@@ -24006,15 +24029,21 @@
           <p:nvPr/>
         </p:nvPicPr>
         <p:blipFill>
-          <a:blip/>
+          <a:blip r:embed="rId2">
+            <a:extLst>
+              <a:ext uri="{28A0092B-C50C-407E-A947-70E740481C1C}">
+                <a14:useLocalDpi xmlns:a14="http://schemas.microsoft.com/office/drawing/2010/main" val="0"/>
+              </a:ext>
+            </a:extLst>
+          </a:blip>
           <a:stretch>
             <a:fillRect/>
           </a:stretch>
         </p:blipFill>
         <p:spPr>
           <a:xfrm>
-            <a:off x="2209800" y="1428750"/>
-            <a:ext cx="1930400" cy="2413000"/>
+            <a:off x="2210284" y="1428750"/>
+            <a:ext cx="1929432" cy="2413000"/>
           </a:xfrm>
           <a:prstGeom prst="rect">
             <a:avLst/>
@@ -24030,7 +24059,13 @@
           <p:nvPr/>
         </p:nvPicPr>
         <p:blipFill>
-          <a:blip r:embed="rId2"/>
+          <a:blip r:embed="rId3">
+            <a:extLst>
+              <a:ext uri="{28A0092B-C50C-407E-A947-70E740481C1C}">
+                <a14:useLocalDpi xmlns:a14="http://schemas.microsoft.com/office/drawing/2010/main" val="0"/>
+              </a:ext>
+            </a:extLst>
+          </a:blip>
           <a:stretch>
             <a:fillRect/>
           </a:stretch>
@@ -24086,7 +24121,7 @@
   <p:timing>
     <p:tnLst>
       <p:par>
-        <p:cTn xmlns:p14="http://schemas.microsoft.com/office/powerpoint/2010/main" id="1" dur="indefinite" restart="never" nodeType="tmRoot"/>
+        <p:cTn id="1" dur="indefinite" restart="never" nodeType="tmRoot"/>
       </p:par>
     </p:tnLst>
   </p:timing>
@@ -24316,14 +24351,14 @@
             <a:noFill/>
           </a:ln>
           <a:extLst>
-            <a:ext uri="{909E8E84-426E-40dd-AFC4-6F175D3DCCD1}">
+            <a:ext uri="{909E8E84-426E-40DD-AFC4-6F175D3DCCD1}">
               <a14:hiddenFill xmlns:a14="http://schemas.microsoft.com/office/drawing/2010/main">
                 <a:solidFill>
                   <a:srgbClr val="FFFFFF"/>
                 </a:solidFill>
               </a14:hiddenFill>
             </a:ext>
-            <a:ext uri="{91240B29-F687-4f45-9708-019B960494DF}">
+            <a:ext uri="{91240B29-F687-4F45-9708-019B960494DF}">
               <a14:hiddenLine xmlns:a14="http://schemas.microsoft.com/office/drawing/2010/main" w="9525">
                 <a:solidFill>
                   <a:srgbClr val="000000"/>
@@ -24365,7 +24400,7 @@
   <p:timing>
     <p:tnLst>
       <p:par>
-        <p:cTn xmlns:p14="http://schemas.microsoft.com/office/powerpoint/2010/main" id="1" dur="indefinite" restart="never" nodeType="tmRoot"/>
+        <p:cTn id="1" dur="indefinite" restart="never" nodeType="tmRoot"/>
       </p:par>
     </p:tnLst>
   </p:timing>
@@ -24643,7 +24678,7 @@
   <p:timing>
     <p:tnLst>
       <p:par>
-        <p:cTn xmlns:p14="http://schemas.microsoft.com/office/powerpoint/2010/main" id="1" dur="indefinite" restart="never" nodeType="tmRoot"/>
+        <p:cTn id="1" dur="indefinite" restart="never" nodeType="tmRoot"/>
       </p:par>
     </p:tnLst>
   </p:timing>
@@ -24718,14 +24753,14 @@
             <a:noFill/>
           </a:ln>
           <a:extLst>
-            <a:ext uri="{909E8E84-426E-40dd-AFC4-6F175D3DCCD1}">
+            <a:ext uri="{909E8E84-426E-40DD-AFC4-6F175D3DCCD1}">
               <a14:hiddenFill xmlns:a14="http://schemas.microsoft.com/office/drawing/2010/main">
                 <a:solidFill>
                   <a:srgbClr val="FFFFFF"/>
                 </a:solidFill>
               </a14:hiddenFill>
             </a:ext>
-            <a:ext uri="{91240B29-F687-4f45-9708-019B960494DF}">
+            <a:ext uri="{91240B29-F687-4F45-9708-019B960494DF}">
               <a14:hiddenLine xmlns:a14="http://schemas.microsoft.com/office/drawing/2010/main" w="9525">
                 <a:solidFill>
                   <a:srgbClr val="000000"/>
@@ -24795,14 +24830,14 @@
             <a:noFill/>
           </a:ln>
           <a:extLst>
-            <a:ext uri="{909E8E84-426E-40dd-AFC4-6F175D3DCCD1}">
+            <a:ext uri="{909E8E84-426E-40DD-AFC4-6F175D3DCCD1}">
               <a14:hiddenFill xmlns:a14="http://schemas.microsoft.com/office/drawing/2010/main">
                 <a:solidFill>
                   <a:srgbClr val="FFFFFF"/>
                 </a:solidFill>
               </a14:hiddenFill>
             </a:ext>
-            <a:ext uri="{91240B29-F687-4f45-9708-019B960494DF}">
+            <a:ext uri="{91240B29-F687-4F45-9708-019B960494DF}">
               <a14:hiddenLine xmlns:a14="http://schemas.microsoft.com/office/drawing/2010/main" w="9525">
                 <a:solidFill>
                   <a:srgbClr val="000000"/>
@@ -24859,7 +24894,7 @@
           </a:ln>
           <a:effectLst/>
           <a:extLst>
-            <a:ext uri="{AF507438-7753-43e0-B8FC-AC1667EBCBE1}">
+            <a:ext uri="{AF507438-7753-43E0-B8FC-AC1667EBCBE1}">
               <a14:hiddenEffects xmlns:a14="http://schemas.microsoft.com/office/drawing/2010/main">
                 <a:effectLst>
                   <a:outerShdw blurRad="63500" dist="38099" dir="2700000" algn="ctr" rotWithShape="0">
@@ -24942,7 +24977,7 @@
   <p:timing>
     <p:tnLst>
       <p:par>
-        <p:cTn xmlns:p14="http://schemas.microsoft.com/office/powerpoint/2010/main" id="1" dur="indefinite" restart="never" nodeType="tmRoot">
+        <p:cTn id="1" dur="indefinite" restart="never" nodeType="tmRoot">
           <p:childTnLst>
             <p:seq concurrent="1" nextAc="seek">
               <p:cTn id="2" dur="indefinite" nodeType="mainSeq">
@@ -25112,14 +25147,14 @@
             <a:noFill/>
           </a:ln>
           <a:extLst>
-            <a:ext uri="{909E8E84-426E-40dd-AFC4-6F175D3DCCD1}">
+            <a:ext uri="{909E8E84-426E-40DD-AFC4-6F175D3DCCD1}">
               <a14:hiddenFill xmlns:a14="http://schemas.microsoft.com/office/drawing/2010/main">
                 <a:solidFill>
                   <a:srgbClr val="FFFFFF"/>
                 </a:solidFill>
               </a14:hiddenFill>
             </a:ext>
-            <a:ext uri="{91240B29-F687-4f45-9708-019B960494DF}">
+            <a:ext uri="{91240B29-F687-4F45-9708-019B960494DF}">
               <a14:hiddenLine xmlns:a14="http://schemas.microsoft.com/office/drawing/2010/main" w="9525">
                 <a:solidFill>
                   <a:srgbClr val="000000"/>
@@ -25189,14 +25224,14 @@
             <a:noFill/>
           </a:ln>
           <a:extLst>
-            <a:ext uri="{909E8E84-426E-40dd-AFC4-6F175D3DCCD1}">
+            <a:ext uri="{909E8E84-426E-40DD-AFC4-6F175D3DCCD1}">
               <a14:hiddenFill xmlns:a14="http://schemas.microsoft.com/office/drawing/2010/main">
                 <a:solidFill>
                   <a:srgbClr val="FFFFFF"/>
                 </a:solidFill>
               </a14:hiddenFill>
             </a:ext>
-            <a:ext uri="{91240B29-F687-4f45-9708-019B960494DF}">
+            <a:ext uri="{91240B29-F687-4F45-9708-019B960494DF}">
               <a14:hiddenLine xmlns:a14="http://schemas.microsoft.com/office/drawing/2010/main" w="9525">
                 <a:solidFill>
                   <a:srgbClr val="000000"/>
@@ -25268,7 +25303,7 @@
           </a:ln>
           <a:effectLst/>
           <a:extLst>
-            <a:ext uri="{AF507438-7753-43e0-B8FC-AC1667EBCBE1}">
+            <a:ext uri="{AF507438-7753-43E0-B8FC-AC1667EBCBE1}">
               <a14:hiddenEffects xmlns:a14="http://schemas.microsoft.com/office/drawing/2010/main">
                 <a:effectLst>
                   <a:outerShdw blurRad="63500" dist="38099" dir="2700000" algn="ctr" rotWithShape="0">
@@ -25381,7 +25416,7 @@
   <p:timing>
     <p:tnLst>
       <p:par>
-        <p:cTn xmlns:p14="http://schemas.microsoft.com/office/powerpoint/2010/main" id="1" dur="indefinite" restart="never" nodeType="tmRoot">
+        <p:cTn id="1" dur="indefinite" restart="never" nodeType="tmRoot">
           <p:childTnLst>
             <p:seq concurrent="1" nextAc="seek">
               <p:cTn id="2" dur="indefinite" nodeType="mainSeq">
@@ -25588,7 +25623,7 @@
             <a:tailEnd/>
           </a:ln>
           <a:extLst>
-            <a:ext uri="{909E8E84-426E-40dd-AFC4-6F175D3DCCD1}">
+            <a:ext uri="{909E8E84-426E-40DD-AFC4-6F175D3DCCD1}">
               <a14:hiddenFill xmlns:a14="http://schemas.microsoft.com/office/drawing/2010/main">
                 <a:solidFill>
                   <a:srgbClr val="FFFFFF"/>
@@ -25823,14 +25858,14 @@
             <a:noFill/>
           </a:ln>
           <a:extLst>
-            <a:ext uri="{909E8E84-426E-40dd-AFC4-6F175D3DCCD1}">
+            <a:ext uri="{909E8E84-426E-40DD-AFC4-6F175D3DCCD1}">
               <a14:hiddenFill xmlns:a14="http://schemas.microsoft.com/office/drawing/2010/main">
                 <a:solidFill>
                   <a:srgbClr val="FFFFFF"/>
                 </a:solidFill>
               </a14:hiddenFill>
             </a:ext>
-            <a:ext uri="{91240B29-F687-4f45-9708-019B960494DF}">
+            <a:ext uri="{91240B29-F687-4F45-9708-019B960494DF}">
               <a14:hiddenLine xmlns:a14="http://schemas.microsoft.com/office/drawing/2010/main" w="9525">
                 <a:solidFill>
                   <a:srgbClr val="000000"/>
@@ -25877,7 +25912,7 @@
   <p:timing>
     <p:tnLst>
       <p:par>
-        <p:cTn xmlns:p14="http://schemas.microsoft.com/office/powerpoint/2010/main" id="1" dur="indefinite" restart="never" nodeType="tmRoot">
+        <p:cTn id="1" dur="indefinite" restart="never" nodeType="tmRoot">
           <p:childTnLst>
             <p:seq concurrent="1" nextAc="seek">
               <p:cTn id="2" dur="indefinite" nodeType="mainSeq">
@@ -26074,7 +26109,7 @@
             <a:tailEnd/>
           </a:ln>
           <a:extLst>
-            <a:ext uri="{909E8E84-426E-40dd-AFC4-6F175D3DCCD1}">
+            <a:ext uri="{909E8E84-426E-40DD-AFC4-6F175D3DCCD1}">
               <a14:hiddenFill xmlns:a14="http://schemas.microsoft.com/office/drawing/2010/main">
                 <a:solidFill>
                   <a:srgbClr val="FFFFFF"/>
@@ -26309,14 +26344,14 @@
             <a:noFill/>
           </a:ln>
           <a:extLst>
-            <a:ext uri="{909E8E84-426E-40dd-AFC4-6F175D3DCCD1}">
+            <a:ext uri="{909E8E84-426E-40DD-AFC4-6F175D3DCCD1}">
               <a14:hiddenFill xmlns:a14="http://schemas.microsoft.com/office/drawing/2010/main">
                 <a:solidFill>
                   <a:srgbClr val="FFFFFF"/>
                 </a:solidFill>
               </a14:hiddenFill>
             </a:ext>
-            <a:ext uri="{91240B29-F687-4f45-9708-019B960494DF}">
+            <a:ext uri="{91240B29-F687-4F45-9708-019B960494DF}">
               <a14:hiddenLine xmlns:a14="http://schemas.microsoft.com/office/drawing/2010/main" w="9525">
                 <a:solidFill>
                   <a:srgbClr val="000000"/>
@@ -26358,7 +26393,7 @@
   <p:timing>
     <p:tnLst>
       <p:par>
-        <p:cTn xmlns:p14="http://schemas.microsoft.com/office/powerpoint/2010/main" id="1" dur="indefinite" restart="never" nodeType="tmRoot">
+        <p:cTn id="1" dur="indefinite" restart="never" nodeType="tmRoot">
           <p:childTnLst>
             <p:seq concurrent="1" nextAc="seek">
               <p:cTn id="2" dur="indefinite" nodeType="mainSeq">
@@ -26509,7 +26544,7 @@
             <a:tailEnd/>
           </a:ln>
           <a:extLst>
-            <a:ext uri="{909E8E84-426E-40dd-AFC4-6F175D3DCCD1}">
+            <a:ext uri="{909E8E84-426E-40DD-AFC4-6F175D3DCCD1}">
               <a14:hiddenFill xmlns:a14="http://schemas.microsoft.com/office/drawing/2010/main">
                 <a:solidFill>
                   <a:srgbClr val="FFFFFF"/>
@@ -26744,14 +26779,14 @@
             <a:noFill/>
           </a:ln>
           <a:extLst>
-            <a:ext uri="{909E8E84-426E-40dd-AFC4-6F175D3DCCD1}">
+            <a:ext uri="{909E8E84-426E-40DD-AFC4-6F175D3DCCD1}">
               <a14:hiddenFill xmlns:a14="http://schemas.microsoft.com/office/drawing/2010/main">
                 <a:solidFill>
                   <a:srgbClr val="FFFFFF"/>
                 </a:solidFill>
               </a14:hiddenFill>
             </a:ext>
-            <a:ext uri="{91240B29-F687-4f45-9708-019B960494DF}">
+            <a:ext uri="{91240B29-F687-4F45-9708-019B960494DF}">
               <a14:hiddenLine xmlns:a14="http://schemas.microsoft.com/office/drawing/2010/main" w="9525">
                 <a:solidFill>
                   <a:srgbClr val="000000"/>
@@ -26798,7 +26833,7 @@
   <p:timing>
     <p:tnLst>
       <p:par>
-        <p:cTn xmlns:p14="http://schemas.microsoft.com/office/powerpoint/2010/main" id="1" dur="indefinite" restart="never" nodeType="tmRoot">
+        <p:cTn id="1" dur="indefinite" restart="never" nodeType="tmRoot">
           <p:childTnLst>
             <p:seq concurrent="1" nextAc="seek">
               <p:cTn id="2" dur="indefinite" nodeType="mainSeq">
@@ -26995,7 +27030,7 @@
             <a:tailEnd/>
           </a:ln>
           <a:extLst>
-            <a:ext uri="{909E8E84-426E-40dd-AFC4-6F175D3DCCD1}">
+            <a:ext uri="{909E8E84-426E-40DD-AFC4-6F175D3DCCD1}">
               <a14:hiddenFill xmlns:a14="http://schemas.microsoft.com/office/drawing/2010/main">
                 <a:solidFill>
                   <a:srgbClr val="FFFFFF"/>
@@ -27212,14 +27247,14 @@
             <a:noFill/>
           </a:ln>
           <a:extLst>
-            <a:ext uri="{909E8E84-426E-40dd-AFC4-6F175D3DCCD1}">
+            <a:ext uri="{909E8E84-426E-40DD-AFC4-6F175D3DCCD1}">
               <a14:hiddenFill xmlns:a14="http://schemas.microsoft.com/office/drawing/2010/main">
                 <a:solidFill>
                   <a:srgbClr val="FFFFFF"/>
                 </a:solidFill>
               </a14:hiddenFill>
             </a:ext>
-            <a:ext uri="{91240B29-F687-4f45-9708-019B960494DF}">
+            <a:ext uri="{91240B29-F687-4F45-9708-019B960494DF}">
               <a14:hiddenLine xmlns:a14="http://schemas.microsoft.com/office/drawing/2010/main" w="9525">
                 <a:solidFill>
                   <a:srgbClr val="000000"/>
@@ -27293,7 +27328,7 @@
   <p:timing>
     <p:tnLst>
       <p:par>
-        <p:cTn xmlns:p14="http://schemas.microsoft.com/office/powerpoint/2010/main" id="1" dur="indefinite" restart="never" nodeType="tmRoot">
+        <p:cTn id="1" dur="indefinite" restart="never" nodeType="tmRoot">
           <p:childTnLst>
             <p:seq concurrent="1" nextAc="seek">
               <p:cTn id="2" dur="indefinite" nodeType="mainSeq">
@@ -27640,14 +27675,14 @@
           </a:ln>
           <a:effectLst/>
           <a:extLst>
-            <a:ext uri="{909E8E84-426E-40dd-AFC4-6F175D3DCCD1}">
+            <a:ext uri="{909E8E84-426E-40DD-AFC4-6F175D3DCCD1}">
               <a14:hiddenFill xmlns:a14="http://schemas.microsoft.com/office/drawing/2010/main">
                 <a:solidFill>
                   <a:srgbClr val="FFFFFF"/>
                 </a:solidFill>
               </a14:hiddenFill>
             </a:ext>
-            <a:ext uri="{91240B29-F687-4f45-9708-019B960494DF}">
+            <a:ext uri="{91240B29-F687-4F45-9708-019B960494DF}">
               <a14:hiddenLine xmlns:a14="http://schemas.microsoft.com/office/drawing/2010/main" w="9525" cap="flat">
                 <a:solidFill>
                   <a:srgbClr val="808080"/>
@@ -27657,7 +27692,7 @@
                 <a:tailEnd/>
               </a14:hiddenLine>
             </a:ext>
-            <a:ext uri="{AF507438-7753-43e0-B8FC-AC1667EBCBE1}">
+            <a:ext uri="{AF507438-7753-43E0-B8FC-AC1667EBCBE1}">
               <a14:hiddenEffects xmlns:a14="http://schemas.microsoft.com/office/drawing/2010/main">
                 <a:effectLst>
                   <a:outerShdw blurRad="63500" dist="38099" dir="2700000" algn="ctr" rotWithShape="0">
@@ -27669,7 +27704,7 @@
               </a14:hiddenEffects>
             </a:ext>
             <a:ext uri="{FAA26D3D-D897-4be2-8F04-BA451C77F1D7}">
-              <ma14:placeholderFlag xmlns:ma14="http://schemas.microsoft.com/office/mac/drawingml/2011/main" val="1"/>
+              <ma14:placeholderFlag xmlns:ma14="http://schemas.microsoft.com/office/mac/drawingml/2011/main" xmlns="" val="1"/>
             </a:ext>
           </a:extLst>
         </p:spPr>
@@ -27936,7 +27971,7 @@
   <p:timing>
     <p:tnLst>
       <p:par>
-        <p:cTn xmlns:p14="http://schemas.microsoft.com/office/powerpoint/2010/main" id="1" dur="indefinite" restart="never" nodeType="tmRoot"/>
+        <p:cTn id="1" dur="indefinite" restart="never" nodeType="tmRoot"/>
       </p:par>
     </p:tnLst>
   </p:timing>
@@ -28173,14 +28208,14 @@
           </a:ln>
           <a:effectLst/>
           <a:extLst>
-            <a:ext uri="{909E8E84-426E-40dd-AFC4-6F175D3DCCD1}">
+            <a:ext uri="{909E8E84-426E-40DD-AFC4-6F175D3DCCD1}">
               <a14:hiddenFill xmlns:a14="http://schemas.microsoft.com/office/drawing/2010/main">
                 <a:solidFill>
                   <a:srgbClr val="FFFFFF"/>
                 </a:solidFill>
               </a14:hiddenFill>
             </a:ext>
-            <a:ext uri="{91240B29-F687-4f45-9708-019B960494DF}">
+            <a:ext uri="{91240B29-F687-4F45-9708-019B960494DF}">
               <a14:hiddenLine xmlns:a14="http://schemas.microsoft.com/office/drawing/2010/main" w="9525" cap="flat">
                 <a:solidFill>
                   <a:srgbClr val="808080"/>
@@ -28190,7 +28225,7 @@
                 <a:tailEnd/>
               </a14:hiddenLine>
             </a:ext>
-            <a:ext uri="{AF507438-7753-43e0-B8FC-AC1667EBCBE1}">
+            <a:ext uri="{AF507438-7753-43E0-B8FC-AC1667EBCBE1}">
               <a14:hiddenEffects xmlns:a14="http://schemas.microsoft.com/office/drawing/2010/main">
                 <a:effectLst>
                   <a:outerShdw blurRad="63500" dist="38099" dir="2700000" algn="ctr" rotWithShape="0">
@@ -28202,7 +28237,7 @@
               </a14:hiddenEffects>
             </a:ext>
             <a:ext uri="{FAA26D3D-D897-4be2-8F04-BA451C77F1D7}">
-              <ma14:placeholderFlag xmlns:ma14="http://schemas.microsoft.com/office/mac/drawingml/2011/main" val="1"/>
+              <ma14:placeholderFlag xmlns:ma14="http://schemas.microsoft.com/office/mac/drawingml/2011/main" xmlns="" val="1"/>
             </a:ext>
           </a:extLst>
         </p:spPr>
@@ -28469,7 +28504,7 @@
   <p:timing>
     <p:tnLst>
       <p:par>
-        <p:cTn xmlns:p14="http://schemas.microsoft.com/office/powerpoint/2010/main" id="1" dur="indefinite" restart="never" nodeType="tmRoot"/>
+        <p:cTn id="1" dur="indefinite" restart="never" nodeType="tmRoot"/>
       </p:par>
     </p:tnLst>
   </p:timing>
@@ -28594,7 +28629,7 @@
   <p:timing>
     <p:tnLst>
       <p:par>
-        <p:cTn xmlns:p14="http://schemas.microsoft.com/office/powerpoint/2010/main" id="1" dur="indefinite" restart="never" nodeType="tmRoot"/>
+        <p:cTn id="1" dur="indefinite" restart="never" nodeType="tmRoot"/>
       </p:par>
     </p:tnLst>
   </p:timing>
@@ -28828,14 +28863,14 @@
           </a:ln>
           <a:effectLst/>
           <a:extLst>
-            <a:ext uri="{909E8E84-426E-40dd-AFC4-6F175D3DCCD1}">
+            <a:ext uri="{909E8E84-426E-40DD-AFC4-6F175D3DCCD1}">
               <a14:hiddenFill xmlns:a14="http://schemas.microsoft.com/office/drawing/2010/main">
                 <a:solidFill>
                   <a:srgbClr val="FFFFFF"/>
                 </a:solidFill>
               </a14:hiddenFill>
             </a:ext>
-            <a:ext uri="{91240B29-F687-4f45-9708-019B960494DF}">
+            <a:ext uri="{91240B29-F687-4F45-9708-019B960494DF}">
               <a14:hiddenLine xmlns:a14="http://schemas.microsoft.com/office/drawing/2010/main" w="9525" cap="flat">
                 <a:solidFill>
                   <a:srgbClr val="808080"/>
@@ -28845,7 +28880,7 @@
                 <a:tailEnd/>
               </a14:hiddenLine>
             </a:ext>
-            <a:ext uri="{AF507438-7753-43e0-B8FC-AC1667EBCBE1}">
+            <a:ext uri="{AF507438-7753-43E0-B8FC-AC1667EBCBE1}">
               <a14:hiddenEffects xmlns:a14="http://schemas.microsoft.com/office/drawing/2010/main">
                 <a:effectLst>
                   <a:outerShdw blurRad="63500" dist="38099" dir="2700000" algn="ctr" rotWithShape="0">
@@ -28857,7 +28892,7 @@
               </a14:hiddenEffects>
             </a:ext>
             <a:ext uri="{FAA26D3D-D897-4be2-8F04-BA451C77F1D7}">
-              <ma14:placeholderFlag xmlns:ma14="http://schemas.microsoft.com/office/mac/drawingml/2011/main" val="1"/>
+              <ma14:placeholderFlag xmlns:ma14="http://schemas.microsoft.com/office/mac/drawingml/2011/main" xmlns="" val="1"/>
             </a:ext>
           </a:extLst>
         </p:spPr>
@@ -29137,7 +29172,7 @@
   <p:timing>
     <p:tnLst>
       <p:par>
-        <p:cTn xmlns:p14="http://schemas.microsoft.com/office/powerpoint/2010/main" id="1" dur="indefinite" restart="never" nodeType="tmRoot"/>
+        <p:cTn id="1" dur="indefinite" restart="never" nodeType="tmRoot"/>
       </p:par>
     </p:tnLst>
   </p:timing>
@@ -29323,7 +29358,7 @@
   <p:timing>
     <p:tnLst>
       <p:par>
-        <p:cTn xmlns:p14="http://schemas.microsoft.com/office/powerpoint/2010/main" id="1" dur="indefinite" restart="never" nodeType="tmRoot"/>
+        <p:cTn id="1" dur="indefinite" restart="never" nodeType="tmRoot"/>
       </p:par>
     </p:tnLst>
   </p:timing>
@@ -29573,14 +29608,14 @@
           </a:ln>
           <a:effectLst/>
           <a:extLst>
-            <a:ext uri="{909E8E84-426E-40dd-AFC4-6F175D3DCCD1}">
+            <a:ext uri="{909E8E84-426E-40DD-AFC4-6F175D3DCCD1}">
               <a14:hiddenFill xmlns:a14="http://schemas.microsoft.com/office/drawing/2010/main">
                 <a:solidFill>
                   <a:srgbClr val="FFFFFF"/>
                 </a:solidFill>
               </a14:hiddenFill>
             </a:ext>
-            <a:ext uri="{91240B29-F687-4f45-9708-019B960494DF}">
+            <a:ext uri="{91240B29-F687-4F45-9708-019B960494DF}">
               <a14:hiddenLine xmlns:a14="http://schemas.microsoft.com/office/drawing/2010/main" w="9525" cap="flat">
                 <a:solidFill>
                   <a:srgbClr val="808080"/>
@@ -29590,7 +29625,7 @@
                 <a:tailEnd/>
               </a14:hiddenLine>
             </a:ext>
-            <a:ext uri="{AF507438-7753-43e0-B8FC-AC1667EBCBE1}">
+            <a:ext uri="{AF507438-7753-43E0-B8FC-AC1667EBCBE1}">
               <a14:hiddenEffects xmlns:a14="http://schemas.microsoft.com/office/drawing/2010/main">
                 <a:effectLst>
                   <a:outerShdw blurRad="63500" dist="38099" dir="2700000" algn="ctr" rotWithShape="0">
@@ -29602,7 +29637,7 @@
               </a14:hiddenEffects>
             </a:ext>
             <a:ext uri="{FAA26D3D-D897-4be2-8F04-BA451C77F1D7}">
-              <ma14:placeholderFlag xmlns:ma14="http://schemas.microsoft.com/office/mac/drawingml/2011/main" val="1"/>
+              <ma14:placeholderFlag xmlns:ma14="http://schemas.microsoft.com/office/mac/drawingml/2011/main" xmlns="" val="1"/>
             </a:ext>
           </a:extLst>
         </p:spPr>
@@ -29865,7 +29900,7 @@
   <p:timing>
     <p:tnLst>
       <p:par>
-        <p:cTn xmlns:p14="http://schemas.microsoft.com/office/powerpoint/2010/main" id="1" dur="indefinite" restart="never" nodeType="tmRoot"/>
+        <p:cTn id="1" dur="indefinite" restart="never" nodeType="tmRoot"/>
       </p:par>
     </p:tnLst>
   </p:timing>
@@ -30213,14 +30248,14 @@
           </a:ln>
           <a:effectLst/>
           <a:extLst>
-            <a:ext uri="{909E8E84-426E-40dd-AFC4-6F175D3DCCD1}">
+            <a:ext uri="{909E8E84-426E-40DD-AFC4-6F175D3DCCD1}">
               <a14:hiddenFill xmlns:a14="http://schemas.microsoft.com/office/drawing/2010/main">
                 <a:solidFill>
                   <a:srgbClr val="FFFFFF"/>
                 </a:solidFill>
               </a14:hiddenFill>
             </a:ext>
-            <a:ext uri="{91240B29-F687-4f45-9708-019B960494DF}">
+            <a:ext uri="{91240B29-F687-4F45-9708-019B960494DF}">
               <a14:hiddenLine xmlns:a14="http://schemas.microsoft.com/office/drawing/2010/main" w="9525" cap="flat">
                 <a:solidFill>
                   <a:srgbClr val="808080"/>
@@ -30230,7 +30265,7 @@
                 <a:tailEnd/>
               </a14:hiddenLine>
             </a:ext>
-            <a:ext uri="{AF507438-7753-43e0-B8FC-AC1667EBCBE1}">
+            <a:ext uri="{AF507438-7753-43E0-B8FC-AC1667EBCBE1}">
               <a14:hiddenEffects xmlns:a14="http://schemas.microsoft.com/office/drawing/2010/main">
                 <a:effectLst>
                   <a:outerShdw blurRad="63500" dist="38099" dir="2700000" algn="ctr" rotWithShape="0">
@@ -30242,7 +30277,7 @@
               </a14:hiddenEffects>
             </a:ext>
             <a:ext uri="{FAA26D3D-D897-4be2-8F04-BA451C77F1D7}">
-              <ma14:placeholderFlag xmlns:ma14="http://schemas.microsoft.com/office/mac/drawingml/2011/main" val="1"/>
+              <ma14:placeholderFlag xmlns:ma14="http://schemas.microsoft.com/office/mac/drawingml/2011/main" xmlns="" val="1"/>
             </a:ext>
           </a:extLst>
         </p:spPr>
@@ -30505,7 +30540,7 @@
   <p:timing>
     <p:tnLst>
       <p:par>
-        <p:cTn xmlns:p14="http://schemas.microsoft.com/office/powerpoint/2010/main" id="1" dur="indefinite" restart="never" nodeType="tmRoot"/>
+        <p:cTn id="1" dur="indefinite" restart="never" nodeType="tmRoot"/>
       </p:par>
     </p:tnLst>
   </p:timing>
@@ -30771,14 +30806,14 @@
           </a:ln>
           <a:effectLst/>
           <a:extLst>
-            <a:ext uri="{909E8E84-426E-40dd-AFC4-6F175D3DCCD1}">
+            <a:ext uri="{909E8E84-426E-40DD-AFC4-6F175D3DCCD1}">
               <a14:hiddenFill xmlns:a14="http://schemas.microsoft.com/office/drawing/2010/main">
                 <a:solidFill>
                   <a:srgbClr val="FFFFFF"/>
                 </a:solidFill>
               </a14:hiddenFill>
             </a:ext>
-            <a:ext uri="{91240B29-F687-4f45-9708-019B960494DF}">
+            <a:ext uri="{91240B29-F687-4F45-9708-019B960494DF}">
               <a14:hiddenLine xmlns:a14="http://schemas.microsoft.com/office/drawing/2010/main" w="9525" cap="flat">
                 <a:solidFill>
                   <a:srgbClr val="808080"/>
@@ -30788,7 +30823,7 @@
                 <a:tailEnd/>
               </a14:hiddenLine>
             </a:ext>
-            <a:ext uri="{AF507438-7753-43e0-B8FC-AC1667EBCBE1}">
+            <a:ext uri="{AF507438-7753-43E0-B8FC-AC1667EBCBE1}">
               <a14:hiddenEffects xmlns:a14="http://schemas.microsoft.com/office/drawing/2010/main">
                 <a:effectLst>
                   <a:outerShdw blurRad="63500" dist="38099" dir="2700000" algn="ctr" rotWithShape="0">
@@ -30800,7 +30835,7 @@
               </a14:hiddenEffects>
             </a:ext>
             <a:ext uri="{FAA26D3D-D897-4be2-8F04-BA451C77F1D7}">
-              <ma14:placeholderFlag xmlns:ma14="http://schemas.microsoft.com/office/mac/drawingml/2011/main" val="1"/>
+              <ma14:placeholderFlag xmlns:ma14="http://schemas.microsoft.com/office/mac/drawingml/2011/main" xmlns="" val="1"/>
             </a:ext>
           </a:extLst>
         </p:spPr>
@@ -31063,7 +31098,7 @@
   <p:timing>
     <p:tnLst>
       <p:par>
-        <p:cTn xmlns:p14="http://schemas.microsoft.com/office/powerpoint/2010/main" id="1" dur="indefinite" restart="never" nodeType="tmRoot"/>
+        <p:cTn id="1" dur="indefinite" restart="never" nodeType="tmRoot"/>
       </p:par>
     </p:tnLst>
   </p:timing>
@@ -31411,14 +31446,14 @@
           </a:ln>
           <a:effectLst/>
           <a:extLst>
-            <a:ext uri="{909E8E84-426E-40dd-AFC4-6F175D3DCCD1}">
+            <a:ext uri="{909E8E84-426E-40DD-AFC4-6F175D3DCCD1}">
               <a14:hiddenFill xmlns:a14="http://schemas.microsoft.com/office/drawing/2010/main">
                 <a:solidFill>
                   <a:srgbClr val="FFFFFF"/>
                 </a:solidFill>
               </a14:hiddenFill>
             </a:ext>
-            <a:ext uri="{91240B29-F687-4f45-9708-019B960494DF}">
+            <a:ext uri="{91240B29-F687-4F45-9708-019B960494DF}">
               <a14:hiddenLine xmlns:a14="http://schemas.microsoft.com/office/drawing/2010/main" w="9525" cap="flat">
                 <a:solidFill>
                   <a:srgbClr val="808080"/>
@@ -31428,7 +31463,7 @@
                 <a:tailEnd/>
               </a14:hiddenLine>
             </a:ext>
-            <a:ext uri="{AF507438-7753-43e0-B8FC-AC1667EBCBE1}">
+            <a:ext uri="{AF507438-7753-43E0-B8FC-AC1667EBCBE1}">
               <a14:hiddenEffects xmlns:a14="http://schemas.microsoft.com/office/drawing/2010/main">
                 <a:effectLst>
                   <a:outerShdw blurRad="63500" dist="38099" dir="2700000" algn="ctr" rotWithShape="0">
@@ -31440,7 +31475,7 @@
               </a14:hiddenEffects>
             </a:ext>
             <a:ext uri="{FAA26D3D-D897-4be2-8F04-BA451C77F1D7}">
-              <ma14:placeholderFlag xmlns:ma14="http://schemas.microsoft.com/office/mac/drawingml/2011/main" val="1"/>
+              <ma14:placeholderFlag xmlns:ma14="http://schemas.microsoft.com/office/mac/drawingml/2011/main" xmlns="" val="1"/>
             </a:ext>
           </a:extLst>
         </p:spPr>
@@ -31703,7 +31738,7 @@
   <p:timing>
     <p:tnLst>
       <p:par>
-        <p:cTn xmlns:p14="http://schemas.microsoft.com/office/powerpoint/2010/main" id="1" dur="indefinite" restart="never" nodeType="tmRoot"/>
+        <p:cTn id="1" dur="indefinite" restart="never" nodeType="tmRoot"/>
       </p:par>
     </p:tnLst>
   </p:timing>
@@ -31915,14 +31950,14 @@
           </a:ln>
           <a:effectLst/>
           <a:extLst>
-            <a:ext uri="{909E8E84-426E-40dd-AFC4-6F175D3DCCD1}">
+            <a:ext uri="{909E8E84-426E-40DD-AFC4-6F175D3DCCD1}">
               <a14:hiddenFill xmlns:a14="http://schemas.microsoft.com/office/drawing/2010/main">
                 <a:solidFill>
                   <a:srgbClr val="FFFFFF"/>
                 </a:solidFill>
               </a14:hiddenFill>
             </a:ext>
-            <a:ext uri="{91240B29-F687-4f45-9708-019B960494DF}">
+            <a:ext uri="{91240B29-F687-4F45-9708-019B960494DF}">
               <a14:hiddenLine xmlns:a14="http://schemas.microsoft.com/office/drawing/2010/main" w="9525" cap="flat">
                 <a:solidFill>
                   <a:srgbClr val="808080"/>
@@ -31932,7 +31967,7 @@
                 <a:tailEnd/>
               </a14:hiddenLine>
             </a:ext>
-            <a:ext uri="{AF507438-7753-43e0-B8FC-AC1667EBCBE1}">
+            <a:ext uri="{AF507438-7753-43E0-B8FC-AC1667EBCBE1}">
               <a14:hiddenEffects xmlns:a14="http://schemas.microsoft.com/office/drawing/2010/main">
                 <a:effectLst>
                   <a:outerShdw blurRad="63500" dist="38099" dir="2700000" algn="ctr" rotWithShape="0">
@@ -31944,7 +31979,7 @@
               </a14:hiddenEffects>
             </a:ext>
             <a:ext uri="{FAA26D3D-D897-4be2-8F04-BA451C77F1D7}">
-              <ma14:placeholderFlag xmlns:ma14="http://schemas.microsoft.com/office/mac/drawingml/2011/main" val="1"/>
+              <ma14:placeholderFlag xmlns:ma14="http://schemas.microsoft.com/office/mac/drawingml/2011/main" xmlns="" val="1"/>
             </a:ext>
           </a:extLst>
         </p:spPr>
@@ -32207,7 +32242,7 @@
   <p:timing>
     <p:tnLst>
       <p:par>
-        <p:cTn xmlns:p14="http://schemas.microsoft.com/office/powerpoint/2010/main" id="1" dur="indefinite" restart="never" nodeType="tmRoot"/>
+        <p:cTn id="1" dur="indefinite" restart="never" nodeType="tmRoot"/>
       </p:par>
     </p:tnLst>
   </p:timing>
@@ -32253,7 +32288,7 @@
           <a:p>
             <a:r>
               <a:rPr lang="en-US" dirty="0" smtClean="0"/>
-              <a:t>Lab</a:t>
+              <a:t>VI. Lab #2</a:t>
             </a:r>
             <a:endParaRPr lang="en-US" dirty="0"/>
           </a:p>
@@ -32386,7 +32421,7 @@
   <p:timing>
     <p:tnLst>
       <p:par>
-        <p:cTn xmlns:p14="http://schemas.microsoft.com/office/powerpoint/2010/main" id="1" dur="indefinite" restart="never" nodeType="tmRoot"/>
+        <p:cTn id="1" dur="indefinite" restart="never" nodeType="tmRoot"/>
       </p:par>
     </p:tnLst>
   </p:timing>
@@ -32472,14 +32507,14 @@
             <p:ph idx="1"/>
             <p:extLst>
               <p:ext uri="{D42A27DB-BD31-4B8C-83A1-F6EECF244321}">
-                <p14:modId xmlns:p14="http://schemas.microsoft.com/office/powerpoint/2010/main" val="1356315510"/>
+                <p14:modId xmlns:p14="http://schemas.microsoft.com/office/powerpoint/2010/main" val="1051964682"/>
               </p:ext>
             </p:extLst>
           </p:nvPr>
         </p:nvGraphicFramePr>
         <p:xfrm>
           <a:off x="990604" y="1179830"/>
-          <a:ext cx="6172200" cy="3144520"/>
+          <a:ext cx="6172200" cy="2595880"/>
         </p:xfrm>
         <a:graphic>
           <a:graphicData uri="http://schemas.openxmlformats.org/drawingml/2006/table">
@@ -32498,6 +32533,14 @@
                     <a:p>
                       <a:r>
                         <a:rPr lang="en-US" sz="1500" dirty="0" smtClean="0"/>
+                        <a:t>I.</a:t>
+                      </a:r>
+                      <a:r>
+                        <a:rPr lang="en-US" sz="1500" baseline="0" dirty="0" smtClean="0"/>
+                        <a:t>  </a:t>
+                      </a:r>
+                      <a:r>
+                        <a:rPr lang="en-US" sz="1500" dirty="0" smtClean="0"/>
                         <a:t>Certification Overview</a:t>
                       </a:r>
                       <a:endParaRPr lang="en-US" sz="1500" dirty="0"/>
@@ -32512,9 +32555,12 @@
                     <a:bodyPr/>
                     <a:lstStyle/>
                     <a:p>
+                      <a:pPr>
+                        <a:buNone/>
+                      </a:pPr>
                       <a:r>
                         <a:rPr lang="en-US" sz="1500" dirty="0" smtClean="0"/>
-                        <a:t>Modules</a:t>
+                        <a:t>II. Modules</a:t>
                       </a:r>
                       <a:endParaRPr lang="en-US" sz="1500" dirty="0"/>
                     </a:p>
@@ -32547,8 +32593,9 @@
                       </a:pPr>
                       <a:r>
                         <a:rPr lang="en-US" sz="1500" dirty="0" smtClean="0"/>
-                        <a:t>Lab</a:t>
+                        <a:t>III. Lab #1</a:t>
                       </a:r>
+                      <a:endParaRPr lang="en-US" sz="1500" dirty="0" smtClean="0"/>
                     </a:p>
                   </a:txBody>
                   <a:tcPr/>
@@ -32562,15 +32609,19 @@
                     <a:p>
                       <a:r>
                         <a:rPr lang="en-US" sz="1500" dirty="0" smtClean="0"/>
+                        <a:t>IV.</a:t>
+                      </a:r>
+                      <a:r>
+                        <a:rPr lang="en-US" sz="1500" baseline="0" dirty="0" smtClean="0"/>
+                        <a:t> </a:t>
+                      </a:r>
+                      <a:r>
+                        <a:rPr lang="en-US" sz="1500" dirty="0" smtClean="0"/>
                         <a:t>Small</a:t>
                       </a:r>
                       <a:r>
                         <a:rPr lang="en-US" sz="1500" baseline="0" dirty="0" smtClean="0"/>
-                        <a:t> features: </a:t>
-                      </a:r>
-                      <a:r>
-                        <a:rPr lang="en-US" sz="1500" dirty="0" smtClean="0"/>
-                        <a:t>_, private methods, effectively final in try-with-resources</a:t>
+                        <a:t> features</a:t>
                       </a:r>
                       <a:endParaRPr lang="en-US" sz="1500" dirty="0"/>
                     </a:p>
@@ -32586,23 +32637,11 @@
                     <a:p>
                       <a:r>
                         <a:rPr lang="en-US" sz="1500" dirty="0" smtClean="0"/>
-                        <a:t>var</a:t>
+                        <a:t>V. Var/Stream</a:t>
                       </a:r>
-                      <a:endParaRPr lang="en-US" sz="1500" dirty="0"/>
-                    </a:p>
-                  </a:txBody>
-                  <a:tcPr/>
-                </a:tc>
-              </a:tr>
-              <a:tr h="370840">
-                <a:tc>
-                  <a:txBody>
-                    <a:bodyPr/>
-                    <a:lstStyle/>
-                    <a:p>
                       <a:r>
-                        <a:rPr lang="en-US" sz="1500" dirty="0" smtClean="0"/>
-                        <a:t>Streams changes</a:t>
+                        <a:rPr lang="en-US" sz="1500" baseline="0" dirty="0" smtClean="0"/>
+                        <a:t> Changes</a:t>
                       </a:r>
                       <a:endParaRPr lang="en-US" sz="1500" dirty="0"/>
                     </a:p>
@@ -32635,8 +32674,17 @@
                       </a:pPr>
                       <a:r>
                         <a:rPr lang="en-US" sz="1500" dirty="0" smtClean="0"/>
-                        <a:t>Lab</a:t>
+                        <a:t>VI.</a:t>
                       </a:r>
+                      <a:r>
+                        <a:rPr lang="en-US" sz="1500" baseline="0" dirty="0" smtClean="0"/>
+                        <a:t> </a:t>
+                      </a:r>
+                      <a:r>
+                        <a:rPr lang="en-US" sz="1500" dirty="0" smtClean="0"/>
+                        <a:t>Lab #2</a:t>
+                      </a:r>
+                      <a:endParaRPr lang="en-US" sz="1500" dirty="0" smtClean="0"/>
                     </a:p>
                   </a:txBody>
                   <a:tcPr/>
@@ -32667,7 +32715,11 @@
                       </a:pPr>
                       <a:r>
                         <a:rPr lang="en-US" sz="1500" dirty="0" smtClean="0"/>
-                        <a:t>Off to </a:t>
+                        <a:t>...then Off </a:t>
+                      </a:r>
+                      <a:r>
+                        <a:rPr lang="en-US" sz="1500" dirty="0" smtClean="0"/>
+                        <a:t>to </a:t>
                       </a:r>
                       <a:r>
                         <a:rPr lang="en-US" sz="1500" dirty="0" err="1" smtClean="0"/>
@@ -32675,8 +32727,13 @@
                       </a:r>
                       <a:r>
                         <a:rPr lang="en-US" sz="1500" dirty="0" smtClean="0"/>
-                        <a:t> @ Chase Center...</a:t>
+                        <a:t> @ Chase </a:t>
                       </a:r>
+                      <a:r>
+                        <a:rPr lang="en-US" sz="1500" dirty="0" smtClean="0"/>
+                        <a:t>Center!</a:t>
+                      </a:r>
+                      <a:endParaRPr lang="en-US" sz="1500" dirty="0" smtClean="0"/>
                     </a:p>
                   </a:txBody>
                   <a:tcPr/>
@@ -32699,7 +32756,7 @@
   <p:timing>
     <p:tnLst>
       <p:par>
-        <p:cTn xmlns:p14="http://schemas.microsoft.com/office/powerpoint/2010/main" id="1" dur="indefinite" restart="never" nodeType="tmRoot"/>
+        <p:cTn id="1" dur="indefinite" restart="never" nodeType="tmRoot"/>
       </p:par>
     </p:tnLst>
   </p:timing>
@@ -32740,7 +32797,7 @@
           <a:p>
             <a:r>
               <a:rPr lang="en-US" dirty="0" smtClean="0"/>
-              <a:t>Exam Overview</a:t>
+              <a:t>I. Certification Overview</a:t>
             </a:r>
             <a:endParaRPr lang="en-US" dirty="0"/>
           </a:p>
@@ -32840,7 +32897,7 @@
   <p:timing>
     <p:tnLst>
       <p:par>
-        <p:cTn xmlns:p14="http://schemas.microsoft.com/office/powerpoint/2010/main" id="1" dur="indefinite" restart="never" nodeType="tmRoot"/>
+        <p:cTn id="1" dur="indefinite" restart="never" nodeType="tmRoot"/>
       </p:par>
     </p:tnLst>
   </p:timing>
@@ -32997,7 +33054,7 @@
   <p:timing>
     <p:tnLst>
       <p:par>
-        <p:cTn xmlns:p14="http://schemas.microsoft.com/office/powerpoint/2010/main" id="1" dur="indefinite" restart="never" nodeType="tmRoot"/>
+        <p:cTn id="1" dur="indefinite" restart="never" nodeType="tmRoot"/>
       </p:par>
     </p:tnLst>
   </p:timing>
@@ -33249,7 +33306,7 @@
         </a:ln>
         <a:effectLst/>
         <a:extLst>
-          <a:ext uri="{AF507438-7753-43e0-B8FC-AC1667EBCBE1}">
+          <a:ext uri="{AF507438-7753-43E0-B8FC-AC1667EBCBE1}">
             <a14:hiddenEffects xmlns:a14="http://schemas.microsoft.com/office/drawing/2010/main">
               <a:effectLst>
                 <a:outerShdw blurRad="63500" dist="38099" dir="2700000" algn="ctr" rotWithShape="0">
@@ -33328,7 +33385,7 @@
         </a:ln>
         <a:effectLst/>
         <a:extLst>
-          <a:ext uri="{AF507438-7753-43e0-B8FC-AC1667EBCBE1}">
+          <a:ext uri="{AF507438-7753-43E0-B8FC-AC1667EBCBE1}">
             <a14:hiddenEffects xmlns:a14="http://schemas.microsoft.com/office/drawing/2010/main">
               <a:effectLst>
                 <a:outerShdw blurRad="63500" dist="38099" dir="2700000" algn="ctr" rotWithShape="0">

</xml_diff>

<commit_message>
Updates from Ken's comments
</commit_message>
<xml_diff>
--- a/2019-OracleCodeOne-HOL.pptx
+++ b/2019-OracleCodeOne-HOL.pptx
@@ -433,7 +433,7 @@
               <a:pPr>
                 <a:defRPr/>
               </a:pPr>
-              <a:t>9/6/2019</a:t>
+              <a:t>9/8/19</a:t>
             </a:fld>
             <a:endParaRPr lang="en-US"/>
           </a:p>
@@ -577,7 +577,7 @@
           </a:ln>
           <a:effectLst/>
           <a:extLst>
-            <a:ext uri="{91240B29-F687-4F45-9708-019B960494DF}">
+            <a:ext uri="{91240B29-F687-4f45-9708-019B960494DF}">
               <a14:hiddenLine xmlns:a14="http://schemas.microsoft.com/office/drawing/2010/main" w="9525" cap="flat">
                 <a:solidFill>
                   <a:srgbClr val="808080"/>
@@ -587,7 +587,7 @@
                 <a:tailEnd/>
               </a14:hiddenLine>
             </a:ext>
-            <a:ext uri="{AF507438-7753-43E0-B8FC-AC1667EBCBE1}">
+            <a:ext uri="{AF507438-7753-43e0-B8FC-AC1667EBCBE1}">
               <a14:hiddenEffects xmlns:a14="http://schemas.microsoft.com/office/drawing/2010/main">
                 <a:effectLst>
                   <a:outerShdw blurRad="63500" dist="38099" dir="2700000" algn="ctr" rotWithShape="0">
@@ -637,7 +637,7 @@
           </a:ln>
           <a:effectLst/>
           <a:extLst>
-            <a:ext uri="{91240B29-F687-4F45-9708-019B960494DF}">
+            <a:ext uri="{91240B29-F687-4f45-9708-019B960494DF}">
               <a14:hiddenLine xmlns:a14="http://schemas.microsoft.com/office/drawing/2010/main" w="9525" cap="flat">
                 <a:solidFill>
                   <a:srgbClr val="808080"/>
@@ -647,7 +647,7 @@
                 <a:tailEnd/>
               </a14:hiddenLine>
             </a:ext>
-            <a:ext uri="{AF507438-7753-43E0-B8FC-AC1667EBCBE1}">
+            <a:ext uri="{AF507438-7753-43e0-B8FC-AC1667EBCBE1}">
               <a14:hiddenEffects xmlns:a14="http://schemas.microsoft.com/office/drawing/2010/main">
                 <a:effectLst>
                   <a:outerShdw blurRad="63500" dist="38099" dir="2700000" algn="ctr" rotWithShape="0">
@@ -697,7 +697,7 @@
           </a:ln>
           <a:effectLst/>
           <a:extLst>
-            <a:ext uri="{91240B29-F687-4F45-9708-019B960494DF}">
+            <a:ext uri="{91240B29-F687-4f45-9708-019B960494DF}">
               <a14:hiddenLine xmlns:a14="http://schemas.microsoft.com/office/drawing/2010/main" w="9525" cap="flat">
                 <a:solidFill>
                   <a:srgbClr val="808080"/>
@@ -707,7 +707,7 @@
                 <a:tailEnd/>
               </a14:hiddenLine>
             </a:ext>
-            <a:ext uri="{AF507438-7753-43E0-B8FC-AC1667EBCBE1}">
+            <a:ext uri="{AF507438-7753-43e0-B8FC-AC1667EBCBE1}">
               <a14:hiddenEffects xmlns:a14="http://schemas.microsoft.com/office/drawing/2010/main">
                 <a:effectLst>
                   <a:outerShdw blurRad="63500" dist="38099" dir="2700000" algn="ctr" rotWithShape="0">
@@ -757,7 +757,7 @@
           </a:ln>
           <a:effectLst/>
           <a:extLst>
-            <a:ext uri="{91240B29-F687-4F45-9708-019B960494DF}">
+            <a:ext uri="{91240B29-F687-4f45-9708-019B960494DF}">
               <a14:hiddenLine xmlns:a14="http://schemas.microsoft.com/office/drawing/2010/main" w="9525" cap="flat">
                 <a:solidFill>
                   <a:srgbClr val="808080"/>
@@ -767,7 +767,7 @@
                 <a:tailEnd/>
               </a14:hiddenLine>
             </a:ext>
-            <a:ext uri="{AF507438-7753-43E0-B8FC-AC1667EBCBE1}">
+            <a:ext uri="{AF507438-7753-43e0-B8FC-AC1667EBCBE1}">
               <a14:hiddenEffects xmlns:a14="http://schemas.microsoft.com/office/drawing/2010/main">
                 <a:effectLst>
                   <a:outerShdw blurRad="63500" dist="38099" dir="2700000" algn="ctr" rotWithShape="0">
@@ -815,14 +815,14 @@
           </a:ln>
           <a:effectLst/>
           <a:extLst>
-            <a:ext uri="{909E8E84-426E-40DD-AFC4-6F175D3DCCD1}">
+            <a:ext uri="{909E8E84-426E-40dd-AFC4-6F175D3DCCD1}">
               <a14:hiddenFill xmlns:a14="http://schemas.microsoft.com/office/drawing/2010/main">
                 <a:solidFill>
                   <a:srgbClr val="FFFFFF"/>
                 </a:solidFill>
               </a14:hiddenFill>
             </a:ext>
-            <a:ext uri="{91240B29-F687-4F45-9708-019B960494DF}">
+            <a:ext uri="{91240B29-F687-4f45-9708-019B960494DF}">
               <a14:hiddenLine xmlns:a14="http://schemas.microsoft.com/office/drawing/2010/main" w="9525" cap="flat">
                 <a:solidFill>
                   <a:srgbClr val="808080"/>
@@ -832,7 +832,7 @@
                 <a:tailEnd/>
               </a14:hiddenLine>
             </a:ext>
-            <a:ext uri="{AF507438-7753-43E0-B8FC-AC1667EBCBE1}">
+            <a:ext uri="{AF507438-7753-43e0-B8FC-AC1667EBCBE1}">
               <a14:hiddenEffects xmlns:a14="http://schemas.microsoft.com/office/drawing/2010/main">
                 <a:effectLst>
                   <a:outerShdw blurRad="63500" dist="38099" dir="2700000" algn="ctr" rotWithShape="0">
@@ -844,7 +844,7 @@
               </a14:hiddenEffects>
             </a:ext>
             <a:ext uri="{FAA26D3D-D897-4be2-8F04-BA451C77F1D7}">
-              <ma14:placeholderFlag xmlns:ma14="http://schemas.microsoft.com/office/mac/drawingml/2011/main" xmlns="" val="1"/>
+              <ma14:placeholderFlag xmlns:ma14="http://schemas.microsoft.com/office/mac/drawingml/2011/main" val="1"/>
             </a:ext>
           </a:extLst>
         </p:spPr>
@@ -873,14 +873,14 @@
           </a:ln>
           <a:effectLst/>
           <a:extLst>
-            <a:ext uri="{909E8E84-426E-40DD-AFC4-6F175D3DCCD1}">
+            <a:ext uri="{909E8E84-426E-40dd-AFC4-6F175D3DCCD1}">
               <a14:hiddenFill xmlns:a14="http://schemas.microsoft.com/office/drawing/2010/main">
                 <a:solidFill>
                   <a:srgbClr val="FFFFFF"/>
                 </a:solidFill>
               </a14:hiddenFill>
             </a:ext>
-            <a:ext uri="{91240B29-F687-4F45-9708-019B960494DF}">
+            <a:ext uri="{91240B29-F687-4f45-9708-019B960494DF}">
               <a14:hiddenLine xmlns:a14="http://schemas.microsoft.com/office/drawing/2010/main" w="9525" cap="flat">
                 <a:solidFill>
                   <a:srgbClr val="808080"/>
@@ -890,7 +890,7 @@
                 <a:tailEnd/>
               </a14:hiddenLine>
             </a:ext>
-            <a:ext uri="{AF507438-7753-43E0-B8FC-AC1667EBCBE1}">
+            <a:ext uri="{AF507438-7753-43e0-B8FC-AC1667EBCBE1}">
               <a14:hiddenEffects xmlns:a14="http://schemas.microsoft.com/office/drawing/2010/main">
                 <a:effectLst>
                   <a:outerShdw blurRad="63500" dist="38099" dir="2700000" algn="ctr" rotWithShape="0">
@@ -902,7 +902,7 @@
               </a14:hiddenEffects>
             </a:ext>
             <a:ext uri="{FAA26D3D-D897-4be2-8F04-BA451C77F1D7}">
-              <ma14:placeholderFlag xmlns:ma14="http://schemas.microsoft.com/office/mac/drawingml/2011/main" xmlns="" val="1"/>
+              <ma14:placeholderFlag xmlns:ma14="http://schemas.microsoft.com/office/mac/drawingml/2011/main" val="1"/>
             </a:ext>
           </a:extLst>
         </p:spPr>
@@ -941,14 +941,14 @@
           </a:ln>
           <a:effectLst/>
           <a:extLst>
-            <a:ext uri="{909E8E84-426E-40DD-AFC4-6F175D3DCCD1}">
+            <a:ext uri="{909E8E84-426E-40dd-AFC4-6F175D3DCCD1}">
               <a14:hiddenFill xmlns:a14="http://schemas.microsoft.com/office/drawing/2010/main">
                 <a:solidFill>
                   <a:srgbClr val="FFFFFF"/>
                 </a:solidFill>
               </a14:hiddenFill>
             </a:ext>
-            <a:ext uri="{91240B29-F687-4F45-9708-019B960494DF}">
+            <a:ext uri="{91240B29-F687-4f45-9708-019B960494DF}">
               <a14:hiddenLine xmlns:a14="http://schemas.microsoft.com/office/drawing/2010/main" w="9525" cap="flat">
                 <a:solidFill>
                   <a:srgbClr val="808080"/>
@@ -958,7 +958,7 @@
                 <a:tailEnd/>
               </a14:hiddenLine>
             </a:ext>
-            <a:ext uri="{AF507438-7753-43E0-B8FC-AC1667EBCBE1}">
+            <a:ext uri="{AF507438-7753-43e0-B8FC-AC1667EBCBE1}">
               <a14:hiddenEffects xmlns:a14="http://schemas.microsoft.com/office/drawing/2010/main">
                 <a:effectLst>
                   <a:outerShdw blurRad="63500" dist="38099" dir="2700000" algn="ctr" rotWithShape="0">
@@ -1004,14 +1004,14 @@
           </a:ln>
           <a:effectLst/>
           <a:extLst>
-            <a:ext uri="{909E8E84-426E-40DD-AFC4-6F175D3DCCD1}">
+            <a:ext uri="{909E8E84-426E-40dd-AFC4-6F175D3DCCD1}">
               <a14:hiddenFill xmlns:a14="http://schemas.microsoft.com/office/drawing/2010/main">
                 <a:solidFill>
                   <a:srgbClr val="FFFFFF"/>
                 </a:solidFill>
               </a14:hiddenFill>
             </a:ext>
-            <a:ext uri="{91240B29-F687-4F45-9708-019B960494DF}">
+            <a:ext uri="{91240B29-F687-4f45-9708-019B960494DF}">
               <a14:hiddenLine xmlns:a14="http://schemas.microsoft.com/office/drawing/2010/main" w="9525" cap="flat">
                 <a:solidFill>
                   <a:srgbClr val="808080"/>
@@ -1021,7 +1021,7 @@
                 <a:tailEnd/>
               </a14:hiddenLine>
             </a:ext>
-            <a:ext uri="{AF507438-7753-43E0-B8FC-AC1667EBCBE1}">
+            <a:ext uri="{AF507438-7753-43e0-B8FC-AC1667EBCBE1}">
               <a14:hiddenEffects xmlns:a14="http://schemas.microsoft.com/office/drawing/2010/main">
                 <a:effectLst>
                   <a:outerShdw blurRad="63500" dist="38099" dir="2700000" algn="ctr" rotWithShape="0">
@@ -1067,14 +1067,14 @@
           </a:ln>
           <a:effectLst/>
           <a:extLst>
-            <a:ext uri="{909E8E84-426E-40DD-AFC4-6F175D3DCCD1}">
+            <a:ext uri="{909E8E84-426E-40dd-AFC4-6F175D3DCCD1}">
               <a14:hiddenFill xmlns:a14="http://schemas.microsoft.com/office/drawing/2010/main">
                 <a:solidFill>
                   <a:srgbClr val="FFFFFF"/>
                 </a:solidFill>
               </a14:hiddenFill>
             </a:ext>
-            <a:ext uri="{91240B29-F687-4F45-9708-019B960494DF}">
+            <a:ext uri="{91240B29-F687-4f45-9708-019B960494DF}">
               <a14:hiddenLine xmlns:a14="http://schemas.microsoft.com/office/drawing/2010/main" w="9525" cap="flat">
                 <a:solidFill>
                   <a:srgbClr val="808080"/>
@@ -1084,7 +1084,7 @@
                 <a:tailEnd/>
               </a14:hiddenLine>
             </a:ext>
-            <a:ext uri="{AF507438-7753-43E0-B8FC-AC1667EBCBE1}">
+            <a:ext uri="{AF507438-7753-43e0-B8FC-AC1667EBCBE1}">
               <a14:hiddenEffects xmlns:a14="http://schemas.microsoft.com/office/drawing/2010/main">
                 <a:effectLst>
                   <a:outerShdw blurRad="63500" dist="38099" dir="2700000" algn="ctr" rotWithShape="0">
@@ -1132,14 +1132,14 @@
           </a:ln>
           <a:effectLst/>
           <a:extLst>
-            <a:ext uri="{909E8E84-426E-40DD-AFC4-6F175D3DCCD1}">
+            <a:ext uri="{909E8E84-426E-40dd-AFC4-6F175D3DCCD1}">
               <a14:hiddenFill xmlns:a14="http://schemas.microsoft.com/office/drawing/2010/main">
                 <a:solidFill>
                   <a:srgbClr val="FFFFFF"/>
                 </a:solidFill>
               </a14:hiddenFill>
             </a:ext>
-            <a:ext uri="{91240B29-F687-4F45-9708-019B960494DF}">
+            <a:ext uri="{91240B29-F687-4f45-9708-019B960494DF}">
               <a14:hiddenLine xmlns:a14="http://schemas.microsoft.com/office/drawing/2010/main" w="9525" cap="flat">
                 <a:solidFill>
                   <a:srgbClr val="808080"/>
@@ -1149,7 +1149,7 @@
                 <a:tailEnd/>
               </a14:hiddenLine>
             </a:ext>
-            <a:ext uri="{AF507438-7753-43E0-B8FC-AC1667EBCBE1}">
+            <a:ext uri="{AF507438-7753-43e0-B8FC-AC1667EBCBE1}">
               <a14:hiddenEffects xmlns:a14="http://schemas.microsoft.com/office/drawing/2010/main">
                 <a:effectLst>
                   <a:outerShdw blurRad="63500" dist="38099" dir="2700000" algn="ctr" rotWithShape="0">
@@ -1161,7 +1161,7 @@
               </a14:hiddenEffects>
             </a:ext>
             <a:ext uri="{FAA26D3D-D897-4be2-8F04-BA451C77F1D7}">
-              <ma14:placeholderFlag xmlns:ma14="http://schemas.microsoft.com/office/mac/drawingml/2011/main" xmlns="" val="1"/>
+              <ma14:placeholderFlag xmlns:ma14="http://schemas.microsoft.com/office/mac/drawingml/2011/main" val="1"/>
             </a:ext>
           </a:extLst>
         </p:spPr>
@@ -7977,14 +7977,14 @@
           </a:ln>
           <a:effectLst/>
           <a:extLst>
-            <a:ext uri="{909E8E84-426E-40DD-AFC4-6F175D3DCCD1}">
+            <a:ext uri="{909E8E84-426E-40dd-AFC4-6F175D3DCCD1}">
               <a14:hiddenFill xmlns:a14="http://schemas.microsoft.com/office/drawing/2010/main">
                 <a:solidFill>
                   <a:srgbClr val="FFFFFF"/>
                 </a:solidFill>
               </a14:hiddenFill>
             </a:ext>
-            <a:ext uri="{91240B29-F687-4F45-9708-019B960494DF}">
+            <a:ext uri="{91240B29-F687-4f45-9708-019B960494DF}">
               <a14:hiddenLine xmlns:a14="http://schemas.microsoft.com/office/drawing/2010/main" w="9525" cap="flat">
                 <a:solidFill>
                   <a:srgbClr val="808080"/>
@@ -7994,7 +7994,7 @@
                 <a:tailEnd/>
               </a14:hiddenLine>
             </a:ext>
-            <a:ext uri="{AF507438-7753-43E0-B8FC-AC1667EBCBE1}">
+            <a:ext uri="{AF507438-7753-43e0-B8FC-AC1667EBCBE1}">
               <a14:hiddenEffects xmlns:a14="http://schemas.microsoft.com/office/drawing/2010/main">
                 <a:effectLst>
                   <a:outerShdw blurRad="63500" dist="38099" dir="2700000" algn="ctr" rotWithShape="0">
@@ -8006,7 +8006,7 @@
               </a14:hiddenEffects>
             </a:ext>
             <a:ext uri="{FAA26D3D-D897-4be2-8F04-BA451C77F1D7}">
-              <ma14:placeholderFlag xmlns:ma14="http://schemas.microsoft.com/office/mac/drawingml/2011/main" xmlns="" val="1"/>
+              <ma14:placeholderFlag xmlns:ma14="http://schemas.microsoft.com/office/mac/drawingml/2011/main" val="1"/>
             </a:ext>
           </a:extLst>
         </p:spPr>
@@ -8050,14 +8050,14 @@
           </a:ln>
           <a:effectLst/>
           <a:extLst>
-            <a:ext uri="{909E8E84-426E-40DD-AFC4-6F175D3DCCD1}">
+            <a:ext uri="{909E8E84-426E-40dd-AFC4-6F175D3DCCD1}">
               <a14:hiddenFill xmlns:a14="http://schemas.microsoft.com/office/drawing/2010/main">
                 <a:solidFill>
                   <a:srgbClr val="FFFFFF"/>
                 </a:solidFill>
               </a14:hiddenFill>
             </a:ext>
-            <a:ext uri="{91240B29-F687-4F45-9708-019B960494DF}">
+            <a:ext uri="{91240B29-F687-4f45-9708-019B960494DF}">
               <a14:hiddenLine xmlns:a14="http://schemas.microsoft.com/office/drawing/2010/main" w="9525" cap="flat">
                 <a:solidFill>
                   <a:srgbClr val="808080"/>
@@ -8067,7 +8067,7 @@
                 <a:tailEnd/>
               </a14:hiddenLine>
             </a:ext>
-            <a:ext uri="{AF507438-7753-43E0-B8FC-AC1667EBCBE1}">
+            <a:ext uri="{AF507438-7753-43e0-B8FC-AC1667EBCBE1}">
               <a14:hiddenEffects xmlns:a14="http://schemas.microsoft.com/office/drawing/2010/main">
                 <a:effectLst>
                   <a:outerShdw blurRad="63500" dist="38099" dir="2700000" algn="ctr" rotWithShape="0">
@@ -8079,7 +8079,7 @@
               </a14:hiddenEffects>
             </a:ext>
             <a:ext uri="{FAA26D3D-D897-4be2-8F04-BA451C77F1D7}">
-              <ma14:placeholderFlag xmlns:ma14="http://schemas.microsoft.com/office/mac/drawingml/2011/main" xmlns="" val="1"/>
+              <ma14:placeholderFlag xmlns:ma14="http://schemas.microsoft.com/office/mac/drawingml/2011/main" val="1"/>
             </a:ext>
           </a:extLst>
         </p:spPr>
@@ -8177,14 +8177,14 @@
           </a:ln>
           <a:effectLst/>
           <a:extLst>
-            <a:ext uri="{909E8E84-426E-40DD-AFC4-6F175D3DCCD1}">
+            <a:ext uri="{909E8E84-426E-40dd-AFC4-6F175D3DCCD1}">
               <a14:hiddenFill xmlns:a14="http://schemas.microsoft.com/office/drawing/2010/main">
                 <a:solidFill>
                   <a:srgbClr val="FFFFFF"/>
                 </a:solidFill>
               </a14:hiddenFill>
             </a:ext>
-            <a:ext uri="{91240B29-F687-4F45-9708-019B960494DF}">
+            <a:ext uri="{91240B29-F687-4f45-9708-019B960494DF}">
               <a14:hiddenLine xmlns:a14="http://schemas.microsoft.com/office/drawing/2010/main" w="9525" cap="flat">
                 <a:solidFill>
                   <a:srgbClr val="808080"/>
@@ -8194,7 +8194,7 @@
                 <a:tailEnd/>
               </a14:hiddenLine>
             </a:ext>
-            <a:ext uri="{AF507438-7753-43E0-B8FC-AC1667EBCBE1}">
+            <a:ext uri="{AF507438-7753-43e0-B8FC-AC1667EBCBE1}">
               <a14:hiddenEffects xmlns:a14="http://schemas.microsoft.com/office/drawing/2010/main">
                 <a:effectLst>
                   <a:outerShdw blurRad="63500" dist="38099" dir="2700000" algn="ctr" rotWithShape="0">
@@ -8240,14 +8240,14 @@
           </a:ln>
           <a:effectLst/>
           <a:extLst>
-            <a:ext uri="{909E8E84-426E-40DD-AFC4-6F175D3DCCD1}">
+            <a:ext uri="{909E8E84-426E-40dd-AFC4-6F175D3DCCD1}">
               <a14:hiddenFill xmlns:a14="http://schemas.microsoft.com/office/drawing/2010/main">
                 <a:solidFill>
                   <a:srgbClr val="FFFFFF"/>
                 </a:solidFill>
               </a14:hiddenFill>
             </a:ext>
-            <a:ext uri="{91240B29-F687-4F45-9708-019B960494DF}">
+            <a:ext uri="{91240B29-F687-4f45-9708-019B960494DF}">
               <a14:hiddenLine xmlns:a14="http://schemas.microsoft.com/office/drawing/2010/main" w="9525" cap="flat">
                 <a:solidFill>
                   <a:srgbClr val="808080"/>
@@ -8257,7 +8257,7 @@
                 <a:tailEnd/>
               </a14:hiddenLine>
             </a:ext>
-            <a:ext uri="{AF507438-7753-43E0-B8FC-AC1667EBCBE1}">
+            <a:ext uri="{AF507438-7753-43e0-B8FC-AC1667EBCBE1}">
               <a14:hiddenEffects xmlns:a14="http://schemas.microsoft.com/office/drawing/2010/main">
                 <a:effectLst>
                   <a:outerShdw blurRad="63500" dist="38099" dir="2700000" algn="ctr" rotWithShape="0">
@@ -8305,14 +8305,14 @@
           </a:ln>
           <a:effectLst/>
           <a:extLst>
-            <a:ext uri="{909E8E84-426E-40DD-AFC4-6F175D3DCCD1}">
+            <a:ext uri="{909E8E84-426E-40dd-AFC4-6F175D3DCCD1}">
               <a14:hiddenFill xmlns:a14="http://schemas.microsoft.com/office/drawing/2010/main">
                 <a:solidFill>
                   <a:srgbClr val="FFFFFF"/>
                 </a:solidFill>
               </a14:hiddenFill>
             </a:ext>
-            <a:ext uri="{91240B29-F687-4F45-9708-019B960494DF}">
+            <a:ext uri="{91240B29-F687-4f45-9708-019B960494DF}">
               <a14:hiddenLine xmlns:a14="http://schemas.microsoft.com/office/drawing/2010/main" w="9525" cap="flat">
                 <a:solidFill>
                   <a:srgbClr val="808080"/>
@@ -8322,7 +8322,7 @@
                 <a:tailEnd/>
               </a14:hiddenLine>
             </a:ext>
-            <a:ext uri="{AF507438-7753-43E0-B8FC-AC1667EBCBE1}">
+            <a:ext uri="{AF507438-7753-43e0-B8FC-AC1667EBCBE1}">
               <a14:hiddenEffects xmlns:a14="http://schemas.microsoft.com/office/drawing/2010/main">
                 <a:effectLst>
                   <a:outerShdw blurRad="63500" dist="38099" dir="2700000" algn="ctr" rotWithShape="0">
@@ -8334,7 +8334,7 @@
               </a14:hiddenEffects>
             </a:ext>
             <a:ext uri="{FAA26D3D-D897-4be2-8F04-BA451C77F1D7}">
-              <ma14:placeholderFlag xmlns:ma14="http://schemas.microsoft.com/office/mac/drawingml/2011/main" xmlns="" val="1"/>
+              <ma14:placeholderFlag xmlns:ma14="http://schemas.microsoft.com/office/mac/drawingml/2011/main" val="1"/>
             </a:ext>
           </a:extLst>
         </p:spPr>
@@ -8403,7 +8403,7 @@
           <a:effectLst/>
           <a:extLst>
             <a:ext uri="{FAA26D3D-D897-4be2-8F04-BA451C77F1D7}">
-              <ma14:placeholderFlag xmlns:ma14="http://schemas.microsoft.com/office/mac/drawingml/2011/main" xmlns="" val="1"/>
+              <ma14:placeholderFlag xmlns:ma14="http://schemas.microsoft.com/office/mac/drawingml/2011/main" val="1"/>
             </a:ext>
           </a:extLst>
         </p:spPr>
@@ -9307,14 +9307,14 @@
           </a:ln>
           <a:effectLst/>
           <a:extLst>
-            <a:ext uri="{909E8E84-426E-40DD-AFC4-6F175D3DCCD1}">
+            <a:ext uri="{909E8E84-426E-40dd-AFC4-6F175D3DCCD1}">
               <a14:hiddenFill xmlns:a14="http://schemas.microsoft.com/office/drawing/2010/main">
                 <a:solidFill>
                   <a:srgbClr val="FFFFFF"/>
                 </a:solidFill>
               </a14:hiddenFill>
             </a:ext>
-            <a:ext uri="{91240B29-F687-4F45-9708-019B960494DF}">
+            <a:ext uri="{91240B29-F687-4f45-9708-019B960494DF}">
               <a14:hiddenLine xmlns:a14="http://schemas.microsoft.com/office/drawing/2010/main" w="9525" cap="flat">
                 <a:solidFill>
                   <a:srgbClr val="808080"/>
@@ -9324,7 +9324,7 @@
                 <a:tailEnd/>
               </a14:hiddenLine>
             </a:ext>
-            <a:ext uri="{AF507438-7753-43E0-B8FC-AC1667EBCBE1}">
+            <a:ext uri="{AF507438-7753-43e0-B8FC-AC1667EBCBE1}">
               <a14:hiddenEffects xmlns:a14="http://schemas.microsoft.com/office/drawing/2010/main">
                 <a:effectLst>
                   <a:outerShdw blurRad="63500" dist="38099" dir="2700000" algn="ctr" rotWithShape="0">
@@ -9336,7 +9336,7 @@
               </a14:hiddenEffects>
             </a:ext>
             <a:ext uri="{FAA26D3D-D897-4be2-8F04-BA451C77F1D7}">
-              <ma14:placeholderFlag xmlns:ma14="http://schemas.microsoft.com/office/mac/drawingml/2011/main" xmlns="" val="1"/>
+              <ma14:placeholderFlag xmlns:ma14="http://schemas.microsoft.com/office/mac/drawingml/2011/main" val="1"/>
             </a:ext>
           </a:extLst>
         </p:spPr>
@@ -9620,7 +9620,7 @@
   <p:timing>
     <p:tnLst>
       <p:par>
-        <p:cTn id="1" dur="indefinite" restart="never" nodeType="tmRoot"/>
+        <p:cTn xmlns:p14="http://schemas.microsoft.com/office/powerpoint/2010/main" id="1" dur="indefinite" restart="never" nodeType="tmRoot"/>
       </p:par>
     </p:tnLst>
   </p:timing>
@@ -9727,7 +9727,7 @@
           </a:prstGeom>
           <a:noFill/>
           <a:extLst>
-            <a:ext uri="{909E8E84-426E-40DD-AFC4-6F175D3DCCD1}">
+            <a:ext uri="{909E8E84-426E-40dd-AFC4-6F175D3DCCD1}">
               <a14:hiddenFill xmlns:a14="http://schemas.microsoft.com/office/drawing/2010/main">
                 <a:solidFill>
                   <a:srgbClr val="FFFFFF"/>
@@ -9750,7 +9750,7 @@
   <p:timing>
     <p:tnLst>
       <p:par>
-        <p:cTn id="1" dur="indefinite" restart="never" nodeType="tmRoot"/>
+        <p:cTn xmlns:p14="http://schemas.microsoft.com/office/powerpoint/2010/main" id="1" dur="indefinite" restart="never" nodeType="tmRoot"/>
       </p:par>
     </p:tnLst>
   </p:timing>
@@ -10594,7 +10594,7 @@
         </p:nvGraphicFramePr>
         <p:xfrm>
           <a:off x="838200" y="1276350"/>
-          <a:ext cx="7504114" cy="2926080"/>
+          <a:ext cx="7504114" cy="2926079"/>
         </p:xfrm>
         <a:graphic>
           <a:graphicData uri="http://schemas.openxmlformats.org/drawingml/2006/table">
@@ -10886,7 +10886,7 @@
   <p:timing>
     <p:tnLst>
       <p:par>
-        <p:cTn id="1" dur="indefinite" restart="never" nodeType="tmRoot"/>
+        <p:cTn xmlns:p14="http://schemas.microsoft.com/office/powerpoint/2010/main" id="1" dur="indefinite" restart="never" nodeType="tmRoot"/>
       </p:par>
     </p:tnLst>
   </p:timing>
@@ -10990,7 +10990,7 @@
           </a:ln>
           <a:effectLst/>
           <a:extLst>
-            <a:ext uri="{AF507438-7753-43E0-B8FC-AC1667EBCBE1}">
+            <a:ext uri="{AF507438-7753-43e0-B8FC-AC1667EBCBE1}">
               <a14:hiddenEffects xmlns:a14="http://schemas.microsoft.com/office/drawing/2010/main">
                 <a:effectLst>
                   <a:outerShdw blurRad="63500" dist="38099" dir="2700000" algn="ctr" rotWithShape="0">
@@ -11506,7 +11506,7 @@
           </a:ln>
           <a:effectLst/>
           <a:extLst>
-            <a:ext uri="{AF507438-7753-43E0-B8FC-AC1667EBCBE1}">
+            <a:ext uri="{AF507438-7753-43e0-B8FC-AC1667EBCBE1}">
               <a14:hiddenEffects xmlns:a14="http://schemas.microsoft.com/office/drawing/2010/main">
                 <a:effectLst>
                   <a:outerShdw blurRad="63500" dist="38099" dir="2700000" algn="ctr" rotWithShape="0">
@@ -11533,7 +11533,7 @@
   <p:timing>
     <p:tnLst>
       <p:par>
-        <p:cTn id="1" dur="indefinite" restart="never" nodeType="tmRoot"/>
+        <p:cTn xmlns:p14="http://schemas.microsoft.com/office/powerpoint/2010/main" id="1" dur="indefinite" restart="never" nodeType="tmRoot"/>
       </p:par>
     </p:tnLst>
   </p:timing>
@@ -11709,7 +11709,7 @@
   <p:timing>
     <p:tnLst>
       <p:par>
-        <p:cTn id="1" dur="indefinite" restart="never" nodeType="tmRoot"/>
+        <p:cTn xmlns:p14="http://schemas.microsoft.com/office/powerpoint/2010/main" id="1" dur="indefinite" restart="never" nodeType="tmRoot"/>
       </p:par>
     </p:tnLst>
   </p:timing>
@@ -12043,7 +12043,7 @@
   <p:timing>
     <p:tnLst>
       <p:par>
-        <p:cTn id="1" dur="indefinite" restart="never" nodeType="tmRoot"/>
+        <p:cTn xmlns:p14="http://schemas.microsoft.com/office/powerpoint/2010/main" id="1" dur="indefinite" restart="never" nodeType="tmRoot"/>
       </p:par>
     </p:tnLst>
   </p:timing>
@@ -12203,7 +12203,7 @@
   <p:timing>
     <p:tnLst>
       <p:par>
-        <p:cTn id="1" dur="indefinite" restart="never" nodeType="tmRoot"/>
+        <p:cTn xmlns:p14="http://schemas.microsoft.com/office/powerpoint/2010/main" id="1" dur="indefinite" restart="never" nodeType="tmRoot"/>
       </p:par>
     </p:tnLst>
   </p:timing>
@@ -12532,7 +12532,7 @@
   <p:timing>
     <p:tnLst>
       <p:par>
-        <p:cTn id="1" dur="indefinite" restart="never" nodeType="tmRoot"/>
+        <p:cTn xmlns:p14="http://schemas.microsoft.com/office/powerpoint/2010/main" id="1" dur="indefinite" restart="never" nodeType="tmRoot"/>
       </p:par>
     </p:tnLst>
   </p:timing>
@@ -12664,7 +12664,7 @@
   <p:timing>
     <p:tnLst>
       <p:par>
-        <p:cTn id="1" dur="indefinite" restart="never" nodeType="tmRoot"/>
+        <p:cTn xmlns:p14="http://schemas.microsoft.com/office/powerpoint/2010/main" id="1" dur="indefinite" restart="never" nodeType="tmRoot"/>
       </p:par>
     </p:tnLst>
   </p:timing>
@@ -12819,7 +12819,7 @@
   <p:timing>
     <p:tnLst>
       <p:par>
-        <p:cTn id="1" dur="indefinite" restart="never" nodeType="tmRoot"/>
+        <p:cTn xmlns:p14="http://schemas.microsoft.com/office/powerpoint/2010/main" id="1" dur="indefinite" restart="never" nodeType="tmRoot"/>
       </p:par>
     </p:tnLst>
   </p:timing>
@@ -12896,25 +12896,8 @@
           <a:p>
             <a:r>
               <a:rPr lang="en-US" dirty="0" smtClean="0"/>
-              <a:t>Given a module, which command </a:t>
-            </a:r>
-            <a:r>
-              <a:rPr lang="en-US" dirty="0" smtClean="0"/>
-              <a:t>allows </a:t>
-            </a:r>
-            <a:r>
-              <a:rPr lang="en-US" dirty="0" smtClean="0"/>
-              <a:t>other modules to </a:t>
-            </a:r>
-            <a:r>
-              <a:rPr lang="en-US" dirty="0" smtClean="0"/>
-              <a:t>access a </a:t>
-            </a:r>
-            <a:r>
-              <a:rPr lang="en-US" dirty="0" smtClean="0"/>
-              <a:t>package it defines?</a:t>
-            </a:r>
-            <a:endParaRPr lang="en-US" dirty="0" smtClean="0"/>
+              <a:t>Given a module, which command allows other modules to access a package it defines?</a:t>
+            </a:r>
           </a:p>
           <a:p>
             <a:pPr marL="514100" indent="-514100">
@@ -13041,14 +13024,14 @@
           </a:ln>
           <a:effectLst/>
           <a:extLst>
-            <a:ext uri="{909E8E84-426E-40DD-AFC4-6F175D3DCCD1}">
+            <a:ext uri="{909E8E84-426E-40dd-AFC4-6F175D3DCCD1}">
               <a14:hiddenFill xmlns:a14="http://schemas.microsoft.com/office/drawing/2010/main">
                 <a:solidFill>
                   <a:srgbClr val="FFFFFF"/>
                 </a:solidFill>
               </a14:hiddenFill>
             </a:ext>
-            <a:ext uri="{91240B29-F687-4F45-9708-019B960494DF}">
+            <a:ext uri="{91240B29-F687-4f45-9708-019B960494DF}">
               <a14:hiddenLine xmlns:a14="http://schemas.microsoft.com/office/drawing/2010/main" w="9525" cap="flat">
                 <a:solidFill>
                   <a:srgbClr val="808080"/>
@@ -13058,7 +13041,7 @@
                 <a:tailEnd/>
               </a14:hiddenLine>
             </a:ext>
-            <a:ext uri="{AF507438-7753-43E0-B8FC-AC1667EBCBE1}">
+            <a:ext uri="{AF507438-7753-43e0-B8FC-AC1667EBCBE1}">
               <a14:hiddenEffects xmlns:a14="http://schemas.microsoft.com/office/drawing/2010/main">
                 <a:effectLst>
                   <a:outerShdw blurRad="63500" dist="38099" dir="2700000" algn="ctr" rotWithShape="0">
@@ -13070,7 +13053,7 @@
               </a14:hiddenEffects>
             </a:ext>
             <a:ext uri="{FAA26D3D-D897-4be2-8F04-BA451C77F1D7}">
-              <ma14:placeholderFlag xmlns:ma14="http://schemas.microsoft.com/office/mac/drawingml/2011/main" xmlns="" val="1"/>
+              <ma14:placeholderFlag xmlns:ma14="http://schemas.microsoft.com/office/mac/drawingml/2011/main" val="1"/>
             </a:ext>
           </a:extLst>
         </p:spPr>
@@ -13320,7 +13303,7 @@
   <p:timing>
     <p:tnLst>
       <p:par>
-        <p:cTn id="1" dur="indefinite" restart="never" nodeType="tmRoot"/>
+        <p:cTn xmlns:p14="http://schemas.microsoft.com/office/powerpoint/2010/main" id="1" dur="indefinite" restart="never" nodeType="tmRoot"/>
       </p:par>
     </p:tnLst>
   </p:timing>
@@ -13522,14 +13505,14 @@
           </a:ln>
           <a:effectLst/>
           <a:extLst>
-            <a:ext uri="{909E8E84-426E-40DD-AFC4-6F175D3DCCD1}">
+            <a:ext uri="{909E8E84-426E-40dd-AFC4-6F175D3DCCD1}">
               <a14:hiddenFill xmlns:a14="http://schemas.microsoft.com/office/drawing/2010/main">
                 <a:solidFill>
                   <a:srgbClr val="FFFFFF"/>
                 </a:solidFill>
               </a14:hiddenFill>
             </a:ext>
-            <a:ext uri="{91240B29-F687-4F45-9708-019B960494DF}">
+            <a:ext uri="{91240B29-F687-4f45-9708-019B960494DF}">
               <a14:hiddenLine xmlns:a14="http://schemas.microsoft.com/office/drawing/2010/main" w="9525" cap="flat">
                 <a:solidFill>
                   <a:srgbClr val="808080"/>
@@ -13539,7 +13522,7 @@
                 <a:tailEnd/>
               </a14:hiddenLine>
             </a:ext>
-            <a:ext uri="{AF507438-7753-43E0-B8FC-AC1667EBCBE1}">
+            <a:ext uri="{AF507438-7753-43e0-B8FC-AC1667EBCBE1}">
               <a14:hiddenEffects xmlns:a14="http://schemas.microsoft.com/office/drawing/2010/main">
                 <a:effectLst>
                   <a:outerShdw blurRad="63500" dist="38099" dir="2700000" algn="ctr" rotWithShape="0">
@@ -13551,7 +13534,7 @@
               </a14:hiddenEffects>
             </a:ext>
             <a:ext uri="{FAA26D3D-D897-4be2-8F04-BA451C77F1D7}">
-              <ma14:placeholderFlag xmlns:ma14="http://schemas.microsoft.com/office/mac/drawingml/2011/main" xmlns="" val="1"/>
+              <ma14:placeholderFlag xmlns:ma14="http://schemas.microsoft.com/office/mac/drawingml/2011/main" val="1"/>
             </a:ext>
           </a:extLst>
         </p:spPr>
@@ -13801,7 +13784,7 @@
   <p:timing>
     <p:tnLst>
       <p:par>
-        <p:cTn id="1" dur="indefinite" restart="never" nodeType="tmRoot"/>
+        <p:cTn xmlns:p14="http://schemas.microsoft.com/office/powerpoint/2010/main" id="1" dur="indefinite" restart="never" nodeType="tmRoot"/>
       </p:par>
     </p:tnLst>
   </p:timing>
@@ -14006,14 +13989,14 @@
           </a:ln>
           <a:effectLst/>
           <a:extLst>
-            <a:ext uri="{909E8E84-426E-40DD-AFC4-6F175D3DCCD1}">
+            <a:ext uri="{909E8E84-426E-40dd-AFC4-6F175D3DCCD1}">
               <a14:hiddenFill xmlns:a14="http://schemas.microsoft.com/office/drawing/2010/main">
                 <a:solidFill>
                   <a:srgbClr val="FFFFFF"/>
                 </a:solidFill>
               </a14:hiddenFill>
             </a:ext>
-            <a:ext uri="{91240B29-F687-4F45-9708-019B960494DF}">
+            <a:ext uri="{91240B29-F687-4f45-9708-019B960494DF}">
               <a14:hiddenLine xmlns:a14="http://schemas.microsoft.com/office/drawing/2010/main" w="9525" cap="flat">
                 <a:solidFill>
                   <a:srgbClr val="808080"/>
@@ -14023,7 +14006,7 @@
                 <a:tailEnd/>
               </a14:hiddenLine>
             </a:ext>
-            <a:ext uri="{AF507438-7753-43E0-B8FC-AC1667EBCBE1}">
+            <a:ext uri="{AF507438-7753-43e0-B8FC-AC1667EBCBE1}">
               <a14:hiddenEffects xmlns:a14="http://schemas.microsoft.com/office/drawing/2010/main">
                 <a:effectLst>
                   <a:outerShdw blurRad="63500" dist="38099" dir="2700000" algn="ctr" rotWithShape="0">
@@ -14035,7 +14018,7 @@
               </a14:hiddenEffects>
             </a:ext>
             <a:ext uri="{FAA26D3D-D897-4be2-8F04-BA451C77F1D7}">
-              <ma14:placeholderFlag xmlns:ma14="http://schemas.microsoft.com/office/mac/drawingml/2011/main" xmlns="" val="1"/>
+              <ma14:placeholderFlag xmlns:ma14="http://schemas.microsoft.com/office/mac/drawingml/2011/main" val="1"/>
             </a:ext>
           </a:extLst>
         </p:spPr>
@@ -14285,7 +14268,7 @@
   <p:timing>
     <p:tnLst>
       <p:par>
-        <p:cTn id="1" dur="indefinite" restart="never" nodeType="tmRoot"/>
+        <p:cTn xmlns:p14="http://schemas.microsoft.com/office/powerpoint/2010/main" id="1" dur="indefinite" restart="never" nodeType="tmRoot"/>
       </p:par>
     </p:tnLst>
   </p:timing>
@@ -14483,14 +14466,14 @@
           </a:ln>
           <a:effectLst/>
           <a:extLst>
-            <a:ext uri="{909E8E84-426E-40DD-AFC4-6F175D3DCCD1}">
+            <a:ext uri="{909E8E84-426E-40dd-AFC4-6F175D3DCCD1}">
               <a14:hiddenFill xmlns:a14="http://schemas.microsoft.com/office/drawing/2010/main">
                 <a:solidFill>
                   <a:srgbClr val="FFFFFF"/>
                 </a:solidFill>
               </a14:hiddenFill>
             </a:ext>
-            <a:ext uri="{91240B29-F687-4F45-9708-019B960494DF}">
+            <a:ext uri="{91240B29-F687-4f45-9708-019B960494DF}">
               <a14:hiddenLine xmlns:a14="http://schemas.microsoft.com/office/drawing/2010/main" w="9525" cap="flat">
                 <a:solidFill>
                   <a:srgbClr val="808080"/>
@@ -14500,7 +14483,7 @@
                 <a:tailEnd/>
               </a14:hiddenLine>
             </a:ext>
-            <a:ext uri="{AF507438-7753-43E0-B8FC-AC1667EBCBE1}">
+            <a:ext uri="{AF507438-7753-43e0-B8FC-AC1667EBCBE1}">
               <a14:hiddenEffects xmlns:a14="http://schemas.microsoft.com/office/drawing/2010/main">
                 <a:effectLst>
                   <a:outerShdw blurRad="63500" dist="38099" dir="2700000" algn="ctr" rotWithShape="0">
@@ -14512,7 +14495,7 @@
               </a14:hiddenEffects>
             </a:ext>
             <a:ext uri="{FAA26D3D-D897-4be2-8F04-BA451C77F1D7}">
-              <ma14:placeholderFlag xmlns:ma14="http://schemas.microsoft.com/office/mac/drawingml/2011/main" xmlns="" val="1"/>
+              <ma14:placeholderFlag xmlns:ma14="http://schemas.microsoft.com/office/mac/drawingml/2011/main" val="1"/>
             </a:ext>
           </a:extLst>
         </p:spPr>
@@ -14762,7 +14745,7 @@
   <p:timing>
     <p:tnLst>
       <p:par>
-        <p:cTn id="1" dur="indefinite" restart="never" nodeType="tmRoot"/>
+        <p:cTn xmlns:p14="http://schemas.microsoft.com/office/powerpoint/2010/main" id="1" dur="indefinite" restart="never" nodeType="tmRoot"/>
       </p:par>
     </p:tnLst>
   </p:timing>
@@ -14844,11 +14827,7 @@
             </a:pPr>
             <a:r>
               <a:rPr lang="en-US" dirty="0" smtClean="0"/>
-              <a:t>Java </a:t>
-            </a:r>
-            <a:r>
-              <a:rPr lang="en-US" dirty="0" smtClean="0"/>
-              <a:t>11</a:t>
+              <a:t>Java 11</a:t>
             </a:r>
           </a:p>
           <a:p>
@@ -14922,7 +14901,7 @@
   <p:timing>
     <p:tnLst>
       <p:par>
-        <p:cTn id="1" dur="indefinite" restart="never" nodeType="tmRoot"/>
+        <p:cTn xmlns:p14="http://schemas.microsoft.com/office/powerpoint/2010/main" id="1" dur="indefinite" restart="never" nodeType="tmRoot"/>
       </p:par>
     </p:tnLst>
   </p:timing>
@@ -15084,7 +15063,7 @@
   <p:timing>
     <p:tnLst>
       <p:par>
-        <p:cTn id="1" dur="indefinite" restart="never" nodeType="tmRoot"/>
+        <p:cTn xmlns:p14="http://schemas.microsoft.com/office/powerpoint/2010/main" id="1" dur="indefinite" restart="never" nodeType="tmRoot"/>
       </p:par>
     </p:tnLst>
   </p:timing>
@@ -15130,7 +15109,7 @@
           <a:p>
             <a:r>
               <a:rPr lang="en-US" dirty="0" smtClean="0"/>
-              <a:t>Lab</a:t>
+              <a:t>III. Lab #1</a:t>
             </a:r>
             <a:endParaRPr lang="en-US" dirty="0"/>
           </a:p>
@@ -15226,7 +15205,7 @@
   <p:timing>
     <p:tnLst>
       <p:par>
-        <p:cTn id="1" dur="indefinite" restart="never" nodeType="tmRoot"/>
+        <p:cTn xmlns:p14="http://schemas.microsoft.com/office/powerpoint/2010/main" id="1" dur="indefinite" restart="never" nodeType="tmRoot"/>
       </p:par>
     </p:tnLst>
   </p:timing>
@@ -15267,11 +15246,7 @@
           <a:p>
             <a:r>
               <a:rPr lang="en-US" dirty="0" smtClean="0"/>
-              <a:t>IV. Small </a:t>
-            </a:r>
-            <a:r>
-              <a:rPr lang="en-US" dirty="0" smtClean="0"/>
-              <a:t>Features</a:t>
+              <a:t>IV. Small Features</a:t>
             </a:r>
             <a:endParaRPr lang="en-US" dirty="0"/>
           </a:p>
@@ -15426,7 +15401,7 @@
   <p:timing>
     <p:tnLst>
       <p:par>
-        <p:cTn id="1" dur="indefinite" restart="never" nodeType="tmRoot"/>
+        <p:cTn xmlns:p14="http://schemas.microsoft.com/office/powerpoint/2010/main" id="1" dur="indefinite" restart="never" nodeType="tmRoot"/>
       </p:par>
     </p:tnLst>
   </p:timing>
@@ -15590,7 +15565,7 @@
   <p:timing>
     <p:tnLst>
       <p:par>
-        <p:cTn id="1" dur="indefinite" restart="never" nodeType="tmRoot"/>
+        <p:cTn xmlns:p14="http://schemas.microsoft.com/office/powerpoint/2010/main" id="1" dur="indefinite" restart="never" nodeType="tmRoot"/>
       </p:par>
     </p:tnLst>
   </p:timing>
@@ -15737,7 +15712,7 @@
   <p:timing>
     <p:tnLst>
       <p:par>
-        <p:cTn id="1" dur="indefinite" restart="never" nodeType="tmRoot"/>
+        <p:cTn xmlns:p14="http://schemas.microsoft.com/office/powerpoint/2010/main" id="1" dur="indefinite" restart="never" nodeType="tmRoot"/>
       </p:par>
     </p:tnLst>
   </p:timing>
@@ -16132,7 +16107,7 @@
   <p:timing>
     <p:tnLst>
       <p:par>
-        <p:cTn id="1" dur="indefinite" restart="never" nodeType="tmRoot"/>
+        <p:cTn xmlns:p14="http://schemas.microsoft.com/office/powerpoint/2010/main" id="1" dur="indefinite" restart="never" nodeType="tmRoot"/>
       </p:par>
     </p:tnLst>
   </p:timing>
@@ -16504,7 +16479,7 @@
   <p:timing>
     <p:tnLst>
       <p:par>
-        <p:cTn id="1" dur="indefinite" restart="never" nodeType="tmRoot"/>
+        <p:cTn xmlns:p14="http://schemas.microsoft.com/office/powerpoint/2010/main" id="1" dur="indefinite" restart="never" nodeType="tmRoot"/>
       </p:par>
     </p:tnLst>
   </p:timing>
@@ -16661,7 +16636,7 @@
   <p:timing>
     <p:tnLst>
       <p:par>
-        <p:cTn id="1" dur="indefinite" restart="never" nodeType="tmRoot"/>
+        <p:cTn xmlns:p14="http://schemas.microsoft.com/office/powerpoint/2010/main" id="1" dur="indefinite" restart="never" nodeType="tmRoot"/>
       </p:par>
     </p:tnLst>
   </p:timing>
@@ -16938,7 +16913,7 @@
   <p:timing>
     <p:tnLst>
       <p:par>
-        <p:cTn id="1" dur="indefinite" restart="never" nodeType="tmRoot"/>
+        <p:cTn xmlns:p14="http://schemas.microsoft.com/office/powerpoint/2010/main" id="1" dur="indefinite" restart="never" nodeType="tmRoot"/>
       </p:par>
     </p:tnLst>
   </p:timing>
@@ -17221,7 +17196,7 @@
   <p:timing>
     <p:tnLst>
       <p:par>
-        <p:cTn id="1" dur="indefinite" restart="never" nodeType="tmRoot"/>
+        <p:cTn xmlns:p14="http://schemas.microsoft.com/office/powerpoint/2010/main" id="1" dur="indefinite" restart="never" nodeType="tmRoot"/>
       </p:par>
     </p:tnLst>
   </p:timing>
@@ -17462,7 +17437,7 @@
   <p:timing>
     <p:tnLst>
       <p:par>
-        <p:cTn id="1" dur="indefinite" restart="never" nodeType="tmRoot"/>
+        <p:cTn xmlns:p14="http://schemas.microsoft.com/office/powerpoint/2010/main" id="1" dur="indefinite" restart="never" nodeType="tmRoot"/>
       </p:par>
     </p:tnLst>
   </p:timing>
@@ -17566,14 +17541,14 @@
             <a:noFill/>
           </a:ln>
           <a:extLst>
-            <a:ext uri="{909E8E84-426E-40DD-AFC4-6F175D3DCCD1}">
+            <a:ext uri="{909E8E84-426E-40dd-AFC4-6F175D3DCCD1}">
               <a14:hiddenFill xmlns:a14="http://schemas.microsoft.com/office/drawing/2010/main">
                 <a:solidFill>
                   <a:srgbClr val="FFFFFF"/>
                 </a:solidFill>
               </a14:hiddenFill>
             </a:ext>
-            <a:ext uri="{91240B29-F687-4F45-9708-019B960494DF}">
+            <a:ext uri="{91240B29-F687-4f45-9708-019B960494DF}">
               <a14:hiddenLine xmlns:a14="http://schemas.microsoft.com/office/drawing/2010/main" w="9525">
                 <a:solidFill>
                   <a:srgbClr val="000000"/>
@@ -18049,14 +18024,14 @@
             <a:noFill/>
           </a:ln>
           <a:extLst>
-            <a:ext uri="{909E8E84-426E-40DD-AFC4-6F175D3DCCD1}">
+            <a:ext uri="{909E8E84-426E-40dd-AFC4-6F175D3DCCD1}">
               <a14:hiddenFill xmlns:a14="http://schemas.microsoft.com/office/drawing/2010/main">
                 <a:solidFill>
                   <a:srgbClr val="FFFFFF"/>
                 </a:solidFill>
               </a14:hiddenFill>
             </a:ext>
-            <a:ext uri="{91240B29-F687-4F45-9708-019B960494DF}">
+            <a:ext uri="{91240B29-F687-4f45-9708-019B960494DF}">
               <a14:hiddenLine xmlns:a14="http://schemas.microsoft.com/office/drawing/2010/main" w="9525">
                 <a:solidFill>
                   <a:srgbClr val="000000"/>
@@ -18098,7 +18073,7 @@
   <p:timing>
     <p:tnLst>
       <p:par>
-        <p:cTn id="1" dur="indefinite" restart="never" nodeType="tmRoot">
+        <p:cTn xmlns:p14="http://schemas.microsoft.com/office/powerpoint/2010/main" id="1" dur="indefinite" restart="never" nodeType="tmRoot">
           <p:childTnLst>
             <p:seq concurrent="1" nextAc="seek">
               <p:cTn id="2" dur="indefinite" nodeType="mainSeq">
@@ -18429,7 +18404,7 @@
   <p:timing>
     <p:tnLst>
       <p:par>
-        <p:cTn id="1" dur="indefinite" restart="never" nodeType="tmRoot"/>
+        <p:cTn xmlns:p14="http://schemas.microsoft.com/office/powerpoint/2010/main" id="1" dur="indefinite" restart="never" nodeType="tmRoot"/>
       </p:par>
     </p:tnLst>
   </p:timing>
@@ -18655,14 +18630,14 @@
           </a:ln>
           <a:effectLst/>
           <a:extLst>
-            <a:ext uri="{909E8E84-426E-40DD-AFC4-6F175D3DCCD1}">
+            <a:ext uri="{909E8E84-426E-40dd-AFC4-6F175D3DCCD1}">
               <a14:hiddenFill xmlns:a14="http://schemas.microsoft.com/office/drawing/2010/main">
                 <a:solidFill>
                   <a:srgbClr val="FFFFFF"/>
                 </a:solidFill>
               </a14:hiddenFill>
             </a:ext>
-            <a:ext uri="{91240B29-F687-4F45-9708-019B960494DF}">
+            <a:ext uri="{91240B29-F687-4f45-9708-019B960494DF}">
               <a14:hiddenLine xmlns:a14="http://schemas.microsoft.com/office/drawing/2010/main" w="9525" cap="flat">
                 <a:solidFill>
                   <a:srgbClr val="808080"/>
@@ -18672,7 +18647,7 @@
                 <a:tailEnd/>
               </a14:hiddenLine>
             </a:ext>
-            <a:ext uri="{AF507438-7753-43E0-B8FC-AC1667EBCBE1}">
+            <a:ext uri="{AF507438-7753-43e0-B8FC-AC1667EBCBE1}">
               <a14:hiddenEffects xmlns:a14="http://schemas.microsoft.com/office/drawing/2010/main">
                 <a:effectLst>
                   <a:outerShdw blurRad="63500" dist="38099" dir="2700000" algn="ctr" rotWithShape="0">
@@ -18684,7 +18659,7 @@
               </a14:hiddenEffects>
             </a:ext>
             <a:ext uri="{FAA26D3D-D897-4be2-8F04-BA451C77F1D7}">
-              <ma14:placeholderFlag xmlns:ma14="http://schemas.microsoft.com/office/mac/drawingml/2011/main" xmlns="" val="1"/>
+              <ma14:placeholderFlag xmlns:ma14="http://schemas.microsoft.com/office/mac/drawingml/2011/main" val="1"/>
             </a:ext>
           </a:extLst>
         </p:spPr>
@@ -18951,7 +18926,7 @@
   <p:timing>
     <p:tnLst>
       <p:par>
-        <p:cTn id="1" dur="indefinite" restart="never" nodeType="tmRoot"/>
+        <p:cTn xmlns:p14="http://schemas.microsoft.com/office/powerpoint/2010/main" id="1" dur="indefinite" restart="never" nodeType="tmRoot"/>
       </p:par>
     </p:tnLst>
   </p:timing>
@@ -19167,14 +19142,14 @@
           </a:ln>
           <a:effectLst/>
           <a:extLst>
-            <a:ext uri="{909E8E84-426E-40DD-AFC4-6F175D3DCCD1}">
+            <a:ext uri="{909E8E84-426E-40dd-AFC4-6F175D3DCCD1}">
               <a14:hiddenFill xmlns:a14="http://schemas.microsoft.com/office/drawing/2010/main">
                 <a:solidFill>
                   <a:srgbClr val="FFFFFF"/>
                 </a:solidFill>
               </a14:hiddenFill>
             </a:ext>
-            <a:ext uri="{91240B29-F687-4F45-9708-019B960494DF}">
+            <a:ext uri="{91240B29-F687-4f45-9708-019B960494DF}">
               <a14:hiddenLine xmlns:a14="http://schemas.microsoft.com/office/drawing/2010/main" w="9525" cap="flat">
                 <a:solidFill>
                   <a:srgbClr val="808080"/>
@@ -19184,7 +19159,7 @@
                 <a:tailEnd/>
               </a14:hiddenLine>
             </a:ext>
-            <a:ext uri="{AF507438-7753-43E0-B8FC-AC1667EBCBE1}">
+            <a:ext uri="{AF507438-7753-43e0-B8FC-AC1667EBCBE1}">
               <a14:hiddenEffects xmlns:a14="http://schemas.microsoft.com/office/drawing/2010/main">
                 <a:effectLst>
                   <a:outerShdw blurRad="63500" dist="38099" dir="2700000" algn="ctr" rotWithShape="0">
@@ -19196,7 +19171,7 @@
               </a14:hiddenEffects>
             </a:ext>
             <a:ext uri="{FAA26D3D-D897-4be2-8F04-BA451C77F1D7}">
-              <ma14:placeholderFlag xmlns:ma14="http://schemas.microsoft.com/office/mac/drawingml/2011/main" xmlns="" val="1"/>
+              <ma14:placeholderFlag xmlns:ma14="http://schemas.microsoft.com/office/mac/drawingml/2011/main" val="1"/>
             </a:ext>
           </a:extLst>
         </p:spPr>
@@ -19463,7 +19438,7 @@
   <p:timing>
     <p:tnLst>
       <p:par>
-        <p:cTn id="1" dur="indefinite" restart="never" nodeType="tmRoot"/>
+        <p:cTn xmlns:p14="http://schemas.microsoft.com/office/powerpoint/2010/main" id="1" dur="indefinite" restart="never" nodeType="tmRoot"/>
       </p:par>
     </p:tnLst>
   </p:timing>
@@ -19645,14 +19620,14 @@
           </a:ln>
           <a:effectLst/>
           <a:extLst>
-            <a:ext uri="{909E8E84-426E-40DD-AFC4-6F175D3DCCD1}">
+            <a:ext uri="{909E8E84-426E-40dd-AFC4-6F175D3DCCD1}">
               <a14:hiddenFill xmlns:a14="http://schemas.microsoft.com/office/drawing/2010/main">
                 <a:solidFill>
                   <a:srgbClr val="FFFFFF"/>
                 </a:solidFill>
               </a14:hiddenFill>
             </a:ext>
-            <a:ext uri="{91240B29-F687-4F45-9708-019B960494DF}">
+            <a:ext uri="{91240B29-F687-4f45-9708-019B960494DF}">
               <a14:hiddenLine xmlns:a14="http://schemas.microsoft.com/office/drawing/2010/main" w="9525" cap="flat">
                 <a:solidFill>
                   <a:srgbClr val="808080"/>
@@ -19662,7 +19637,7 @@
                 <a:tailEnd/>
               </a14:hiddenLine>
             </a:ext>
-            <a:ext uri="{AF507438-7753-43E0-B8FC-AC1667EBCBE1}">
+            <a:ext uri="{AF507438-7753-43e0-B8FC-AC1667EBCBE1}">
               <a14:hiddenEffects xmlns:a14="http://schemas.microsoft.com/office/drawing/2010/main">
                 <a:effectLst>
                   <a:outerShdw blurRad="63500" dist="38099" dir="2700000" algn="ctr" rotWithShape="0">
@@ -19674,7 +19649,7 @@
               </a14:hiddenEffects>
             </a:ext>
             <a:ext uri="{FAA26D3D-D897-4be2-8F04-BA451C77F1D7}">
-              <ma14:placeholderFlag xmlns:ma14="http://schemas.microsoft.com/office/mac/drawingml/2011/main" xmlns="" val="1"/>
+              <ma14:placeholderFlag xmlns:ma14="http://schemas.microsoft.com/office/mac/drawingml/2011/main" val="1"/>
             </a:ext>
           </a:extLst>
         </p:spPr>
@@ -20112,7 +20087,7 @@
   <p:timing>
     <p:tnLst>
       <p:par>
-        <p:cTn id="1" dur="indefinite" restart="never" nodeType="tmRoot"/>
+        <p:cTn xmlns:p14="http://schemas.microsoft.com/office/powerpoint/2010/main" id="1" dur="indefinite" restart="never" nodeType="tmRoot"/>
       </p:par>
     </p:tnLst>
   </p:timing>
@@ -20222,14 +20197,14 @@
             <a:noFill/>
           </a:ln>
           <a:extLst>
-            <a:ext uri="{909E8E84-426E-40DD-AFC4-6F175D3DCCD1}">
+            <a:ext uri="{909E8E84-426E-40dd-AFC4-6F175D3DCCD1}">
               <a14:hiddenFill xmlns:a14="http://schemas.microsoft.com/office/drawing/2010/main">
                 <a:solidFill>
                   <a:srgbClr val="FFFFFF"/>
                 </a:solidFill>
               </a14:hiddenFill>
             </a:ext>
-            <a:ext uri="{91240B29-F687-4F45-9708-019B960494DF}">
+            <a:ext uri="{91240B29-F687-4f45-9708-019B960494DF}">
               <a14:hiddenLine xmlns:a14="http://schemas.microsoft.com/office/drawing/2010/main" w="9525">
                 <a:solidFill>
                   <a:srgbClr val="000000"/>
@@ -20255,7 +20230,7 @@
   <p:timing>
     <p:tnLst>
       <p:par>
-        <p:cTn id="1" dur="indefinite" restart="never" nodeType="tmRoot"/>
+        <p:cTn xmlns:p14="http://schemas.microsoft.com/office/powerpoint/2010/main" id="1" dur="indefinite" restart="never" nodeType="tmRoot"/>
       </p:par>
     </p:tnLst>
   </p:timing>
@@ -20455,7 +20430,7 @@
   <p:timing>
     <p:tnLst>
       <p:par>
-        <p:cTn id="1" dur="indefinite" restart="never" nodeType="tmRoot"/>
+        <p:cTn xmlns:p14="http://schemas.microsoft.com/office/powerpoint/2010/main" id="1" dur="indefinite" restart="never" nodeType="tmRoot"/>
       </p:par>
     </p:tnLst>
   </p:timing>
@@ -20624,7 +20599,7 @@
   <p:timing>
     <p:tnLst>
       <p:par>
-        <p:cTn id="1" dur="indefinite" restart="never" nodeType="tmRoot"/>
+        <p:cTn xmlns:p14="http://schemas.microsoft.com/office/powerpoint/2010/main" id="1" dur="indefinite" restart="never" nodeType="tmRoot"/>
       </p:par>
     </p:tnLst>
   </p:timing>
@@ -20878,7 +20853,7 @@
   <p:timing>
     <p:tnLst>
       <p:par>
-        <p:cTn id="1" dur="indefinite" restart="never" nodeType="tmRoot">
+        <p:cTn xmlns:p14="http://schemas.microsoft.com/office/powerpoint/2010/main" id="1" dur="indefinite" restart="never" nodeType="tmRoot">
           <p:childTnLst>
             <p:seq concurrent="1" nextAc="seek">
               <p:cTn id="2" dur="indefinite" nodeType="mainSeq">
@@ -21444,7 +21419,7 @@
   <p:timing>
     <p:tnLst>
       <p:par>
-        <p:cTn id="1" dur="indefinite" restart="never" nodeType="tmRoot">
+        <p:cTn xmlns:p14="http://schemas.microsoft.com/office/powerpoint/2010/main" id="1" dur="indefinite" restart="never" nodeType="tmRoot">
           <p:childTnLst>
             <p:seq concurrent="1" nextAc="seek">
               <p:cTn id="2" dur="indefinite" nodeType="mainSeq">
@@ -21949,7 +21924,7 @@
   <p:timing>
     <p:tnLst>
       <p:par>
-        <p:cTn id="1" dur="indefinite" restart="never" nodeType="tmRoot"/>
+        <p:cTn xmlns:p14="http://schemas.microsoft.com/office/powerpoint/2010/main" id="1" dur="indefinite" restart="never" nodeType="tmRoot"/>
       </p:par>
     </p:tnLst>
   </p:timing>
@@ -22170,7 +22145,7 @@
   <p:timing>
     <p:tnLst>
       <p:par>
-        <p:cTn id="1" dur="indefinite" restart="never" nodeType="tmRoot">
+        <p:cTn xmlns:p14="http://schemas.microsoft.com/office/powerpoint/2010/main" id="1" dur="indefinite" restart="never" nodeType="tmRoot">
           <p:childTnLst>
             <p:seq concurrent="1" nextAc="seek">
               <p:cTn id="2" dur="indefinite" nodeType="mainSeq">
@@ -22714,7 +22689,7 @@
   <p:timing>
     <p:tnLst>
       <p:par>
-        <p:cTn id="1" dur="indefinite" restart="never" nodeType="tmRoot">
+        <p:cTn xmlns:p14="http://schemas.microsoft.com/office/powerpoint/2010/main" id="1" dur="indefinite" restart="never" nodeType="tmRoot">
           <p:childTnLst>
             <p:seq concurrent="1" nextAc="seek">
               <p:cTn id="2" dur="indefinite" nodeType="mainSeq">
@@ -23232,7 +23207,7 @@
   <p:timing>
     <p:tnLst>
       <p:par>
-        <p:cTn id="1" dur="indefinite" restart="never" nodeType="tmRoot">
+        <p:cTn xmlns:p14="http://schemas.microsoft.com/office/powerpoint/2010/main" id="1" dur="indefinite" restart="never" nodeType="tmRoot">
           <p:childTnLst>
             <p:seq concurrent="1" nextAc="seek">
               <p:cTn id="2" dur="indefinite" nodeType="mainSeq">
@@ -23624,7 +23599,7 @@
   <p:timing>
     <p:tnLst>
       <p:par>
-        <p:cTn id="1" dur="indefinite" restart="never" nodeType="tmRoot">
+        <p:cTn xmlns:p14="http://schemas.microsoft.com/office/powerpoint/2010/main" id="1" dur="indefinite" restart="never" nodeType="tmRoot">
           <p:childTnLst>
             <p:seq concurrent="1" nextAc="seek">
               <p:cTn id="2" dur="indefinite" nodeType="mainSeq">
@@ -23944,7 +23919,7 @@
   <p:timing>
     <p:tnLst>
       <p:par>
-        <p:cTn id="1" dur="indefinite" restart="never" nodeType="tmRoot"/>
+        <p:cTn xmlns:p14="http://schemas.microsoft.com/office/powerpoint/2010/main" id="1" dur="indefinite" restart="never" nodeType="tmRoot"/>
       </p:par>
     </p:tnLst>
   </p:timing>
@@ -24121,7 +24096,7 @@
   <p:timing>
     <p:tnLst>
       <p:par>
-        <p:cTn id="1" dur="indefinite" restart="never" nodeType="tmRoot"/>
+        <p:cTn xmlns:p14="http://schemas.microsoft.com/office/powerpoint/2010/main" id="1" dur="indefinite" restart="never" nodeType="tmRoot"/>
       </p:par>
     </p:tnLst>
   </p:timing>
@@ -24351,14 +24326,14 @@
             <a:noFill/>
           </a:ln>
           <a:extLst>
-            <a:ext uri="{909E8E84-426E-40DD-AFC4-6F175D3DCCD1}">
+            <a:ext uri="{909E8E84-426E-40dd-AFC4-6F175D3DCCD1}">
               <a14:hiddenFill xmlns:a14="http://schemas.microsoft.com/office/drawing/2010/main">
                 <a:solidFill>
                   <a:srgbClr val="FFFFFF"/>
                 </a:solidFill>
               </a14:hiddenFill>
             </a:ext>
-            <a:ext uri="{91240B29-F687-4F45-9708-019B960494DF}">
+            <a:ext uri="{91240B29-F687-4f45-9708-019B960494DF}">
               <a14:hiddenLine xmlns:a14="http://schemas.microsoft.com/office/drawing/2010/main" w="9525">
                 <a:solidFill>
                   <a:srgbClr val="000000"/>
@@ -24400,7 +24375,7 @@
   <p:timing>
     <p:tnLst>
       <p:par>
-        <p:cTn id="1" dur="indefinite" restart="never" nodeType="tmRoot"/>
+        <p:cTn xmlns:p14="http://schemas.microsoft.com/office/powerpoint/2010/main" id="1" dur="indefinite" restart="never" nodeType="tmRoot"/>
       </p:par>
     </p:tnLst>
   </p:timing>
@@ -24678,7 +24653,7 @@
   <p:timing>
     <p:tnLst>
       <p:par>
-        <p:cTn id="1" dur="indefinite" restart="never" nodeType="tmRoot"/>
+        <p:cTn xmlns:p14="http://schemas.microsoft.com/office/powerpoint/2010/main" id="1" dur="indefinite" restart="never" nodeType="tmRoot"/>
       </p:par>
     </p:tnLst>
   </p:timing>
@@ -24753,14 +24728,14 @@
             <a:noFill/>
           </a:ln>
           <a:extLst>
-            <a:ext uri="{909E8E84-426E-40DD-AFC4-6F175D3DCCD1}">
+            <a:ext uri="{909E8E84-426E-40dd-AFC4-6F175D3DCCD1}">
               <a14:hiddenFill xmlns:a14="http://schemas.microsoft.com/office/drawing/2010/main">
                 <a:solidFill>
                   <a:srgbClr val="FFFFFF"/>
                 </a:solidFill>
               </a14:hiddenFill>
             </a:ext>
-            <a:ext uri="{91240B29-F687-4F45-9708-019B960494DF}">
+            <a:ext uri="{91240B29-F687-4f45-9708-019B960494DF}">
               <a14:hiddenLine xmlns:a14="http://schemas.microsoft.com/office/drawing/2010/main" w="9525">
                 <a:solidFill>
                   <a:srgbClr val="000000"/>
@@ -24830,14 +24805,14 @@
             <a:noFill/>
           </a:ln>
           <a:extLst>
-            <a:ext uri="{909E8E84-426E-40DD-AFC4-6F175D3DCCD1}">
+            <a:ext uri="{909E8E84-426E-40dd-AFC4-6F175D3DCCD1}">
               <a14:hiddenFill xmlns:a14="http://schemas.microsoft.com/office/drawing/2010/main">
                 <a:solidFill>
                   <a:srgbClr val="FFFFFF"/>
                 </a:solidFill>
               </a14:hiddenFill>
             </a:ext>
-            <a:ext uri="{91240B29-F687-4F45-9708-019B960494DF}">
+            <a:ext uri="{91240B29-F687-4f45-9708-019B960494DF}">
               <a14:hiddenLine xmlns:a14="http://schemas.microsoft.com/office/drawing/2010/main" w="9525">
                 <a:solidFill>
                   <a:srgbClr val="000000"/>
@@ -24894,7 +24869,7 @@
           </a:ln>
           <a:effectLst/>
           <a:extLst>
-            <a:ext uri="{AF507438-7753-43E0-B8FC-AC1667EBCBE1}">
+            <a:ext uri="{AF507438-7753-43e0-B8FC-AC1667EBCBE1}">
               <a14:hiddenEffects xmlns:a14="http://schemas.microsoft.com/office/drawing/2010/main">
                 <a:effectLst>
                   <a:outerShdw blurRad="63500" dist="38099" dir="2700000" algn="ctr" rotWithShape="0">
@@ -24977,7 +24952,7 @@
   <p:timing>
     <p:tnLst>
       <p:par>
-        <p:cTn id="1" dur="indefinite" restart="never" nodeType="tmRoot">
+        <p:cTn xmlns:p14="http://schemas.microsoft.com/office/powerpoint/2010/main" id="1" dur="indefinite" restart="never" nodeType="tmRoot">
           <p:childTnLst>
             <p:seq concurrent="1" nextAc="seek">
               <p:cTn id="2" dur="indefinite" nodeType="mainSeq">
@@ -25147,14 +25122,14 @@
             <a:noFill/>
           </a:ln>
           <a:extLst>
-            <a:ext uri="{909E8E84-426E-40DD-AFC4-6F175D3DCCD1}">
+            <a:ext uri="{909E8E84-426E-40dd-AFC4-6F175D3DCCD1}">
               <a14:hiddenFill xmlns:a14="http://schemas.microsoft.com/office/drawing/2010/main">
                 <a:solidFill>
                   <a:srgbClr val="FFFFFF"/>
                 </a:solidFill>
               </a14:hiddenFill>
             </a:ext>
-            <a:ext uri="{91240B29-F687-4F45-9708-019B960494DF}">
+            <a:ext uri="{91240B29-F687-4f45-9708-019B960494DF}">
               <a14:hiddenLine xmlns:a14="http://schemas.microsoft.com/office/drawing/2010/main" w="9525">
                 <a:solidFill>
                   <a:srgbClr val="000000"/>
@@ -25224,14 +25199,14 @@
             <a:noFill/>
           </a:ln>
           <a:extLst>
-            <a:ext uri="{909E8E84-426E-40DD-AFC4-6F175D3DCCD1}">
+            <a:ext uri="{909E8E84-426E-40dd-AFC4-6F175D3DCCD1}">
               <a14:hiddenFill xmlns:a14="http://schemas.microsoft.com/office/drawing/2010/main">
                 <a:solidFill>
                   <a:srgbClr val="FFFFFF"/>
                 </a:solidFill>
               </a14:hiddenFill>
             </a:ext>
-            <a:ext uri="{91240B29-F687-4F45-9708-019B960494DF}">
+            <a:ext uri="{91240B29-F687-4f45-9708-019B960494DF}">
               <a14:hiddenLine xmlns:a14="http://schemas.microsoft.com/office/drawing/2010/main" w="9525">
                 <a:solidFill>
                   <a:srgbClr val="000000"/>
@@ -25303,7 +25278,7 @@
           </a:ln>
           <a:effectLst/>
           <a:extLst>
-            <a:ext uri="{AF507438-7753-43E0-B8FC-AC1667EBCBE1}">
+            <a:ext uri="{AF507438-7753-43e0-B8FC-AC1667EBCBE1}">
               <a14:hiddenEffects xmlns:a14="http://schemas.microsoft.com/office/drawing/2010/main">
                 <a:effectLst>
                   <a:outerShdw blurRad="63500" dist="38099" dir="2700000" algn="ctr" rotWithShape="0">
@@ -25416,7 +25391,7 @@
   <p:timing>
     <p:tnLst>
       <p:par>
-        <p:cTn id="1" dur="indefinite" restart="never" nodeType="tmRoot">
+        <p:cTn xmlns:p14="http://schemas.microsoft.com/office/powerpoint/2010/main" id="1" dur="indefinite" restart="never" nodeType="tmRoot">
           <p:childTnLst>
             <p:seq concurrent="1" nextAc="seek">
               <p:cTn id="2" dur="indefinite" nodeType="mainSeq">
@@ -25623,7 +25598,7 @@
             <a:tailEnd/>
           </a:ln>
           <a:extLst>
-            <a:ext uri="{909E8E84-426E-40DD-AFC4-6F175D3DCCD1}">
+            <a:ext uri="{909E8E84-426E-40dd-AFC4-6F175D3DCCD1}">
               <a14:hiddenFill xmlns:a14="http://schemas.microsoft.com/office/drawing/2010/main">
                 <a:solidFill>
                   <a:srgbClr val="FFFFFF"/>
@@ -25858,14 +25833,14 @@
             <a:noFill/>
           </a:ln>
           <a:extLst>
-            <a:ext uri="{909E8E84-426E-40DD-AFC4-6F175D3DCCD1}">
+            <a:ext uri="{909E8E84-426E-40dd-AFC4-6F175D3DCCD1}">
               <a14:hiddenFill xmlns:a14="http://schemas.microsoft.com/office/drawing/2010/main">
                 <a:solidFill>
                   <a:srgbClr val="FFFFFF"/>
                 </a:solidFill>
               </a14:hiddenFill>
             </a:ext>
-            <a:ext uri="{91240B29-F687-4F45-9708-019B960494DF}">
+            <a:ext uri="{91240B29-F687-4f45-9708-019B960494DF}">
               <a14:hiddenLine xmlns:a14="http://schemas.microsoft.com/office/drawing/2010/main" w="9525">
                 <a:solidFill>
                   <a:srgbClr val="000000"/>
@@ -25889,7 +25864,31 @@
                   <a:srgbClr val="000000"/>
                 </a:solidFill>
               </a:rPr>
-              <a:t>Assumes ordered stream. Takes all elements until one doesn’t match. So prints the numbers 1-4</a:t>
+              <a:t>Assumes ordered stream. Takes all elements until one doesn’t match. </a:t>
+            </a:r>
+            <a:r>
+              <a:rPr lang="en-US" dirty="0">
+                <a:solidFill>
+                  <a:srgbClr val="000000"/>
+                </a:solidFill>
+              </a:rPr>
+              <a:t>P</a:t>
+            </a:r>
+            <a:r>
+              <a:rPr lang="en-US" dirty="0" smtClean="0">
+                <a:solidFill>
+                  <a:srgbClr val="000000"/>
+                </a:solidFill>
+              </a:rPr>
+              <a:t>rints </a:t>
+            </a:r>
+            <a:r>
+              <a:rPr lang="en-US" dirty="0" smtClean="0">
+                <a:solidFill>
+                  <a:srgbClr val="000000"/>
+                </a:solidFill>
+              </a:rPr>
+              <a:t>the numbers 1-4</a:t>
             </a:r>
             <a:endParaRPr lang="en-US" dirty="0">
               <a:solidFill>
@@ -25912,7 +25911,7 @@
   <p:timing>
     <p:tnLst>
       <p:par>
-        <p:cTn id="1" dur="indefinite" restart="never" nodeType="tmRoot">
+        <p:cTn xmlns:p14="http://schemas.microsoft.com/office/powerpoint/2010/main" id="1" dur="indefinite" restart="never" nodeType="tmRoot">
           <p:childTnLst>
             <p:seq concurrent="1" nextAc="seek">
               <p:cTn id="2" dur="indefinite" nodeType="mainSeq">
@@ -26109,7 +26108,7 @@
             <a:tailEnd/>
           </a:ln>
           <a:extLst>
-            <a:ext uri="{909E8E84-426E-40DD-AFC4-6F175D3DCCD1}">
+            <a:ext uri="{909E8E84-426E-40dd-AFC4-6F175D3DCCD1}">
               <a14:hiddenFill xmlns:a14="http://schemas.microsoft.com/office/drawing/2010/main">
                 <a:solidFill>
                   <a:srgbClr val="FFFFFF"/>
@@ -26344,14 +26343,14 @@
             <a:noFill/>
           </a:ln>
           <a:extLst>
-            <a:ext uri="{909E8E84-426E-40DD-AFC4-6F175D3DCCD1}">
+            <a:ext uri="{909E8E84-426E-40dd-AFC4-6F175D3DCCD1}">
               <a14:hiddenFill xmlns:a14="http://schemas.microsoft.com/office/drawing/2010/main">
                 <a:solidFill>
                   <a:srgbClr val="FFFFFF"/>
                 </a:solidFill>
               </a14:hiddenFill>
             </a:ext>
-            <a:ext uri="{91240B29-F687-4F45-9708-019B960494DF}">
+            <a:ext uri="{91240B29-F687-4f45-9708-019B960494DF}">
               <a14:hiddenLine xmlns:a14="http://schemas.microsoft.com/office/drawing/2010/main" w="9525">
                 <a:solidFill>
                   <a:srgbClr val="000000"/>
@@ -26370,12 +26369,28 @@
           <a:lstStyle/>
           <a:p>
             <a:r>
-              <a:rPr lang="en-US">
+              <a:rPr lang="en-US" dirty="0">
                 <a:solidFill>
                   <a:srgbClr val="000000"/>
                 </a:solidFill>
               </a:rPr>
-              <a:t>How print all Fibonacci #s less than 30?</a:t>
+              <a:t>How </a:t>
+            </a:r>
+            <a:r>
+              <a:rPr lang="en-US" dirty="0" smtClean="0">
+                <a:solidFill>
+                  <a:srgbClr val="000000"/>
+                </a:solidFill>
+              </a:rPr>
+              <a:t>to print </a:t>
+            </a:r>
+            <a:r>
+              <a:rPr lang="en-US" dirty="0">
+                <a:solidFill>
+                  <a:srgbClr val="000000"/>
+                </a:solidFill>
+              </a:rPr>
+              <a:t>all Fibonacci #s less than 30?</a:t>
             </a:r>
           </a:p>
         </p:txBody>
@@ -26393,7 +26408,7 @@
   <p:timing>
     <p:tnLst>
       <p:par>
-        <p:cTn id="1" dur="indefinite" restart="never" nodeType="tmRoot">
+        <p:cTn xmlns:p14="http://schemas.microsoft.com/office/powerpoint/2010/main" id="1" dur="indefinite" restart="never" nodeType="tmRoot">
           <p:childTnLst>
             <p:seq concurrent="1" nextAc="seek">
               <p:cTn id="2" dur="indefinite" nodeType="mainSeq">
@@ -26544,7 +26559,7 @@
             <a:tailEnd/>
           </a:ln>
           <a:extLst>
-            <a:ext uri="{909E8E84-426E-40DD-AFC4-6F175D3DCCD1}">
+            <a:ext uri="{909E8E84-426E-40dd-AFC4-6F175D3DCCD1}">
               <a14:hiddenFill xmlns:a14="http://schemas.microsoft.com/office/drawing/2010/main">
                 <a:solidFill>
                   <a:srgbClr val="FFFFFF"/>
@@ -26779,14 +26794,14 @@
             <a:noFill/>
           </a:ln>
           <a:extLst>
-            <a:ext uri="{909E8E84-426E-40DD-AFC4-6F175D3DCCD1}">
+            <a:ext uri="{909E8E84-426E-40dd-AFC4-6F175D3DCCD1}">
               <a14:hiddenFill xmlns:a14="http://schemas.microsoft.com/office/drawing/2010/main">
                 <a:solidFill>
                   <a:srgbClr val="FFFFFF"/>
                 </a:solidFill>
               </a14:hiddenFill>
             </a:ext>
-            <a:ext uri="{91240B29-F687-4F45-9708-019B960494DF}">
+            <a:ext uri="{91240B29-F687-4f45-9708-019B960494DF}">
               <a14:hiddenLine xmlns:a14="http://schemas.microsoft.com/office/drawing/2010/main" w="9525">
                 <a:solidFill>
                   <a:srgbClr val="000000"/>
@@ -26810,7 +26825,31 @@
                   <a:srgbClr val="000000"/>
                 </a:solidFill>
               </a:rPr>
-              <a:t>Assumes ordered stream. Takes all elements until one doesn’t match. So prints the numbers 5-9</a:t>
+              <a:t>Assumes ordered stream. Takes all elements until one doesn’t match. </a:t>
+            </a:r>
+            <a:r>
+              <a:rPr lang="en-US" dirty="0">
+                <a:solidFill>
+                  <a:srgbClr val="000000"/>
+                </a:solidFill>
+              </a:rPr>
+              <a:t>P</a:t>
+            </a:r>
+            <a:r>
+              <a:rPr lang="en-US" dirty="0" smtClean="0">
+                <a:solidFill>
+                  <a:srgbClr val="000000"/>
+                </a:solidFill>
+              </a:rPr>
+              <a:t>rints </a:t>
+            </a:r>
+            <a:r>
+              <a:rPr lang="en-US" dirty="0" smtClean="0">
+                <a:solidFill>
+                  <a:srgbClr val="000000"/>
+                </a:solidFill>
+              </a:rPr>
+              <a:t>the numbers 5-9</a:t>
             </a:r>
             <a:endParaRPr lang="en-US" dirty="0">
               <a:solidFill>
@@ -26833,7 +26872,7 @@
   <p:timing>
     <p:tnLst>
       <p:par>
-        <p:cTn id="1" dur="indefinite" restart="never" nodeType="tmRoot">
+        <p:cTn xmlns:p14="http://schemas.microsoft.com/office/powerpoint/2010/main" id="1" dur="indefinite" restart="never" nodeType="tmRoot">
           <p:childTnLst>
             <p:seq concurrent="1" nextAc="seek">
               <p:cTn id="2" dur="indefinite" nodeType="mainSeq">
@@ -27030,7 +27069,7 @@
             <a:tailEnd/>
           </a:ln>
           <a:extLst>
-            <a:ext uri="{909E8E84-426E-40DD-AFC4-6F175D3DCCD1}">
+            <a:ext uri="{909E8E84-426E-40dd-AFC4-6F175D3DCCD1}">
               <a14:hiddenFill xmlns:a14="http://schemas.microsoft.com/office/drawing/2010/main">
                 <a:solidFill>
                   <a:srgbClr val="FFFFFF"/>
@@ -27247,14 +27286,14 @@
             <a:noFill/>
           </a:ln>
           <a:extLst>
-            <a:ext uri="{909E8E84-426E-40DD-AFC4-6F175D3DCCD1}">
+            <a:ext uri="{909E8E84-426E-40dd-AFC4-6F175D3DCCD1}">
               <a14:hiddenFill xmlns:a14="http://schemas.microsoft.com/office/drawing/2010/main">
                 <a:solidFill>
                   <a:srgbClr val="FFFFFF"/>
                 </a:solidFill>
               </a14:hiddenFill>
             </a:ext>
-            <a:ext uri="{91240B29-F687-4F45-9708-019B960494DF}">
+            <a:ext uri="{91240B29-F687-4f45-9708-019B960494DF}">
               <a14:hiddenLine xmlns:a14="http://schemas.microsoft.com/office/drawing/2010/main" w="9525">
                 <a:solidFill>
                   <a:srgbClr val="000000"/>
@@ -27328,7 +27367,7 @@
   <p:timing>
     <p:tnLst>
       <p:par>
-        <p:cTn id="1" dur="indefinite" restart="never" nodeType="tmRoot">
+        <p:cTn xmlns:p14="http://schemas.microsoft.com/office/powerpoint/2010/main" id="1" dur="indefinite" restart="never" nodeType="tmRoot">
           <p:childTnLst>
             <p:seq concurrent="1" nextAc="seek">
               <p:cTn id="2" dur="indefinite" nodeType="mainSeq">
@@ -27675,14 +27714,14 @@
           </a:ln>
           <a:effectLst/>
           <a:extLst>
-            <a:ext uri="{909E8E84-426E-40DD-AFC4-6F175D3DCCD1}">
+            <a:ext uri="{909E8E84-426E-40dd-AFC4-6F175D3DCCD1}">
               <a14:hiddenFill xmlns:a14="http://schemas.microsoft.com/office/drawing/2010/main">
                 <a:solidFill>
                   <a:srgbClr val="FFFFFF"/>
                 </a:solidFill>
               </a14:hiddenFill>
             </a:ext>
-            <a:ext uri="{91240B29-F687-4F45-9708-019B960494DF}">
+            <a:ext uri="{91240B29-F687-4f45-9708-019B960494DF}">
               <a14:hiddenLine xmlns:a14="http://schemas.microsoft.com/office/drawing/2010/main" w="9525" cap="flat">
                 <a:solidFill>
                   <a:srgbClr val="808080"/>
@@ -27692,7 +27731,7 @@
                 <a:tailEnd/>
               </a14:hiddenLine>
             </a:ext>
-            <a:ext uri="{AF507438-7753-43E0-B8FC-AC1667EBCBE1}">
+            <a:ext uri="{AF507438-7753-43e0-B8FC-AC1667EBCBE1}">
               <a14:hiddenEffects xmlns:a14="http://schemas.microsoft.com/office/drawing/2010/main">
                 <a:effectLst>
                   <a:outerShdw blurRad="63500" dist="38099" dir="2700000" algn="ctr" rotWithShape="0">
@@ -27704,7 +27743,7 @@
               </a14:hiddenEffects>
             </a:ext>
             <a:ext uri="{FAA26D3D-D897-4be2-8F04-BA451C77F1D7}">
-              <ma14:placeholderFlag xmlns:ma14="http://schemas.microsoft.com/office/mac/drawingml/2011/main" xmlns="" val="1"/>
+              <ma14:placeholderFlag xmlns:ma14="http://schemas.microsoft.com/office/mac/drawingml/2011/main" val="1"/>
             </a:ext>
           </a:extLst>
         </p:spPr>
@@ -27971,7 +28010,7 @@
   <p:timing>
     <p:tnLst>
       <p:par>
-        <p:cTn id="1" dur="indefinite" restart="never" nodeType="tmRoot"/>
+        <p:cTn xmlns:p14="http://schemas.microsoft.com/office/powerpoint/2010/main" id="1" dur="indefinite" restart="never" nodeType="tmRoot"/>
       </p:par>
     </p:tnLst>
   </p:timing>
@@ -28208,14 +28247,14 @@
           </a:ln>
           <a:effectLst/>
           <a:extLst>
-            <a:ext uri="{909E8E84-426E-40DD-AFC4-6F175D3DCCD1}">
+            <a:ext uri="{909E8E84-426E-40dd-AFC4-6F175D3DCCD1}">
               <a14:hiddenFill xmlns:a14="http://schemas.microsoft.com/office/drawing/2010/main">
                 <a:solidFill>
                   <a:srgbClr val="FFFFFF"/>
                 </a:solidFill>
               </a14:hiddenFill>
             </a:ext>
-            <a:ext uri="{91240B29-F687-4F45-9708-019B960494DF}">
+            <a:ext uri="{91240B29-F687-4f45-9708-019B960494DF}">
               <a14:hiddenLine xmlns:a14="http://schemas.microsoft.com/office/drawing/2010/main" w="9525" cap="flat">
                 <a:solidFill>
                   <a:srgbClr val="808080"/>
@@ -28225,7 +28264,7 @@
                 <a:tailEnd/>
               </a14:hiddenLine>
             </a:ext>
-            <a:ext uri="{AF507438-7753-43E0-B8FC-AC1667EBCBE1}">
+            <a:ext uri="{AF507438-7753-43e0-B8FC-AC1667EBCBE1}">
               <a14:hiddenEffects xmlns:a14="http://schemas.microsoft.com/office/drawing/2010/main">
                 <a:effectLst>
                   <a:outerShdw blurRad="63500" dist="38099" dir="2700000" algn="ctr" rotWithShape="0">
@@ -28237,7 +28276,7 @@
               </a14:hiddenEffects>
             </a:ext>
             <a:ext uri="{FAA26D3D-D897-4be2-8F04-BA451C77F1D7}">
-              <ma14:placeholderFlag xmlns:ma14="http://schemas.microsoft.com/office/mac/drawingml/2011/main" xmlns="" val="1"/>
+              <ma14:placeholderFlag xmlns:ma14="http://schemas.microsoft.com/office/mac/drawingml/2011/main" val="1"/>
             </a:ext>
           </a:extLst>
         </p:spPr>
@@ -28504,7 +28543,7 @@
   <p:timing>
     <p:tnLst>
       <p:par>
-        <p:cTn id="1" dur="indefinite" restart="never" nodeType="tmRoot"/>
+        <p:cTn xmlns:p14="http://schemas.microsoft.com/office/powerpoint/2010/main" id="1" dur="indefinite" restart="never" nodeType="tmRoot"/>
       </p:par>
     </p:tnLst>
   </p:timing>
@@ -28629,7 +28668,7 @@
   <p:timing>
     <p:tnLst>
       <p:par>
-        <p:cTn id="1" dur="indefinite" restart="never" nodeType="tmRoot"/>
+        <p:cTn xmlns:p14="http://schemas.microsoft.com/office/powerpoint/2010/main" id="1" dur="indefinite" restart="never" nodeType="tmRoot"/>
       </p:par>
     </p:tnLst>
   </p:timing>
@@ -28863,14 +28902,14 @@
           </a:ln>
           <a:effectLst/>
           <a:extLst>
-            <a:ext uri="{909E8E84-426E-40DD-AFC4-6F175D3DCCD1}">
+            <a:ext uri="{909E8E84-426E-40dd-AFC4-6F175D3DCCD1}">
               <a14:hiddenFill xmlns:a14="http://schemas.microsoft.com/office/drawing/2010/main">
                 <a:solidFill>
                   <a:srgbClr val="FFFFFF"/>
                 </a:solidFill>
               </a14:hiddenFill>
             </a:ext>
-            <a:ext uri="{91240B29-F687-4F45-9708-019B960494DF}">
+            <a:ext uri="{91240B29-F687-4f45-9708-019B960494DF}">
               <a14:hiddenLine xmlns:a14="http://schemas.microsoft.com/office/drawing/2010/main" w="9525" cap="flat">
                 <a:solidFill>
                   <a:srgbClr val="808080"/>
@@ -28880,7 +28919,7 @@
                 <a:tailEnd/>
               </a14:hiddenLine>
             </a:ext>
-            <a:ext uri="{AF507438-7753-43E0-B8FC-AC1667EBCBE1}">
+            <a:ext uri="{AF507438-7753-43e0-B8FC-AC1667EBCBE1}">
               <a14:hiddenEffects xmlns:a14="http://schemas.microsoft.com/office/drawing/2010/main">
                 <a:effectLst>
                   <a:outerShdw blurRad="63500" dist="38099" dir="2700000" algn="ctr" rotWithShape="0">
@@ -28892,7 +28931,7 @@
               </a14:hiddenEffects>
             </a:ext>
             <a:ext uri="{FAA26D3D-D897-4be2-8F04-BA451C77F1D7}">
-              <ma14:placeholderFlag xmlns:ma14="http://schemas.microsoft.com/office/mac/drawingml/2011/main" xmlns="" val="1"/>
+              <ma14:placeholderFlag xmlns:ma14="http://schemas.microsoft.com/office/mac/drawingml/2011/main" val="1"/>
             </a:ext>
           </a:extLst>
         </p:spPr>
@@ -29172,7 +29211,7 @@
   <p:timing>
     <p:tnLst>
       <p:par>
-        <p:cTn id="1" dur="indefinite" restart="never" nodeType="tmRoot"/>
+        <p:cTn xmlns:p14="http://schemas.microsoft.com/office/powerpoint/2010/main" id="1" dur="indefinite" restart="never" nodeType="tmRoot"/>
       </p:par>
     </p:tnLst>
   </p:timing>
@@ -29358,7 +29397,7 @@
   <p:timing>
     <p:tnLst>
       <p:par>
-        <p:cTn id="1" dur="indefinite" restart="never" nodeType="tmRoot"/>
+        <p:cTn xmlns:p14="http://schemas.microsoft.com/office/powerpoint/2010/main" id="1" dur="indefinite" restart="never" nodeType="tmRoot"/>
       </p:par>
     </p:tnLst>
   </p:timing>
@@ -29608,14 +29647,14 @@
           </a:ln>
           <a:effectLst/>
           <a:extLst>
-            <a:ext uri="{909E8E84-426E-40DD-AFC4-6F175D3DCCD1}">
+            <a:ext uri="{909E8E84-426E-40dd-AFC4-6F175D3DCCD1}">
               <a14:hiddenFill xmlns:a14="http://schemas.microsoft.com/office/drawing/2010/main">
                 <a:solidFill>
                   <a:srgbClr val="FFFFFF"/>
                 </a:solidFill>
               </a14:hiddenFill>
             </a:ext>
-            <a:ext uri="{91240B29-F687-4F45-9708-019B960494DF}">
+            <a:ext uri="{91240B29-F687-4f45-9708-019B960494DF}">
               <a14:hiddenLine xmlns:a14="http://schemas.microsoft.com/office/drawing/2010/main" w="9525" cap="flat">
                 <a:solidFill>
                   <a:srgbClr val="808080"/>
@@ -29625,7 +29664,7 @@
                 <a:tailEnd/>
               </a14:hiddenLine>
             </a:ext>
-            <a:ext uri="{AF507438-7753-43E0-B8FC-AC1667EBCBE1}">
+            <a:ext uri="{AF507438-7753-43e0-B8FC-AC1667EBCBE1}">
               <a14:hiddenEffects xmlns:a14="http://schemas.microsoft.com/office/drawing/2010/main">
                 <a:effectLst>
                   <a:outerShdw blurRad="63500" dist="38099" dir="2700000" algn="ctr" rotWithShape="0">
@@ -29637,7 +29676,7 @@
               </a14:hiddenEffects>
             </a:ext>
             <a:ext uri="{FAA26D3D-D897-4be2-8F04-BA451C77F1D7}">
-              <ma14:placeholderFlag xmlns:ma14="http://schemas.microsoft.com/office/mac/drawingml/2011/main" xmlns="" val="1"/>
+              <ma14:placeholderFlag xmlns:ma14="http://schemas.microsoft.com/office/mac/drawingml/2011/main" val="1"/>
             </a:ext>
           </a:extLst>
         </p:spPr>
@@ -29900,7 +29939,7 @@
   <p:timing>
     <p:tnLst>
       <p:par>
-        <p:cTn id="1" dur="indefinite" restart="never" nodeType="tmRoot"/>
+        <p:cTn xmlns:p14="http://schemas.microsoft.com/office/powerpoint/2010/main" id="1" dur="indefinite" restart="never" nodeType="tmRoot"/>
       </p:par>
     </p:tnLst>
   </p:timing>
@@ -30248,14 +30287,14 @@
           </a:ln>
           <a:effectLst/>
           <a:extLst>
-            <a:ext uri="{909E8E84-426E-40DD-AFC4-6F175D3DCCD1}">
+            <a:ext uri="{909E8E84-426E-40dd-AFC4-6F175D3DCCD1}">
               <a14:hiddenFill xmlns:a14="http://schemas.microsoft.com/office/drawing/2010/main">
                 <a:solidFill>
                   <a:srgbClr val="FFFFFF"/>
                 </a:solidFill>
               </a14:hiddenFill>
             </a:ext>
-            <a:ext uri="{91240B29-F687-4F45-9708-019B960494DF}">
+            <a:ext uri="{91240B29-F687-4f45-9708-019B960494DF}">
               <a14:hiddenLine xmlns:a14="http://schemas.microsoft.com/office/drawing/2010/main" w="9525" cap="flat">
                 <a:solidFill>
                   <a:srgbClr val="808080"/>
@@ -30265,7 +30304,7 @@
                 <a:tailEnd/>
               </a14:hiddenLine>
             </a:ext>
-            <a:ext uri="{AF507438-7753-43E0-B8FC-AC1667EBCBE1}">
+            <a:ext uri="{AF507438-7753-43e0-B8FC-AC1667EBCBE1}">
               <a14:hiddenEffects xmlns:a14="http://schemas.microsoft.com/office/drawing/2010/main">
                 <a:effectLst>
                   <a:outerShdw blurRad="63500" dist="38099" dir="2700000" algn="ctr" rotWithShape="0">
@@ -30277,7 +30316,7 @@
               </a14:hiddenEffects>
             </a:ext>
             <a:ext uri="{FAA26D3D-D897-4be2-8F04-BA451C77F1D7}">
-              <ma14:placeholderFlag xmlns:ma14="http://schemas.microsoft.com/office/mac/drawingml/2011/main" xmlns="" val="1"/>
+              <ma14:placeholderFlag xmlns:ma14="http://schemas.microsoft.com/office/mac/drawingml/2011/main" val="1"/>
             </a:ext>
           </a:extLst>
         </p:spPr>
@@ -30540,7 +30579,7 @@
   <p:timing>
     <p:tnLst>
       <p:par>
-        <p:cTn id="1" dur="indefinite" restart="never" nodeType="tmRoot"/>
+        <p:cTn xmlns:p14="http://schemas.microsoft.com/office/powerpoint/2010/main" id="1" dur="indefinite" restart="never" nodeType="tmRoot"/>
       </p:par>
     </p:tnLst>
   </p:timing>
@@ -30585,24 +30624,12 @@
           <a:lstStyle/>
           <a:p>
             <a:r>
+              <a:rPr lang="en-US" dirty="0" smtClean="0"/>
+              <a:t>Question </a:t>
+            </a:r>
+            <a:r>
               <a:rPr lang="en-US" dirty="0"/>
-              <a:t>Module 5</a:t>
-            </a:r>
-            <a:r>
-              <a:rPr lang="en-US" dirty="0" smtClean="0"/>
-              <a:t> </a:t>
-            </a:r>
-            <a:r>
-              <a:rPr lang="mr-IN" dirty="0"/>
-              <a:t>–</a:t>
-            </a:r>
-            <a:r>
-              <a:rPr lang="en-US" dirty="0"/>
-              <a:t> Question </a:t>
-            </a:r>
-            <a:r>
-              <a:rPr lang="en-US" dirty="0" smtClean="0"/>
-              <a:t>3</a:t>
+              <a:t>7</a:t>
             </a:r>
             <a:endParaRPr lang="en-US" dirty="0"/>
           </a:p>
@@ -30806,14 +30833,14 @@
           </a:ln>
           <a:effectLst/>
           <a:extLst>
-            <a:ext uri="{909E8E84-426E-40DD-AFC4-6F175D3DCCD1}">
+            <a:ext uri="{909E8E84-426E-40dd-AFC4-6F175D3DCCD1}">
               <a14:hiddenFill xmlns:a14="http://schemas.microsoft.com/office/drawing/2010/main">
                 <a:solidFill>
                   <a:srgbClr val="FFFFFF"/>
                 </a:solidFill>
               </a14:hiddenFill>
             </a:ext>
-            <a:ext uri="{91240B29-F687-4F45-9708-019B960494DF}">
+            <a:ext uri="{91240B29-F687-4f45-9708-019B960494DF}">
               <a14:hiddenLine xmlns:a14="http://schemas.microsoft.com/office/drawing/2010/main" w="9525" cap="flat">
                 <a:solidFill>
                   <a:srgbClr val="808080"/>
@@ -30823,7 +30850,7 @@
                 <a:tailEnd/>
               </a14:hiddenLine>
             </a:ext>
-            <a:ext uri="{AF507438-7753-43E0-B8FC-AC1667EBCBE1}">
+            <a:ext uri="{AF507438-7753-43e0-B8FC-AC1667EBCBE1}">
               <a14:hiddenEffects xmlns:a14="http://schemas.microsoft.com/office/drawing/2010/main">
                 <a:effectLst>
                   <a:outerShdw blurRad="63500" dist="38099" dir="2700000" algn="ctr" rotWithShape="0">
@@ -30835,7 +30862,7 @@
               </a14:hiddenEffects>
             </a:ext>
             <a:ext uri="{FAA26D3D-D897-4be2-8F04-BA451C77F1D7}">
-              <ma14:placeholderFlag xmlns:ma14="http://schemas.microsoft.com/office/mac/drawingml/2011/main" xmlns="" val="1"/>
+              <ma14:placeholderFlag xmlns:ma14="http://schemas.microsoft.com/office/mac/drawingml/2011/main" val="1"/>
             </a:ext>
           </a:extLst>
         </p:spPr>
@@ -31098,7 +31125,7 @@
   <p:timing>
     <p:tnLst>
       <p:par>
-        <p:cTn id="1" dur="indefinite" restart="never" nodeType="tmRoot"/>
+        <p:cTn xmlns:p14="http://schemas.microsoft.com/office/powerpoint/2010/main" id="1" dur="indefinite" restart="never" nodeType="tmRoot"/>
       </p:par>
     </p:tnLst>
   </p:timing>
@@ -31147,9 +31174,10 @@
               <a:t>Question </a:t>
             </a:r>
             <a:r>
-              <a:rPr lang="en-US" dirty="0"/>
-              <a:t>7</a:t>
-            </a:r>
+              <a:rPr lang="en-US" dirty="0" smtClean="0"/>
+              <a:t>8</a:t>
+            </a:r>
+            <a:endParaRPr lang="en-US" dirty="0"/>
           </a:p>
         </p:txBody>
       </p:sp>
@@ -31446,14 +31474,14 @@
           </a:ln>
           <a:effectLst/>
           <a:extLst>
-            <a:ext uri="{909E8E84-426E-40DD-AFC4-6F175D3DCCD1}">
+            <a:ext uri="{909E8E84-426E-40dd-AFC4-6F175D3DCCD1}">
               <a14:hiddenFill xmlns:a14="http://schemas.microsoft.com/office/drawing/2010/main">
                 <a:solidFill>
                   <a:srgbClr val="FFFFFF"/>
                 </a:solidFill>
               </a14:hiddenFill>
             </a:ext>
-            <a:ext uri="{91240B29-F687-4F45-9708-019B960494DF}">
+            <a:ext uri="{91240B29-F687-4f45-9708-019B960494DF}">
               <a14:hiddenLine xmlns:a14="http://schemas.microsoft.com/office/drawing/2010/main" w="9525" cap="flat">
                 <a:solidFill>
                   <a:srgbClr val="808080"/>
@@ -31463,7 +31491,7 @@
                 <a:tailEnd/>
               </a14:hiddenLine>
             </a:ext>
-            <a:ext uri="{AF507438-7753-43E0-B8FC-AC1667EBCBE1}">
+            <a:ext uri="{AF507438-7753-43e0-B8FC-AC1667EBCBE1}">
               <a14:hiddenEffects xmlns:a14="http://schemas.microsoft.com/office/drawing/2010/main">
                 <a:effectLst>
                   <a:outerShdw blurRad="63500" dist="38099" dir="2700000" algn="ctr" rotWithShape="0">
@@ -31475,7 +31503,7 @@
               </a14:hiddenEffects>
             </a:ext>
             <a:ext uri="{FAA26D3D-D897-4be2-8F04-BA451C77F1D7}">
-              <ma14:placeholderFlag xmlns:ma14="http://schemas.microsoft.com/office/mac/drawingml/2011/main" xmlns="" val="1"/>
+              <ma14:placeholderFlag xmlns:ma14="http://schemas.microsoft.com/office/mac/drawingml/2011/main" val="1"/>
             </a:ext>
           </a:extLst>
         </p:spPr>
@@ -31738,7 +31766,7 @@
   <p:timing>
     <p:tnLst>
       <p:par>
-        <p:cTn id="1" dur="indefinite" restart="never" nodeType="tmRoot"/>
+        <p:cTn xmlns:p14="http://schemas.microsoft.com/office/powerpoint/2010/main" id="1" dur="indefinite" restart="never" nodeType="tmRoot"/>
       </p:par>
     </p:tnLst>
   </p:timing>
@@ -31950,14 +31978,14 @@
           </a:ln>
           <a:effectLst/>
           <a:extLst>
-            <a:ext uri="{909E8E84-426E-40DD-AFC4-6F175D3DCCD1}">
+            <a:ext uri="{909E8E84-426E-40dd-AFC4-6F175D3DCCD1}">
               <a14:hiddenFill xmlns:a14="http://schemas.microsoft.com/office/drawing/2010/main">
                 <a:solidFill>
                   <a:srgbClr val="FFFFFF"/>
                 </a:solidFill>
               </a14:hiddenFill>
             </a:ext>
-            <a:ext uri="{91240B29-F687-4F45-9708-019B960494DF}">
+            <a:ext uri="{91240B29-F687-4f45-9708-019B960494DF}">
               <a14:hiddenLine xmlns:a14="http://schemas.microsoft.com/office/drawing/2010/main" w="9525" cap="flat">
                 <a:solidFill>
                   <a:srgbClr val="808080"/>
@@ -31967,7 +31995,7 @@
                 <a:tailEnd/>
               </a14:hiddenLine>
             </a:ext>
-            <a:ext uri="{AF507438-7753-43E0-B8FC-AC1667EBCBE1}">
+            <a:ext uri="{AF507438-7753-43e0-B8FC-AC1667EBCBE1}">
               <a14:hiddenEffects xmlns:a14="http://schemas.microsoft.com/office/drawing/2010/main">
                 <a:effectLst>
                   <a:outerShdw blurRad="63500" dist="38099" dir="2700000" algn="ctr" rotWithShape="0">
@@ -31979,7 +32007,7 @@
               </a14:hiddenEffects>
             </a:ext>
             <a:ext uri="{FAA26D3D-D897-4be2-8F04-BA451C77F1D7}">
-              <ma14:placeholderFlag xmlns:ma14="http://schemas.microsoft.com/office/mac/drawingml/2011/main" xmlns="" val="1"/>
+              <ma14:placeholderFlag xmlns:ma14="http://schemas.microsoft.com/office/mac/drawingml/2011/main" val="1"/>
             </a:ext>
           </a:extLst>
         </p:spPr>
@@ -32242,7 +32270,7 @@
   <p:timing>
     <p:tnLst>
       <p:par>
-        <p:cTn id="1" dur="indefinite" restart="never" nodeType="tmRoot"/>
+        <p:cTn xmlns:p14="http://schemas.microsoft.com/office/powerpoint/2010/main" id="1" dur="indefinite" restart="never" nodeType="tmRoot"/>
       </p:par>
     </p:tnLst>
   </p:timing>
@@ -32421,7 +32449,7 @@
   <p:timing>
     <p:tnLst>
       <p:par>
-        <p:cTn id="1" dur="indefinite" restart="never" nodeType="tmRoot"/>
+        <p:cTn xmlns:p14="http://schemas.microsoft.com/office/powerpoint/2010/main" id="1" dur="indefinite" restart="never" nodeType="tmRoot"/>
       </p:par>
     </p:tnLst>
   </p:timing>
@@ -32595,7 +32623,6 @@
                         <a:rPr lang="en-US" sz="1500" dirty="0" smtClean="0"/>
                         <a:t>III. Lab #1</a:t>
                       </a:r>
-                      <a:endParaRPr lang="en-US" sz="1500" dirty="0" smtClean="0"/>
                     </a:p>
                   </a:txBody>
                   <a:tcPr/>
@@ -32684,7 +32711,6 @@
                         <a:rPr lang="en-US" sz="1500" dirty="0" smtClean="0"/>
                         <a:t>Lab #2</a:t>
                       </a:r>
-                      <a:endParaRPr lang="en-US" sz="1500" dirty="0" smtClean="0"/>
                     </a:p>
                   </a:txBody>
                   <a:tcPr/>
@@ -32715,11 +32741,7 @@
                       </a:pPr>
                       <a:r>
                         <a:rPr lang="en-US" sz="1500" dirty="0" smtClean="0"/>
-                        <a:t>...then Off </a:t>
-                      </a:r>
-                      <a:r>
-                        <a:rPr lang="en-US" sz="1500" dirty="0" smtClean="0"/>
-                        <a:t>to </a:t>
+                        <a:t>...then Off to </a:t>
                       </a:r>
                       <a:r>
                         <a:rPr lang="en-US" sz="1500" dirty="0" err="1" smtClean="0"/>
@@ -32727,13 +32749,8 @@
                       </a:r>
                       <a:r>
                         <a:rPr lang="en-US" sz="1500" dirty="0" smtClean="0"/>
-                        <a:t> @ Chase </a:t>
+                        <a:t> @ Chase Center!</a:t>
                       </a:r>
-                      <a:r>
-                        <a:rPr lang="en-US" sz="1500" dirty="0" smtClean="0"/>
-                        <a:t>Center!</a:t>
-                      </a:r>
-                      <a:endParaRPr lang="en-US" sz="1500" dirty="0" smtClean="0"/>
                     </a:p>
                   </a:txBody>
                   <a:tcPr/>
@@ -32756,7 +32773,7 @@
   <p:timing>
     <p:tnLst>
       <p:par>
-        <p:cTn id="1" dur="indefinite" restart="never" nodeType="tmRoot"/>
+        <p:cTn xmlns:p14="http://schemas.microsoft.com/office/powerpoint/2010/main" id="1" dur="indefinite" restart="never" nodeType="tmRoot"/>
       </p:par>
     </p:tnLst>
   </p:timing>
@@ -32897,7 +32914,7 @@
   <p:timing>
     <p:tnLst>
       <p:par>
-        <p:cTn id="1" dur="indefinite" restart="never" nodeType="tmRoot"/>
+        <p:cTn xmlns:p14="http://schemas.microsoft.com/office/powerpoint/2010/main" id="1" dur="indefinite" restart="never" nodeType="tmRoot"/>
       </p:par>
     </p:tnLst>
   </p:timing>
@@ -33054,7 +33071,7 @@
   <p:timing>
     <p:tnLst>
       <p:par>
-        <p:cTn id="1" dur="indefinite" restart="never" nodeType="tmRoot"/>
+        <p:cTn xmlns:p14="http://schemas.microsoft.com/office/powerpoint/2010/main" id="1" dur="indefinite" restart="never" nodeType="tmRoot"/>
       </p:par>
     </p:tnLst>
   </p:timing>
@@ -33306,7 +33323,7 @@
         </a:ln>
         <a:effectLst/>
         <a:extLst>
-          <a:ext uri="{AF507438-7753-43E0-B8FC-AC1667EBCBE1}">
+          <a:ext uri="{AF507438-7753-43e0-B8FC-AC1667EBCBE1}">
             <a14:hiddenEffects xmlns:a14="http://schemas.microsoft.com/office/drawing/2010/main">
               <a:effectLst>
                 <a:outerShdw blurRad="63500" dist="38099" dir="2700000" algn="ctr" rotWithShape="0">
@@ -33385,7 +33402,7 @@
         </a:ln>
         <a:effectLst/>
         <a:extLst>
-          <a:ext uri="{AF507438-7753-43E0-B8FC-AC1667EBCBE1}">
+          <a:ext uri="{AF507438-7753-43e0-B8FC-AC1667EBCBE1}">
             <a14:hiddenEffects xmlns:a14="http://schemas.microsoft.com/office/drawing/2010/main">
               <a:effectLst>
                 <a:outerShdw blurRad="63500" dist="38099" dir="2700000" algn="ctr" rotWithShape="0">

</xml_diff>

<commit_message>
renumber (had two #8s)
</commit_message>
<xml_diff>
--- a/2019-OracleCodeOne-HOL.pptx
+++ b/2019-OracleCodeOne-HOL.pptx
@@ -433,7 +433,7 @@
               <a:pPr>
                 <a:defRPr/>
               </a:pPr>
-              <a:t>9/8/2019</a:t>
+              <a:t>9/8/19</a:t>
             </a:fld>
             <a:endParaRPr lang="en-US"/>
           </a:p>
@@ -577,7 +577,7 @@
           </a:ln>
           <a:effectLst/>
           <a:extLst>
-            <a:ext uri="{91240B29-F687-4F45-9708-019B960494DF}">
+            <a:ext uri="{91240B29-F687-4f45-9708-019B960494DF}">
               <a14:hiddenLine xmlns:a14="http://schemas.microsoft.com/office/drawing/2010/main" w="9525" cap="flat">
                 <a:solidFill>
                   <a:srgbClr val="808080"/>
@@ -587,7 +587,7 @@
                 <a:tailEnd/>
               </a14:hiddenLine>
             </a:ext>
-            <a:ext uri="{AF507438-7753-43E0-B8FC-AC1667EBCBE1}">
+            <a:ext uri="{AF507438-7753-43e0-B8FC-AC1667EBCBE1}">
               <a14:hiddenEffects xmlns:a14="http://schemas.microsoft.com/office/drawing/2010/main">
                 <a:effectLst>
                   <a:outerShdw blurRad="63500" dist="38099" dir="2700000" algn="ctr" rotWithShape="0">
@@ -637,7 +637,7 @@
           </a:ln>
           <a:effectLst/>
           <a:extLst>
-            <a:ext uri="{91240B29-F687-4F45-9708-019B960494DF}">
+            <a:ext uri="{91240B29-F687-4f45-9708-019B960494DF}">
               <a14:hiddenLine xmlns:a14="http://schemas.microsoft.com/office/drawing/2010/main" w="9525" cap="flat">
                 <a:solidFill>
                   <a:srgbClr val="808080"/>
@@ -647,7 +647,7 @@
                 <a:tailEnd/>
               </a14:hiddenLine>
             </a:ext>
-            <a:ext uri="{AF507438-7753-43E0-B8FC-AC1667EBCBE1}">
+            <a:ext uri="{AF507438-7753-43e0-B8FC-AC1667EBCBE1}">
               <a14:hiddenEffects xmlns:a14="http://schemas.microsoft.com/office/drawing/2010/main">
                 <a:effectLst>
                   <a:outerShdw blurRad="63500" dist="38099" dir="2700000" algn="ctr" rotWithShape="0">
@@ -697,7 +697,7 @@
           </a:ln>
           <a:effectLst/>
           <a:extLst>
-            <a:ext uri="{91240B29-F687-4F45-9708-019B960494DF}">
+            <a:ext uri="{91240B29-F687-4f45-9708-019B960494DF}">
               <a14:hiddenLine xmlns:a14="http://schemas.microsoft.com/office/drawing/2010/main" w="9525" cap="flat">
                 <a:solidFill>
                   <a:srgbClr val="808080"/>
@@ -707,7 +707,7 @@
                 <a:tailEnd/>
               </a14:hiddenLine>
             </a:ext>
-            <a:ext uri="{AF507438-7753-43E0-B8FC-AC1667EBCBE1}">
+            <a:ext uri="{AF507438-7753-43e0-B8FC-AC1667EBCBE1}">
               <a14:hiddenEffects xmlns:a14="http://schemas.microsoft.com/office/drawing/2010/main">
                 <a:effectLst>
                   <a:outerShdw blurRad="63500" dist="38099" dir="2700000" algn="ctr" rotWithShape="0">
@@ -757,7 +757,7 @@
           </a:ln>
           <a:effectLst/>
           <a:extLst>
-            <a:ext uri="{91240B29-F687-4F45-9708-019B960494DF}">
+            <a:ext uri="{91240B29-F687-4f45-9708-019B960494DF}">
               <a14:hiddenLine xmlns:a14="http://schemas.microsoft.com/office/drawing/2010/main" w="9525" cap="flat">
                 <a:solidFill>
                   <a:srgbClr val="808080"/>
@@ -767,7 +767,7 @@
                 <a:tailEnd/>
               </a14:hiddenLine>
             </a:ext>
-            <a:ext uri="{AF507438-7753-43E0-B8FC-AC1667EBCBE1}">
+            <a:ext uri="{AF507438-7753-43e0-B8FC-AC1667EBCBE1}">
               <a14:hiddenEffects xmlns:a14="http://schemas.microsoft.com/office/drawing/2010/main">
                 <a:effectLst>
                   <a:outerShdw blurRad="63500" dist="38099" dir="2700000" algn="ctr" rotWithShape="0">
@@ -815,14 +815,14 @@
           </a:ln>
           <a:effectLst/>
           <a:extLst>
-            <a:ext uri="{909E8E84-426E-40DD-AFC4-6F175D3DCCD1}">
+            <a:ext uri="{909E8E84-426E-40dd-AFC4-6F175D3DCCD1}">
               <a14:hiddenFill xmlns:a14="http://schemas.microsoft.com/office/drawing/2010/main">
                 <a:solidFill>
                   <a:srgbClr val="FFFFFF"/>
                 </a:solidFill>
               </a14:hiddenFill>
             </a:ext>
-            <a:ext uri="{91240B29-F687-4F45-9708-019B960494DF}">
+            <a:ext uri="{91240B29-F687-4f45-9708-019B960494DF}">
               <a14:hiddenLine xmlns:a14="http://schemas.microsoft.com/office/drawing/2010/main" w="9525" cap="flat">
                 <a:solidFill>
                   <a:srgbClr val="808080"/>
@@ -832,7 +832,7 @@
                 <a:tailEnd/>
               </a14:hiddenLine>
             </a:ext>
-            <a:ext uri="{AF507438-7753-43E0-B8FC-AC1667EBCBE1}">
+            <a:ext uri="{AF507438-7753-43e0-B8FC-AC1667EBCBE1}">
               <a14:hiddenEffects xmlns:a14="http://schemas.microsoft.com/office/drawing/2010/main">
                 <a:effectLst>
                   <a:outerShdw blurRad="63500" dist="38099" dir="2700000" algn="ctr" rotWithShape="0">
@@ -844,7 +844,7 @@
               </a14:hiddenEffects>
             </a:ext>
             <a:ext uri="{FAA26D3D-D897-4be2-8F04-BA451C77F1D7}">
-              <ma14:placeholderFlag xmlns:ma14="http://schemas.microsoft.com/office/mac/drawingml/2011/main" xmlns="" val="1"/>
+              <ma14:placeholderFlag xmlns:ma14="http://schemas.microsoft.com/office/mac/drawingml/2011/main" val="1"/>
             </a:ext>
           </a:extLst>
         </p:spPr>
@@ -873,14 +873,14 @@
           </a:ln>
           <a:effectLst/>
           <a:extLst>
-            <a:ext uri="{909E8E84-426E-40DD-AFC4-6F175D3DCCD1}">
+            <a:ext uri="{909E8E84-426E-40dd-AFC4-6F175D3DCCD1}">
               <a14:hiddenFill xmlns:a14="http://schemas.microsoft.com/office/drawing/2010/main">
                 <a:solidFill>
                   <a:srgbClr val="FFFFFF"/>
                 </a:solidFill>
               </a14:hiddenFill>
             </a:ext>
-            <a:ext uri="{91240B29-F687-4F45-9708-019B960494DF}">
+            <a:ext uri="{91240B29-F687-4f45-9708-019B960494DF}">
               <a14:hiddenLine xmlns:a14="http://schemas.microsoft.com/office/drawing/2010/main" w="9525" cap="flat">
                 <a:solidFill>
                   <a:srgbClr val="808080"/>
@@ -890,7 +890,7 @@
                 <a:tailEnd/>
               </a14:hiddenLine>
             </a:ext>
-            <a:ext uri="{AF507438-7753-43E0-B8FC-AC1667EBCBE1}">
+            <a:ext uri="{AF507438-7753-43e0-B8FC-AC1667EBCBE1}">
               <a14:hiddenEffects xmlns:a14="http://schemas.microsoft.com/office/drawing/2010/main">
                 <a:effectLst>
                   <a:outerShdw blurRad="63500" dist="38099" dir="2700000" algn="ctr" rotWithShape="0">
@@ -902,7 +902,7 @@
               </a14:hiddenEffects>
             </a:ext>
             <a:ext uri="{FAA26D3D-D897-4be2-8F04-BA451C77F1D7}">
-              <ma14:placeholderFlag xmlns:ma14="http://schemas.microsoft.com/office/mac/drawingml/2011/main" xmlns="" val="1"/>
+              <ma14:placeholderFlag xmlns:ma14="http://schemas.microsoft.com/office/mac/drawingml/2011/main" val="1"/>
             </a:ext>
           </a:extLst>
         </p:spPr>
@@ -941,14 +941,14 @@
           </a:ln>
           <a:effectLst/>
           <a:extLst>
-            <a:ext uri="{909E8E84-426E-40DD-AFC4-6F175D3DCCD1}">
+            <a:ext uri="{909E8E84-426E-40dd-AFC4-6F175D3DCCD1}">
               <a14:hiddenFill xmlns:a14="http://schemas.microsoft.com/office/drawing/2010/main">
                 <a:solidFill>
                   <a:srgbClr val="FFFFFF"/>
                 </a:solidFill>
               </a14:hiddenFill>
             </a:ext>
-            <a:ext uri="{91240B29-F687-4F45-9708-019B960494DF}">
+            <a:ext uri="{91240B29-F687-4f45-9708-019B960494DF}">
               <a14:hiddenLine xmlns:a14="http://schemas.microsoft.com/office/drawing/2010/main" w="9525" cap="flat">
                 <a:solidFill>
                   <a:srgbClr val="808080"/>
@@ -958,7 +958,7 @@
                 <a:tailEnd/>
               </a14:hiddenLine>
             </a:ext>
-            <a:ext uri="{AF507438-7753-43E0-B8FC-AC1667EBCBE1}">
+            <a:ext uri="{AF507438-7753-43e0-B8FC-AC1667EBCBE1}">
               <a14:hiddenEffects xmlns:a14="http://schemas.microsoft.com/office/drawing/2010/main">
                 <a:effectLst>
                   <a:outerShdw blurRad="63500" dist="38099" dir="2700000" algn="ctr" rotWithShape="0">
@@ -1004,14 +1004,14 @@
           </a:ln>
           <a:effectLst/>
           <a:extLst>
-            <a:ext uri="{909E8E84-426E-40DD-AFC4-6F175D3DCCD1}">
+            <a:ext uri="{909E8E84-426E-40dd-AFC4-6F175D3DCCD1}">
               <a14:hiddenFill xmlns:a14="http://schemas.microsoft.com/office/drawing/2010/main">
                 <a:solidFill>
                   <a:srgbClr val="FFFFFF"/>
                 </a:solidFill>
               </a14:hiddenFill>
             </a:ext>
-            <a:ext uri="{91240B29-F687-4F45-9708-019B960494DF}">
+            <a:ext uri="{91240B29-F687-4f45-9708-019B960494DF}">
               <a14:hiddenLine xmlns:a14="http://schemas.microsoft.com/office/drawing/2010/main" w="9525" cap="flat">
                 <a:solidFill>
                   <a:srgbClr val="808080"/>
@@ -1021,7 +1021,7 @@
                 <a:tailEnd/>
               </a14:hiddenLine>
             </a:ext>
-            <a:ext uri="{AF507438-7753-43E0-B8FC-AC1667EBCBE1}">
+            <a:ext uri="{AF507438-7753-43e0-B8FC-AC1667EBCBE1}">
               <a14:hiddenEffects xmlns:a14="http://schemas.microsoft.com/office/drawing/2010/main">
                 <a:effectLst>
                   <a:outerShdw blurRad="63500" dist="38099" dir="2700000" algn="ctr" rotWithShape="0">
@@ -1067,14 +1067,14 @@
           </a:ln>
           <a:effectLst/>
           <a:extLst>
-            <a:ext uri="{909E8E84-426E-40DD-AFC4-6F175D3DCCD1}">
+            <a:ext uri="{909E8E84-426E-40dd-AFC4-6F175D3DCCD1}">
               <a14:hiddenFill xmlns:a14="http://schemas.microsoft.com/office/drawing/2010/main">
                 <a:solidFill>
                   <a:srgbClr val="FFFFFF"/>
                 </a:solidFill>
               </a14:hiddenFill>
             </a:ext>
-            <a:ext uri="{91240B29-F687-4F45-9708-019B960494DF}">
+            <a:ext uri="{91240B29-F687-4f45-9708-019B960494DF}">
               <a14:hiddenLine xmlns:a14="http://schemas.microsoft.com/office/drawing/2010/main" w="9525" cap="flat">
                 <a:solidFill>
                   <a:srgbClr val="808080"/>
@@ -1084,7 +1084,7 @@
                 <a:tailEnd/>
               </a14:hiddenLine>
             </a:ext>
-            <a:ext uri="{AF507438-7753-43E0-B8FC-AC1667EBCBE1}">
+            <a:ext uri="{AF507438-7753-43e0-B8FC-AC1667EBCBE1}">
               <a14:hiddenEffects xmlns:a14="http://schemas.microsoft.com/office/drawing/2010/main">
                 <a:effectLst>
                   <a:outerShdw blurRad="63500" dist="38099" dir="2700000" algn="ctr" rotWithShape="0">
@@ -1132,14 +1132,14 @@
           </a:ln>
           <a:effectLst/>
           <a:extLst>
-            <a:ext uri="{909E8E84-426E-40DD-AFC4-6F175D3DCCD1}">
+            <a:ext uri="{909E8E84-426E-40dd-AFC4-6F175D3DCCD1}">
               <a14:hiddenFill xmlns:a14="http://schemas.microsoft.com/office/drawing/2010/main">
                 <a:solidFill>
                   <a:srgbClr val="FFFFFF"/>
                 </a:solidFill>
               </a14:hiddenFill>
             </a:ext>
-            <a:ext uri="{91240B29-F687-4F45-9708-019B960494DF}">
+            <a:ext uri="{91240B29-F687-4f45-9708-019B960494DF}">
               <a14:hiddenLine xmlns:a14="http://schemas.microsoft.com/office/drawing/2010/main" w="9525" cap="flat">
                 <a:solidFill>
                   <a:srgbClr val="808080"/>
@@ -1149,7 +1149,7 @@
                 <a:tailEnd/>
               </a14:hiddenLine>
             </a:ext>
-            <a:ext uri="{AF507438-7753-43E0-B8FC-AC1667EBCBE1}">
+            <a:ext uri="{AF507438-7753-43e0-B8FC-AC1667EBCBE1}">
               <a14:hiddenEffects xmlns:a14="http://schemas.microsoft.com/office/drawing/2010/main">
                 <a:effectLst>
                   <a:outerShdw blurRad="63500" dist="38099" dir="2700000" algn="ctr" rotWithShape="0">
@@ -1161,7 +1161,7 @@
               </a14:hiddenEffects>
             </a:ext>
             <a:ext uri="{FAA26D3D-D897-4be2-8F04-BA451C77F1D7}">
-              <ma14:placeholderFlag xmlns:ma14="http://schemas.microsoft.com/office/mac/drawingml/2011/main" xmlns="" val="1"/>
+              <ma14:placeholderFlag xmlns:ma14="http://schemas.microsoft.com/office/mac/drawingml/2011/main" val="1"/>
             </a:ext>
           </a:extLst>
         </p:spPr>
@@ -7977,14 +7977,14 @@
           </a:ln>
           <a:effectLst/>
           <a:extLst>
-            <a:ext uri="{909E8E84-426E-40DD-AFC4-6F175D3DCCD1}">
+            <a:ext uri="{909E8E84-426E-40dd-AFC4-6F175D3DCCD1}">
               <a14:hiddenFill xmlns:a14="http://schemas.microsoft.com/office/drawing/2010/main">
                 <a:solidFill>
                   <a:srgbClr val="FFFFFF"/>
                 </a:solidFill>
               </a14:hiddenFill>
             </a:ext>
-            <a:ext uri="{91240B29-F687-4F45-9708-019B960494DF}">
+            <a:ext uri="{91240B29-F687-4f45-9708-019B960494DF}">
               <a14:hiddenLine xmlns:a14="http://schemas.microsoft.com/office/drawing/2010/main" w="9525" cap="flat">
                 <a:solidFill>
                   <a:srgbClr val="808080"/>
@@ -7994,7 +7994,7 @@
                 <a:tailEnd/>
               </a14:hiddenLine>
             </a:ext>
-            <a:ext uri="{AF507438-7753-43E0-B8FC-AC1667EBCBE1}">
+            <a:ext uri="{AF507438-7753-43e0-B8FC-AC1667EBCBE1}">
               <a14:hiddenEffects xmlns:a14="http://schemas.microsoft.com/office/drawing/2010/main">
                 <a:effectLst>
                   <a:outerShdw blurRad="63500" dist="38099" dir="2700000" algn="ctr" rotWithShape="0">
@@ -8006,7 +8006,7 @@
               </a14:hiddenEffects>
             </a:ext>
             <a:ext uri="{FAA26D3D-D897-4be2-8F04-BA451C77F1D7}">
-              <ma14:placeholderFlag xmlns:ma14="http://schemas.microsoft.com/office/mac/drawingml/2011/main" xmlns="" val="1"/>
+              <ma14:placeholderFlag xmlns:ma14="http://schemas.microsoft.com/office/mac/drawingml/2011/main" val="1"/>
             </a:ext>
           </a:extLst>
         </p:spPr>
@@ -8050,14 +8050,14 @@
           </a:ln>
           <a:effectLst/>
           <a:extLst>
-            <a:ext uri="{909E8E84-426E-40DD-AFC4-6F175D3DCCD1}">
+            <a:ext uri="{909E8E84-426E-40dd-AFC4-6F175D3DCCD1}">
               <a14:hiddenFill xmlns:a14="http://schemas.microsoft.com/office/drawing/2010/main">
                 <a:solidFill>
                   <a:srgbClr val="FFFFFF"/>
                 </a:solidFill>
               </a14:hiddenFill>
             </a:ext>
-            <a:ext uri="{91240B29-F687-4F45-9708-019B960494DF}">
+            <a:ext uri="{91240B29-F687-4f45-9708-019B960494DF}">
               <a14:hiddenLine xmlns:a14="http://schemas.microsoft.com/office/drawing/2010/main" w="9525" cap="flat">
                 <a:solidFill>
                   <a:srgbClr val="808080"/>
@@ -8067,7 +8067,7 @@
                 <a:tailEnd/>
               </a14:hiddenLine>
             </a:ext>
-            <a:ext uri="{AF507438-7753-43E0-B8FC-AC1667EBCBE1}">
+            <a:ext uri="{AF507438-7753-43e0-B8FC-AC1667EBCBE1}">
               <a14:hiddenEffects xmlns:a14="http://schemas.microsoft.com/office/drawing/2010/main">
                 <a:effectLst>
                   <a:outerShdw blurRad="63500" dist="38099" dir="2700000" algn="ctr" rotWithShape="0">
@@ -8079,7 +8079,7 @@
               </a14:hiddenEffects>
             </a:ext>
             <a:ext uri="{FAA26D3D-D897-4be2-8F04-BA451C77F1D7}">
-              <ma14:placeholderFlag xmlns:ma14="http://schemas.microsoft.com/office/mac/drawingml/2011/main" xmlns="" val="1"/>
+              <ma14:placeholderFlag xmlns:ma14="http://schemas.microsoft.com/office/mac/drawingml/2011/main" val="1"/>
             </a:ext>
           </a:extLst>
         </p:spPr>
@@ -8177,14 +8177,14 @@
           </a:ln>
           <a:effectLst/>
           <a:extLst>
-            <a:ext uri="{909E8E84-426E-40DD-AFC4-6F175D3DCCD1}">
+            <a:ext uri="{909E8E84-426E-40dd-AFC4-6F175D3DCCD1}">
               <a14:hiddenFill xmlns:a14="http://schemas.microsoft.com/office/drawing/2010/main">
                 <a:solidFill>
                   <a:srgbClr val="FFFFFF"/>
                 </a:solidFill>
               </a14:hiddenFill>
             </a:ext>
-            <a:ext uri="{91240B29-F687-4F45-9708-019B960494DF}">
+            <a:ext uri="{91240B29-F687-4f45-9708-019B960494DF}">
               <a14:hiddenLine xmlns:a14="http://schemas.microsoft.com/office/drawing/2010/main" w="9525" cap="flat">
                 <a:solidFill>
                   <a:srgbClr val="808080"/>
@@ -8194,7 +8194,7 @@
                 <a:tailEnd/>
               </a14:hiddenLine>
             </a:ext>
-            <a:ext uri="{AF507438-7753-43E0-B8FC-AC1667EBCBE1}">
+            <a:ext uri="{AF507438-7753-43e0-B8FC-AC1667EBCBE1}">
               <a14:hiddenEffects xmlns:a14="http://schemas.microsoft.com/office/drawing/2010/main">
                 <a:effectLst>
                   <a:outerShdw blurRad="63500" dist="38099" dir="2700000" algn="ctr" rotWithShape="0">
@@ -8240,14 +8240,14 @@
           </a:ln>
           <a:effectLst/>
           <a:extLst>
-            <a:ext uri="{909E8E84-426E-40DD-AFC4-6F175D3DCCD1}">
+            <a:ext uri="{909E8E84-426E-40dd-AFC4-6F175D3DCCD1}">
               <a14:hiddenFill xmlns:a14="http://schemas.microsoft.com/office/drawing/2010/main">
                 <a:solidFill>
                   <a:srgbClr val="FFFFFF"/>
                 </a:solidFill>
               </a14:hiddenFill>
             </a:ext>
-            <a:ext uri="{91240B29-F687-4F45-9708-019B960494DF}">
+            <a:ext uri="{91240B29-F687-4f45-9708-019B960494DF}">
               <a14:hiddenLine xmlns:a14="http://schemas.microsoft.com/office/drawing/2010/main" w="9525" cap="flat">
                 <a:solidFill>
                   <a:srgbClr val="808080"/>
@@ -8257,7 +8257,7 @@
                 <a:tailEnd/>
               </a14:hiddenLine>
             </a:ext>
-            <a:ext uri="{AF507438-7753-43E0-B8FC-AC1667EBCBE1}">
+            <a:ext uri="{AF507438-7753-43e0-B8FC-AC1667EBCBE1}">
               <a14:hiddenEffects xmlns:a14="http://schemas.microsoft.com/office/drawing/2010/main">
                 <a:effectLst>
                   <a:outerShdw blurRad="63500" dist="38099" dir="2700000" algn="ctr" rotWithShape="0">
@@ -8305,14 +8305,14 @@
           </a:ln>
           <a:effectLst/>
           <a:extLst>
-            <a:ext uri="{909E8E84-426E-40DD-AFC4-6F175D3DCCD1}">
+            <a:ext uri="{909E8E84-426E-40dd-AFC4-6F175D3DCCD1}">
               <a14:hiddenFill xmlns:a14="http://schemas.microsoft.com/office/drawing/2010/main">
                 <a:solidFill>
                   <a:srgbClr val="FFFFFF"/>
                 </a:solidFill>
               </a14:hiddenFill>
             </a:ext>
-            <a:ext uri="{91240B29-F687-4F45-9708-019B960494DF}">
+            <a:ext uri="{91240B29-F687-4f45-9708-019B960494DF}">
               <a14:hiddenLine xmlns:a14="http://schemas.microsoft.com/office/drawing/2010/main" w="9525" cap="flat">
                 <a:solidFill>
                   <a:srgbClr val="808080"/>
@@ -8322,7 +8322,7 @@
                 <a:tailEnd/>
               </a14:hiddenLine>
             </a:ext>
-            <a:ext uri="{AF507438-7753-43E0-B8FC-AC1667EBCBE1}">
+            <a:ext uri="{AF507438-7753-43e0-B8FC-AC1667EBCBE1}">
               <a14:hiddenEffects xmlns:a14="http://schemas.microsoft.com/office/drawing/2010/main">
                 <a:effectLst>
                   <a:outerShdw blurRad="63500" dist="38099" dir="2700000" algn="ctr" rotWithShape="0">
@@ -8334,7 +8334,7 @@
               </a14:hiddenEffects>
             </a:ext>
             <a:ext uri="{FAA26D3D-D897-4be2-8F04-BA451C77F1D7}">
-              <ma14:placeholderFlag xmlns:ma14="http://schemas.microsoft.com/office/mac/drawingml/2011/main" xmlns="" val="1"/>
+              <ma14:placeholderFlag xmlns:ma14="http://schemas.microsoft.com/office/mac/drawingml/2011/main" val="1"/>
             </a:ext>
           </a:extLst>
         </p:spPr>
@@ -8403,7 +8403,7 @@
           <a:effectLst/>
           <a:extLst>
             <a:ext uri="{FAA26D3D-D897-4be2-8F04-BA451C77F1D7}">
-              <ma14:placeholderFlag xmlns:ma14="http://schemas.microsoft.com/office/mac/drawingml/2011/main" xmlns="" val="1"/>
+              <ma14:placeholderFlag xmlns:ma14="http://schemas.microsoft.com/office/mac/drawingml/2011/main" val="1"/>
             </a:ext>
           </a:extLst>
         </p:spPr>
@@ -9307,14 +9307,14 @@
           </a:ln>
           <a:effectLst/>
           <a:extLst>
-            <a:ext uri="{909E8E84-426E-40DD-AFC4-6F175D3DCCD1}">
+            <a:ext uri="{909E8E84-426E-40dd-AFC4-6F175D3DCCD1}">
               <a14:hiddenFill xmlns:a14="http://schemas.microsoft.com/office/drawing/2010/main">
                 <a:solidFill>
                   <a:srgbClr val="FFFFFF"/>
                 </a:solidFill>
               </a14:hiddenFill>
             </a:ext>
-            <a:ext uri="{91240B29-F687-4F45-9708-019B960494DF}">
+            <a:ext uri="{91240B29-F687-4f45-9708-019B960494DF}">
               <a14:hiddenLine xmlns:a14="http://schemas.microsoft.com/office/drawing/2010/main" w="9525" cap="flat">
                 <a:solidFill>
                   <a:srgbClr val="808080"/>
@@ -9324,7 +9324,7 @@
                 <a:tailEnd/>
               </a14:hiddenLine>
             </a:ext>
-            <a:ext uri="{AF507438-7753-43E0-B8FC-AC1667EBCBE1}">
+            <a:ext uri="{AF507438-7753-43e0-B8FC-AC1667EBCBE1}">
               <a14:hiddenEffects xmlns:a14="http://schemas.microsoft.com/office/drawing/2010/main">
                 <a:effectLst>
                   <a:outerShdw blurRad="63500" dist="38099" dir="2700000" algn="ctr" rotWithShape="0">
@@ -9336,7 +9336,7 @@
               </a14:hiddenEffects>
             </a:ext>
             <a:ext uri="{FAA26D3D-D897-4be2-8F04-BA451C77F1D7}">
-              <ma14:placeholderFlag xmlns:ma14="http://schemas.microsoft.com/office/mac/drawingml/2011/main" xmlns="" val="1"/>
+              <ma14:placeholderFlag xmlns:ma14="http://schemas.microsoft.com/office/mac/drawingml/2011/main" val="1"/>
             </a:ext>
           </a:extLst>
         </p:spPr>
@@ -9620,7 +9620,7 @@
   <p:timing>
     <p:tnLst>
       <p:par>
-        <p:cTn id="1" dur="indefinite" restart="never" nodeType="tmRoot"/>
+        <p:cTn xmlns:p14="http://schemas.microsoft.com/office/powerpoint/2010/main" id="1" dur="indefinite" restart="never" nodeType="tmRoot"/>
       </p:par>
     </p:tnLst>
   </p:timing>
@@ -9727,7 +9727,7 @@
           </a:prstGeom>
           <a:noFill/>
           <a:extLst>
-            <a:ext uri="{909E8E84-426E-40DD-AFC4-6F175D3DCCD1}">
+            <a:ext uri="{909E8E84-426E-40dd-AFC4-6F175D3DCCD1}">
               <a14:hiddenFill xmlns:a14="http://schemas.microsoft.com/office/drawing/2010/main">
                 <a:solidFill>
                   <a:srgbClr val="FFFFFF"/>
@@ -9750,7 +9750,7 @@
   <p:timing>
     <p:tnLst>
       <p:par>
-        <p:cTn id="1" dur="indefinite" restart="never" nodeType="tmRoot"/>
+        <p:cTn xmlns:p14="http://schemas.microsoft.com/office/powerpoint/2010/main" id="1" dur="indefinite" restart="never" nodeType="tmRoot"/>
       </p:par>
     </p:tnLst>
   </p:timing>
@@ -10594,7 +10594,7 @@
         </p:nvGraphicFramePr>
         <p:xfrm>
           <a:off x="838200" y="1276350"/>
-          <a:ext cx="7504114" cy="2926080"/>
+          <a:ext cx="7504114" cy="2926079"/>
         </p:xfrm>
         <a:graphic>
           <a:graphicData uri="http://schemas.openxmlformats.org/drawingml/2006/table">
@@ -10886,7 +10886,7 @@
   <p:timing>
     <p:tnLst>
       <p:par>
-        <p:cTn id="1" dur="indefinite" restart="never" nodeType="tmRoot"/>
+        <p:cTn xmlns:p14="http://schemas.microsoft.com/office/powerpoint/2010/main" id="1" dur="indefinite" restart="never" nodeType="tmRoot"/>
       </p:par>
     </p:tnLst>
   </p:timing>
@@ -10990,7 +10990,7 @@
           </a:ln>
           <a:effectLst/>
           <a:extLst>
-            <a:ext uri="{AF507438-7753-43E0-B8FC-AC1667EBCBE1}">
+            <a:ext uri="{AF507438-7753-43e0-B8FC-AC1667EBCBE1}">
               <a14:hiddenEffects xmlns:a14="http://schemas.microsoft.com/office/drawing/2010/main">
                 <a:effectLst>
                   <a:outerShdw blurRad="63500" dist="38099" dir="2700000" algn="ctr" rotWithShape="0">
@@ -11506,7 +11506,7 @@
           </a:ln>
           <a:effectLst/>
           <a:extLst>
-            <a:ext uri="{AF507438-7753-43E0-B8FC-AC1667EBCBE1}">
+            <a:ext uri="{AF507438-7753-43e0-B8FC-AC1667EBCBE1}">
               <a14:hiddenEffects xmlns:a14="http://schemas.microsoft.com/office/drawing/2010/main">
                 <a:effectLst>
                   <a:outerShdw blurRad="63500" dist="38099" dir="2700000" algn="ctr" rotWithShape="0">
@@ -11533,7 +11533,7 @@
   <p:timing>
     <p:tnLst>
       <p:par>
-        <p:cTn id="1" dur="indefinite" restart="never" nodeType="tmRoot"/>
+        <p:cTn xmlns:p14="http://schemas.microsoft.com/office/powerpoint/2010/main" id="1" dur="indefinite" restart="never" nodeType="tmRoot"/>
       </p:par>
     </p:tnLst>
   </p:timing>
@@ -11709,7 +11709,7 @@
   <p:timing>
     <p:tnLst>
       <p:par>
-        <p:cTn id="1" dur="indefinite" restart="never" nodeType="tmRoot"/>
+        <p:cTn xmlns:p14="http://schemas.microsoft.com/office/powerpoint/2010/main" id="1" dur="indefinite" restart="never" nodeType="tmRoot"/>
       </p:par>
     </p:tnLst>
   </p:timing>
@@ -12043,7 +12043,7 @@
   <p:timing>
     <p:tnLst>
       <p:par>
-        <p:cTn id="1" dur="indefinite" restart="never" nodeType="tmRoot"/>
+        <p:cTn xmlns:p14="http://schemas.microsoft.com/office/powerpoint/2010/main" id="1" dur="indefinite" restart="never" nodeType="tmRoot"/>
       </p:par>
     </p:tnLst>
   </p:timing>
@@ -12203,7 +12203,7 @@
   <p:timing>
     <p:tnLst>
       <p:par>
-        <p:cTn id="1" dur="indefinite" restart="never" nodeType="tmRoot"/>
+        <p:cTn xmlns:p14="http://schemas.microsoft.com/office/powerpoint/2010/main" id="1" dur="indefinite" restart="never" nodeType="tmRoot"/>
       </p:par>
     </p:tnLst>
   </p:timing>
@@ -12532,7 +12532,7 @@
   <p:timing>
     <p:tnLst>
       <p:par>
-        <p:cTn id="1" dur="indefinite" restart="never" nodeType="tmRoot"/>
+        <p:cTn xmlns:p14="http://schemas.microsoft.com/office/powerpoint/2010/main" id="1" dur="indefinite" restart="never" nodeType="tmRoot"/>
       </p:par>
     </p:tnLst>
   </p:timing>
@@ -12664,7 +12664,7 @@
   <p:timing>
     <p:tnLst>
       <p:par>
-        <p:cTn id="1" dur="indefinite" restart="never" nodeType="tmRoot"/>
+        <p:cTn xmlns:p14="http://schemas.microsoft.com/office/powerpoint/2010/main" id="1" dur="indefinite" restart="never" nodeType="tmRoot"/>
       </p:par>
     </p:tnLst>
   </p:timing>
@@ -12819,7 +12819,7 @@
   <p:timing>
     <p:tnLst>
       <p:par>
-        <p:cTn id="1" dur="indefinite" restart="never" nodeType="tmRoot"/>
+        <p:cTn xmlns:p14="http://schemas.microsoft.com/office/powerpoint/2010/main" id="1" dur="indefinite" restart="never" nodeType="tmRoot"/>
       </p:par>
     </p:tnLst>
   </p:timing>
@@ -13024,14 +13024,14 @@
           </a:ln>
           <a:effectLst/>
           <a:extLst>
-            <a:ext uri="{909E8E84-426E-40DD-AFC4-6F175D3DCCD1}">
+            <a:ext uri="{909E8E84-426E-40dd-AFC4-6F175D3DCCD1}">
               <a14:hiddenFill xmlns:a14="http://schemas.microsoft.com/office/drawing/2010/main">
                 <a:solidFill>
                   <a:srgbClr val="FFFFFF"/>
                 </a:solidFill>
               </a14:hiddenFill>
             </a:ext>
-            <a:ext uri="{91240B29-F687-4F45-9708-019B960494DF}">
+            <a:ext uri="{91240B29-F687-4f45-9708-019B960494DF}">
               <a14:hiddenLine xmlns:a14="http://schemas.microsoft.com/office/drawing/2010/main" w="9525" cap="flat">
                 <a:solidFill>
                   <a:srgbClr val="808080"/>
@@ -13041,7 +13041,7 @@
                 <a:tailEnd/>
               </a14:hiddenLine>
             </a:ext>
-            <a:ext uri="{AF507438-7753-43E0-B8FC-AC1667EBCBE1}">
+            <a:ext uri="{AF507438-7753-43e0-B8FC-AC1667EBCBE1}">
               <a14:hiddenEffects xmlns:a14="http://schemas.microsoft.com/office/drawing/2010/main">
                 <a:effectLst>
                   <a:outerShdw blurRad="63500" dist="38099" dir="2700000" algn="ctr" rotWithShape="0">
@@ -13053,7 +13053,7 @@
               </a14:hiddenEffects>
             </a:ext>
             <a:ext uri="{FAA26D3D-D897-4be2-8F04-BA451C77F1D7}">
-              <ma14:placeholderFlag xmlns:ma14="http://schemas.microsoft.com/office/mac/drawingml/2011/main" xmlns="" val="1"/>
+              <ma14:placeholderFlag xmlns:ma14="http://schemas.microsoft.com/office/mac/drawingml/2011/main" val="1"/>
             </a:ext>
           </a:extLst>
         </p:spPr>
@@ -13303,7 +13303,7 @@
   <p:timing>
     <p:tnLst>
       <p:par>
-        <p:cTn id="1" dur="indefinite" restart="never" nodeType="tmRoot"/>
+        <p:cTn xmlns:p14="http://schemas.microsoft.com/office/powerpoint/2010/main" id="1" dur="indefinite" restart="never" nodeType="tmRoot"/>
       </p:par>
     </p:tnLst>
   </p:timing>
@@ -13505,14 +13505,14 @@
           </a:ln>
           <a:effectLst/>
           <a:extLst>
-            <a:ext uri="{909E8E84-426E-40DD-AFC4-6F175D3DCCD1}">
+            <a:ext uri="{909E8E84-426E-40dd-AFC4-6F175D3DCCD1}">
               <a14:hiddenFill xmlns:a14="http://schemas.microsoft.com/office/drawing/2010/main">
                 <a:solidFill>
                   <a:srgbClr val="FFFFFF"/>
                 </a:solidFill>
               </a14:hiddenFill>
             </a:ext>
-            <a:ext uri="{91240B29-F687-4F45-9708-019B960494DF}">
+            <a:ext uri="{91240B29-F687-4f45-9708-019B960494DF}">
               <a14:hiddenLine xmlns:a14="http://schemas.microsoft.com/office/drawing/2010/main" w="9525" cap="flat">
                 <a:solidFill>
                   <a:srgbClr val="808080"/>
@@ -13522,7 +13522,7 @@
                 <a:tailEnd/>
               </a14:hiddenLine>
             </a:ext>
-            <a:ext uri="{AF507438-7753-43E0-B8FC-AC1667EBCBE1}">
+            <a:ext uri="{AF507438-7753-43e0-B8FC-AC1667EBCBE1}">
               <a14:hiddenEffects xmlns:a14="http://schemas.microsoft.com/office/drawing/2010/main">
                 <a:effectLst>
                   <a:outerShdw blurRad="63500" dist="38099" dir="2700000" algn="ctr" rotWithShape="0">
@@ -13534,7 +13534,7 @@
               </a14:hiddenEffects>
             </a:ext>
             <a:ext uri="{FAA26D3D-D897-4be2-8F04-BA451C77F1D7}">
-              <ma14:placeholderFlag xmlns:ma14="http://schemas.microsoft.com/office/mac/drawingml/2011/main" xmlns="" val="1"/>
+              <ma14:placeholderFlag xmlns:ma14="http://schemas.microsoft.com/office/mac/drawingml/2011/main" val="1"/>
             </a:ext>
           </a:extLst>
         </p:spPr>
@@ -13784,7 +13784,7 @@
   <p:timing>
     <p:tnLst>
       <p:par>
-        <p:cTn id="1" dur="indefinite" restart="never" nodeType="tmRoot"/>
+        <p:cTn xmlns:p14="http://schemas.microsoft.com/office/powerpoint/2010/main" id="1" dur="indefinite" restart="never" nodeType="tmRoot"/>
       </p:par>
     </p:tnLst>
   </p:timing>
@@ -13989,14 +13989,14 @@
           </a:ln>
           <a:effectLst/>
           <a:extLst>
-            <a:ext uri="{909E8E84-426E-40DD-AFC4-6F175D3DCCD1}">
+            <a:ext uri="{909E8E84-426E-40dd-AFC4-6F175D3DCCD1}">
               <a14:hiddenFill xmlns:a14="http://schemas.microsoft.com/office/drawing/2010/main">
                 <a:solidFill>
                   <a:srgbClr val="FFFFFF"/>
                 </a:solidFill>
               </a14:hiddenFill>
             </a:ext>
-            <a:ext uri="{91240B29-F687-4F45-9708-019B960494DF}">
+            <a:ext uri="{91240B29-F687-4f45-9708-019B960494DF}">
               <a14:hiddenLine xmlns:a14="http://schemas.microsoft.com/office/drawing/2010/main" w="9525" cap="flat">
                 <a:solidFill>
                   <a:srgbClr val="808080"/>
@@ -14006,7 +14006,7 @@
                 <a:tailEnd/>
               </a14:hiddenLine>
             </a:ext>
-            <a:ext uri="{AF507438-7753-43E0-B8FC-AC1667EBCBE1}">
+            <a:ext uri="{AF507438-7753-43e0-B8FC-AC1667EBCBE1}">
               <a14:hiddenEffects xmlns:a14="http://schemas.microsoft.com/office/drawing/2010/main">
                 <a:effectLst>
                   <a:outerShdw blurRad="63500" dist="38099" dir="2700000" algn="ctr" rotWithShape="0">
@@ -14018,7 +14018,7 @@
               </a14:hiddenEffects>
             </a:ext>
             <a:ext uri="{FAA26D3D-D897-4be2-8F04-BA451C77F1D7}">
-              <ma14:placeholderFlag xmlns:ma14="http://schemas.microsoft.com/office/mac/drawingml/2011/main" xmlns="" val="1"/>
+              <ma14:placeholderFlag xmlns:ma14="http://schemas.microsoft.com/office/mac/drawingml/2011/main" val="1"/>
             </a:ext>
           </a:extLst>
         </p:spPr>
@@ -14268,7 +14268,7 @@
   <p:timing>
     <p:tnLst>
       <p:par>
-        <p:cTn id="1" dur="indefinite" restart="never" nodeType="tmRoot"/>
+        <p:cTn xmlns:p14="http://schemas.microsoft.com/office/powerpoint/2010/main" id="1" dur="indefinite" restart="never" nodeType="tmRoot"/>
       </p:par>
     </p:tnLst>
   </p:timing>
@@ -14466,14 +14466,14 @@
           </a:ln>
           <a:effectLst/>
           <a:extLst>
-            <a:ext uri="{909E8E84-426E-40DD-AFC4-6F175D3DCCD1}">
+            <a:ext uri="{909E8E84-426E-40dd-AFC4-6F175D3DCCD1}">
               <a14:hiddenFill xmlns:a14="http://schemas.microsoft.com/office/drawing/2010/main">
                 <a:solidFill>
                   <a:srgbClr val="FFFFFF"/>
                 </a:solidFill>
               </a14:hiddenFill>
             </a:ext>
-            <a:ext uri="{91240B29-F687-4F45-9708-019B960494DF}">
+            <a:ext uri="{91240B29-F687-4f45-9708-019B960494DF}">
               <a14:hiddenLine xmlns:a14="http://schemas.microsoft.com/office/drawing/2010/main" w="9525" cap="flat">
                 <a:solidFill>
                   <a:srgbClr val="808080"/>
@@ -14483,7 +14483,7 @@
                 <a:tailEnd/>
               </a14:hiddenLine>
             </a:ext>
-            <a:ext uri="{AF507438-7753-43E0-B8FC-AC1667EBCBE1}">
+            <a:ext uri="{AF507438-7753-43e0-B8FC-AC1667EBCBE1}">
               <a14:hiddenEffects xmlns:a14="http://schemas.microsoft.com/office/drawing/2010/main">
                 <a:effectLst>
                   <a:outerShdw blurRad="63500" dist="38099" dir="2700000" algn="ctr" rotWithShape="0">
@@ -14495,7 +14495,7 @@
               </a14:hiddenEffects>
             </a:ext>
             <a:ext uri="{FAA26D3D-D897-4be2-8F04-BA451C77F1D7}">
-              <ma14:placeholderFlag xmlns:ma14="http://schemas.microsoft.com/office/mac/drawingml/2011/main" xmlns="" val="1"/>
+              <ma14:placeholderFlag xmlns:ma14="http://schemas.microsoft.com/office/mac/drawingml/2011/main" val="1"/>
             </a:ext>
           </a:extLst>
         </p:spPr>
@@ -14745,7 +14745,7 @@
   <p:timing>
     <p:tnLst>
       <p:par>
-        <p:cTn id="1" dur="indefinite" restart="never" nodeType="tmRoot"/>
+        <p:cTn xmlns:p14="http://schemas.microsoft.com/office/powerpoint/2010/main" id="1" dur="indefinite" restart="never" nodeType="tmRoot"/>
       </p:par>
     </p:tnLst>
   </p:timing>
@@ -14901,7 +14901,7 @@
   <p:timing>
     <p:tnLst>
       <p:par>
-        <p:cTn id="1" dur="indefinite" restart="never" nodeType="tmRoot"/>
+        <p:cTn xmlns:p14="http://schemas.microsoft.com/office/powerpoint/2010/main" id="1" dur="indefinite" restart="never" nodeType="tmRoot"/>
       </p:par>
     </p:tnLst>
   </p:timing>
@@ -15063,7 +15063,7 @@
   <p:timing>
     <p:tnLst>
       <p:par>
-        <p:cTn id="1" dur="indefinite" restart="never" nodeType="tmRoot"/>
+        <p:cTn xmlns:p14="http://schemas.microsoft.com/office/powerpoint/2010/main" id="1" dur="indefinite" restart="never" nodeType="tmRoot"/>
       </p:par>
     </p:tnLst>
   </p:timing>
@@ -15205,7 +15205,7 @@
   <p:timing>
     <p:tnLst>
       <p:par>
-        <p:cTn id="1" dur="indefinite" restart="never" nodeType="tmRoot"/>
+        <p:cTn xmlns:p14="http://schemas.microsoft.com/office/powerpoint/2010/main" id="1" dur="indefinite" restart="never" nodeType="tmRoot"/>
       </p:par>
     </p:tnLst>
   </p:timing>
@@ -15401,7 +15401,7 @@
   <p:timing>
     <p:tnLst>
       <p:par>
-        <p:cTn id="1" dur="indefinite" restart="never" nodeType="tmRoot"/>
+        <p:cTn xmlns:p14="http://schemas.microsoft.com/office/powerpoint/2010/main" id="1" dur="indefinite" restart="never" nodeType="tmRoot"/>
       </p:par>
     </p:tnLst>
   </p:timing>
@@ -15565,7 +15565,7 @@
   <p:timing>
     <p:tnLst>
       <p:par>
-        <p:cTn id="1" dur="indefinite" restart="never" nodeType="tmRoot"/>
+        <p:cTn xmlns:p14="http://schemas.microsoft.com/office/powerpoint/2010/main" id="1" dur="indefinite" restart="never" nodeType="tmRoot"/>
       </p:par>
     </p:tnLst>
   </p:timing>
@@ -15712,7 +15712,7 @@
   <p:timing>
     <p:tnLst>
       <p:par>
-        <p:cTn id="1" dur="indefinite" restart="never" nodeType="tmRoot"/>
+        <p:cTn xmlns:p14="http://schemas.microsoft.com/office/powerpoint/2010/main" id="1" dur="indefinite" restart="never" nodeType="tmRoot"/>
       </p:par>
     </p:tnLst>
   </p:timing>
@@ -16107,7 +16107,7 @@
   <p:timing>
     <p:tnLst>
       <p:par>
-        <p:cTn id="1" dur="indefinite" restart="never" nodeType="tmRoot"/>
+        <p:cTn xmlns:p14="http://schemas.microsoft.com/office/powerpoint/2010/main" id="1" dur="indefinite" restart="never" nodeType="tmRoot"/>
       </p:par>
     </p:tnLst>
   </p:timing>
@@ -16297,11 +16297,7 @@
                       </a:r>
                       <a:r>
                         <a:rPr lang="en-US" sz="2200" baseline="0" dirty="0" smtClean="0"/>
-                        <a:t> </a:t>
-                      </a:r>
-                      <a:r>
-                        <a:rPr lang="en-US" sz="2200" baseline="0" dirty="0" smtClean="0"/>
-                        <a:t>Methods (8)</a:t>
+                        <a:t> Methods (8)</a:t>
                       </a:r>
                       <a:endParaRPr lang="en-US" sz="2200" dirty="0"/>
                     </a:p>
@@ -16337,11 +16333,7 @@
                     <a:p>
                       <a:r>
                         <a:rPr lang="en-US" sz="2200" dirty="0" smtClean="0"/>
-                        <a:t>Instance </a:t>
-                      </a:r>
-                      <a:r>
-                        <a:rPr lang="en-US" sz="2200" dirty="0" smtClean="0"/>
-                        <a:t>Methods (9)</a:t>
+                        <a:t>Instance Methods (9)</a:t>
                       </a:r>
                       <a:endParaRPr lang="en-US" sz="2200" dirty="0"/>
                     </a:p>
@@ -16377,11 +16369,7 @@
                     <a:p>
                       <a:r>
                         <a:rPr lang="en-US" sz="2200" dirty="0" smtClean="0"/>
-                        <a:t>Public Static </a:t>
-                      </a:r>
-                      <a:r>
-                        <a:rPr lang="en-US" sz="2200" dirty="0" smtClean="0"/>
-                        <a:t>Methods (8)</a:t>
+                        <a:t>Public Static Methods (8)</a:t>
                       </a:r>
                       <a:endParaRPr lang="en-US" sz="2200" dirty="0"/>
                     </a:p>
@@ -16417,11 +16405,7 @@
                     <a:p>
                       <a:r>
                         <a:rPr lang="en-US" sz="2200" dirty="0" smtClean="0"/>
-                        <a:t>Private Static </a:t>
-                      </a:r>
-                      <a:r>
-                        <a:rPr lang="en-US" sz="2200" dirty="0" smtClean="0"/>
-                        <a:t>Methods (9)</a:t>
+                        <a:t>Private Static Methods (9)</a:t>
                       </a:r>
                       <a:endParaRPr lang="en-US" sz="2200" dirty="0"/>
                     </a:p>
@@ -16495,7 +16479,7 @@
   <p:timing>
     <p:tnLst>
       <p:par>
-        <p:cTn id="1" dur="indefinite" restart="never" nodeType="tmRoot"/>
+        <p:cTn xmlns:p14="http://schemas.microsoft.com/office/powerpoint/2010/main" id="1" dur="indefinite" restart="never" nodeType="tmRoot"/>
       </p:par>
     </p:tnLst>
   </p:timing>
@@ -16666,7 +16650,7 @@
   <p:timing>
     <p:tnLst>
       <p:par>
-        <p:cTn id="1" dur="indefinite" restart="never" nodeType="tmRoot"/>
+        <p:cTn xmlns:p14="http://schemas.microsoft.com/office/powerpoint/2010/main" id="1" dur="indefinite" restart="never" nodeType="tmRoot"/>
       </p:par>
     </p:tnLst>
   </p:timing>
@@ -16943,7 +16927,7 @@
   <p:timing>
     <p:tnLst>
       <p:par>
-        <p:cTn id="1" dur="indefinite" restart="never" nodeType="tmRoot"/>
+        <p:cTn xmlns:p14="http://schemas.microsoft.com/office/powerpoint/2010/main" id="1" dur="indefinite" restart="never" nodeType="tmRoot"/>
       </p:par>
     </p:tnLst>
   </p:timing>
@@ -17226,7 +17210,7 @@
   <p:timing>
     <p:tnLst>
       <p:par>
-        <p:cTn id="1" dur="indefinite" restart="never" nodeType="tmRoot"/>
+        <p:cTn xmlns:p14="http://schemas.microsoft.com/office/powerpoint/2010/main" id="1" dur="indefinite" restart="never" nodeType="tmRoot"/>
       </p:par>
     </p:tnLst>
   </p:timing>
@@ -17467,7 +17451,7 @@
   <p:timing>
     <p:tnLst>
       <p:par>
-        <p:cTn id="1" dur="indefinite" restart="never" nodeType="tmRoot"/>
+        <p:cTn xmlns:p14="http://schemas.microsoft.com/office/powerpoint/2010/main" id="1" dur="indefinite" restart="never" nodeType="tmRoot"/>
       </p:par>
     </p:tnLst>
   </p:timing>
@@ -17571,14 +17555,14 @@
             <a:noFill/>
           </a:ln>
           <a:extLst>
-            <a:ext uri="{909E8E84-426E-40DD-AFC4-6F175D3DCCD1}">
+            <a:ext uri="{909E8E84-426E-40dd-AFC4-6F175D3DCCD1}">
               <a14:hiddenFill xmlns:a14="http://schemas.microsoft.com/office/drawing/2010/main">
                 <a:solidFill>
                   <a:srgbClr val="FFFFFF"/>
                 </a:solidFill>
               </a14:hiddenFill>
             </a:ext>
-            <a:ext uri="{91240B29-F687-4F45-9708-019B960494DF}">
+            <a:ext uri="{91240B29-F687-4f45-9708-019B960494DF}">
               <a14:hiddenLine xmlns:a14="http://schemas.microsoft.com/office/drawing/2010/main" w="9525">
                 <a:solidFill>
                   <a:srgbClr val="000000"/>
@@ -18054,14 +18038,14 @@
             <a:noFill/>
           </a:ln>
           <a:extLst>
-            <a:ext uri="{909E8E84-426E-40DD-AFC4-6F175D3DCCD1}">
+            <a:ext uri="{909E8E84-426E-40dd-AFC4-6F175D3DCCD1}">
               <a14:hiddenFill xmlns:a14="http://schemas.microsoft.com/office/drawing/2010/main">
                 <a:solidFill>
                   <a:srgbClr val="FFFFFF"/>
                 </a:solidFill>
               </a14:hiddenFill>
             </a:ext>
-            <a:ext uri="{91240B29-F687-4F45-9708-019B960494DF}">
+            <a:ext uri="{91240B29-F687-4f45-9708-019B960494DF}">
               <a14:hiddenLine xmlns:a14="http://schemas.microsoft.com/office/drawing/2010/main" w="9525">
                 <a:solidFill>
                   <a:srgbClr val="000000"/>
@@ -18103,7 +18087,7 @@
   <p:timing>
     <p:tnLst>
       <p:par>
-        <p:cTn id="1" dur="indefinite" restart="never" nodeType="tmRoot">
+        <p:cTn xmlns:p14="http://schemas.microsoft.com/office/powerpoint/2010/main" id="1" dur="indefinite" restart="never" nodeType="tmRoot">
           <p:childTnLst>
             <p:seq concurrent="1" nextAc="seek">
               <p:cTn id="2" dur="indefinite" nodeType="mainSeq">
@@ -18434,7 +18418,7 @@
   <p:timing>
     <p:tnLst>
       <p:par>
-        <p:cTn id="1" dur="indefinite" restart="never" nodeType="tmRoot"/>
+        <p:cTn xmlns:p14="http://schemas.microsoft.com/office/powerpoint/2010/main" id="1" dur="indefinite" restart="never" nodeType="tmRoot"/>
       </p:par>
     </p:tnLst>
   </p:timing>
@@ -18660,14 +18644,14 @@
           </a:ln>
           <a:effectLst/>
           <a:extLst>
-            <a:ext uri="{909E8E84-426E-40DD-AFC4-6F175D3DCCD1}">
+            <a:ext uri="{909E8E84-426E-40dd-AFC4-6F175D3DCCD1}">
               <a14:hiddenFill xmlns:a14="http://schemas.microsoft.com/office/drawing/2010/main">
                 <a:solidFill>
                   <a:srgbClr val="FFFFFF"/>
                 </a:solidFill>
               </a14:hiddenFill>
             </a:ext>
-            <a:ext uri="{91240B29-F687-4F45-9708-019B960494DF}">
+            <a:ext uri="{91240B29-F687-4f45-9708-019B960494DF}">
               <a14:hiddenLine xmlns:a14="http://schemas.microsoft.com/office/drawing/2010/main" w="9525" cap="flat">
                 <a:solidFill>
                   <a:srgbClr val="808080"/>
@@ -18677,7 +18661,7 @@
                 <a:tailEnd/>
               </a14:hiddenLine>
             </a:ext>
-            <a:ext uri="{AF507438-7753-43E0-B8FC-AC1667EBCBE1}">
+            <a:ext uri="{AF507438-7753-43e0-B8FC-AC1667EBCBE1}">
               <a14:hiddenEffects xmlns:a14="http://schemas.microsoft.com/office/drawing/2010/main">
                 <a:effectLst>
                   <a:outerShdw blurRad="63500" dist="38099" dir="2700000" algn="ctr" rotWithShape="0">
@@ -18689,7 +18673,7 @@
               </a14:hiddenEffects>
             </a:ext>
             <a:ext uri="{FAA26D3D-D897-4be2-8F04-BA451C77F1D7}">
-              <ma14:placeholderFlag xmlns:ma14="http://schemas.microsoft.com/office/mac/drawingml/2011/main" xmlns="" val="1"/>
+              <ma14:placeholderFlag xmlns:ma14="http://schemas.microsoft.com/office/mac/drawingml/2011/main" val="1"/>
             </a:ext>
           </a:extLst>
         </p:spPr>
@@ -18956,7 +18940,7 @@
   <p:timing>
     <p:tnLst>
       <p:par>
-        <p:cTn id="1" dur="indefinite" restart="never" nodeType="tmRoot"/>
+        <p:cTn xmlns:p14="http://schemas.microsoft.com/office/powerpoint/2010/main" id="1" dur="indefinite" restart="never" nodeType="tmRoot"/>
       </p:par>
     </p:tnLst>
   </p:timing>
@@ -19172,14 +19156,14 @@
           </a:ln>
           <a:effectLst/>
           <a:extLst>
-            <a:ext uri="{909E8E84-426E-40DD-AFC4-6F175D3DCCD1}">
+            <a:ext uri="{909E8E84-426E-40dd-AFC4-6F175D3DCCD1}">
               <a14:hiddenFill xmlns:a14="http://schemas.microsoft.com/office/drawing/2010/main">
                 <a:solidFill>
                   <a:srgbClr val="FFFFFF"/>
                 </a:solidFill>
               </a14:hiddenFill>
             </a:ext>
-            <a:ext uri="{91240B29-F687-4F45-9708-019B960494DF}">
+            <a:ext uri="{91240B29-F687-4f45-9708-019B960494DF}">
               <a14:hiddenLine xmlns:a14="http://schemas.microsoft.com/office/drawing/2010/main" w="9525" cap="flat">
                 <a:solidFill>
                   <a:srgbClr val="808080"/>
@@ -19189,7 +19173,7 @@
                 <a:tailEnd/>
               </a14:hiddenLine>
             </a:ext>
-            <a:ext uri="{AF507438-7753-43E0-B8FC-AC1667EBCBE1}">
+            <a:ext uri="{AF507438-7753-43e0-B8FC-AC1667EBCBE1}">
               <a14:hiddenEffects xmlns:a14="http://schemas.microsoft.com/office/drawing/2010/main">
                 <a:effectLst>
                   <a:outerShdw blurRad="63500" dist="38099" dir="2700000" algn="ctr" rotWithShape="0">
@@ -19201,7 +19185,7 @@
               </a14:hiddenEffects>
             </a:ext>
             <a:ext uri="{FAA26D3D-D897-4be2-8F04-BA451C77F1D7}">
-              <ma14:placeholderFlag xmlns:ma14="http://schemas.microsoft.com/office/mac/drawingml/2011/main" xmlns="" val="1"/>
+              <ma14:placeholderFlag xmlns:ma14="http://schemas.microsoft.com/office/mac/drawingml/2011/main" val="1"/>
             </a:ext>
           </a:extLst>
         </p:spPr>
@@ -19468,7 +19452,7 @@
   <p:timing>
     <p:tnLst>
       <p:par>
-        <p:cTn id="1" dur="indefinite" restart="never" nodeType="tmRoot"/>
+        <p:cTn xmlns:p14="http://schemas.microsoft.com/office/powerpoint/2010/main" id="1" dur="indefinite" restart="never" nodeType="tmRoot"/>
       </p:par>
     </p:tnLst>
   </p:timing>
@@ -19650,14 +19634,14 @@
           </a:ln>
           <a:effectLst/>
           <a:extLst>
-            <a:ext uri="{909E8E84-426E-40DD-AFC4-6F175D3DCCD1}">
+            <a:ext uri="{909E8E84-426E-40dd-AFC4-6F175D3DCCD1}">
               <a14:hiddenFill xmlns:a14="http://schemas.microsoft.com/office/drawing/2010/main">
                 <a:solidFill>
                   <a:srgbClr val="FFFFFF"/>
                 </a:solidFill>
               </a14:hiddenFill>
             </a:ext>
-            <a:ext uri="{91240B29-F687-4F45-9708-019B960494DF}">
+            <a:ext uri="{91240B29-F687-4f45-9708-019B960494DF}">
               <a14:hiddenLine xmlns:a14="http://schemas.microsoft.com/office/drawing/2010/main" w="9525" cap="flat">
                 <a:solidFill>
                   <a:srgbClr val="808080"/>
@@ -19667,7 +19651,7 @@
                 <a:tailEnd/>
               </a14:hiddenLine>
             </a:ext>
-            <a:ext uri="{AF507438-7753-43E0-B8FC-AC1667EBCBE1}">
+            <a:ext uri="{AF507438-7753-43e0-B8FC-AC1667EBCBE1}">
               <a14:hiddenEffects xmlns:a14="http://schemas.microsoft.com/office/drawing/2010/main">
                 <a:effectLst>
                   <a:outerShdw blurRad="63500" dist="38099" dir="2700000" algn="ctr" rotWithShape="0">
@@ -19679,7 +19663,7 @@
               </a14:hiddenEffects>
             </a:ext>
             <a:ext uri="{FAA26D3D-D897-4be2-8F04-BA451C77F1D7}">
-              <ma14:placeholderFlag xmlns:ma14="http://schemas.microsoft.com/office/mac/drawingml/2011/main" xmlns="" val="1"/>
+              <ma14:placeholderFlag xmlns:ma14="http://schemas.microsoft.com/office/mac/drawingml/2011/main" val="1"/>
             </a:ext>
           </a:extLst>
         </p:spPr>
@@ -20117,7 +20101,7 @@
   <p:timing>
     <p:tnLst>
       <p:par>
-        <p:cTn id="1" dur="indefinite" restart="never" nodeType="tmRoot"/>
+        <p:cTn xmlns:p14="http://schemas.microsoft.com/office/powerpoint/2010/main" id="1" dur="indefinite" restart="never" nodeType="tmRoot"/>
       </p:par>
     </p:tnLst>
   </p:timing>
@@ -20227,14 +20211,14 @@
             <a:noFill/>
           </a:ln>
           <a:extLst>
-            <a:ext uri="{909E8E84-426E-40DD-AFC4-6F175D3DCCD1}">
+            <a:ext uri="{909E8E84-426E-40dd-AFC4-6F175D3DCCD1}">
               <a14:hiddenFill xmlns:a14="http://schemas.microsoft.com/office/drawing/2010/main">
                 <a:solidFill>
                   <a:srgbClr val="FFFFFF"/>
                 </a:solidFill>
               </a14:hiddenFill>
             </a:ext>
-            <a:ext uri="{91240B29-F687-4F45-9708-019B960494DF}">
+            <a:ext uri="{91240B29-F687-4f45-9708-019B960494DF}">
               <a14:hiddenLine xmlns:a14="http://schemas.microsoft.com/office/drawing/2010/main" w="9525">
                 <a:solidFill>
                   <a:srgbClr val="000000"/>
@@ -20260,7 +20244,7 @@
   <p:timing>
     <p:tnLst>
       <p:par>
-        <p:cTn id="1" dur="indefinite" restart="never" nodeType="tmRoot"/>
+        <p:cTn xmlns:p14="http://schemas.microsoft.com/office/powerpoint/2010/main" id="1" dur="indefinite" restart="never" nodeType="tmRoot"/>
       </p:par>
     </p:tnLst>
   </p:timing>
@@ -20460,7 +20444,7 @@
   <p:timing>
     <p:tnLst>
       <p:par>
-        <p:cTn id="1" dur="indefinite" restart="never" nodeType="tmRoot"/>
+        <p:cTn xmlns:p14="http://schemas.microsoft.com/office/powerpoint/2010/main" id="1" dur="indefinite" restart="never" nodeType="tmRoot"/>
       </p:par>
     </p:tnLst>
   </p:timing>
@@ -20629,7 +20613,7 @@
   <p:timing>
     <p:tnLst>
       <p:par>
-        <p:cTn id="1" dur="indefinite" restart="never" nodeType="tmRoot"/>
+        <p:cTn xmlns:p14="http://schemas.microsoft.com/office/powerpoint/2010/main" id="1" dur="indefinite" restart="never" nodeType="tmRoot"/>
       </p:par>
     </p:tnLst>
   </p:timing>
@@ -20883,7 +20867,7 @@
   <p:timing>
     <p:tnLst>
       <p:par>
-        <p:cTn id="1" dur="indefinite" restart="never" nodeType="tmRoot">
+        <p:cTn xmlns:p14="http://schemas.microsoft.com/office/powerpoint/2010/main" id="1" dur="indefinite" restart="never" nodeType="tmRoot">
           <p:childTnLst>
             <p:seq concurrent="1" nextAc="seek">
               <p:cTn id="2" dur="indefinite" nodeType="mainSeq">
@@ -21449,7 +21433,7 @@
   <p:timing>
     <p:tnLst>
       <p:par>
-        <p:cTn id="1" dur="indefinite" restart="never" nodeType="tmRoot">
+        <p:cTn xmlns:p14="http://schemas.microsoft.com/office/powerpoint/2010/main" id="1" dur="indefinite" restart="never" nodeType="tmRoot">
           <p:childTnLst>
             <p:seq concurrent="1" nextAc="seek">
               <p:cTn id="2" dur="indefinite" nodeType="mainSeq">
@@ -21954,7 +21938,7 @@
   <p:timing>
     <p:tnLst>
       <p:par>
-        <p:cTn id="1" dur="indefinite" restart="never" nodeType="tmRoot"/>
+        <p:cTn xmlns:p14="http://schemas.microsoft.com/office/powerpoint/2010/main" id="1" dur="indefinite" restart="never" nodeType="tmRoot"/>
       </p:par>
     </p:tnLst>
   </p:timing>
@@ -22175,7 +22159,7 @@
   <p:timing>
     <p:tnLst>
       <p:par>
-        <p:cTn id="1" dur="indefinite" restart="never" nodeType="tmRoot">
+        <p:cTn xmlns:p14="http://schemas.microsoft.com/office/powerpoint/2010/main" id="1" dur="indefinite" restart="never" nodeType="tmRoot">
           <p:childTnLst>
             <p:seq concurrent="1" nextAc="seek">
               <p:cTn id="2" dur="indefinite" nodeType="mainSeq">
@@ -22719,7 +22703,7 @@
   <p:timing>
     <p:tnLst>
       <p:par>
-        <p:cTn id="1" dur="indefinite" restart="never" nodeType="tmRoot">
+        <p:cTn xmlns:p14="http://schemas.microsoft.com/office/powerpoint/2010/main" id="1" dur="indefinite" restart="never" nodeType="tmRoot">
           <p:childTnLst>
             <p:seq concurrent="1" nextAc="seek">
               <p:cTn id="2" dur="indefinite" nodeType="mainSeq">
@@ -23237,7 +23221,7 @@
   <p:timing>
     <p:tnLst>
       <p:par>
-        <p:cTn id="1" dur="indefinite" restart="never" nodeType="tmRoot">
+        <p:cTn xmlns:p14="http://schemas.microsoft.com/office/powerpoint/2010/main" id="1" dur="indefinite" restart="never" nodeType="tmRoot">
           <p:childTnLst>
             <p:seq concurrent="1" nextAc="seek">
               <p:cTn id="2" dur="indefinite" nodeType="mainSeq">
@@ -23629,7 +23613,7 @@
   <p:timing>
     <p:tnLst>
       <p:par>
-        <p:cTn id="1" dur="indefinite" restart="never" nodeType="tmRoot">
+        <p:cTn xmlns:p14="http://schemas.microsoft.com/office/powerpoint/2010/main" id="1" dur="indefinite" restart="never" nodeType="tmRoot">
           <p:childTnLst>
             <p:seq concurrent="1" nextAc="seek">
               <p:cTn id="2" dur="indefinite" nodeType="mainSeq">
@@ -23949,7 +23933,7 @@
   <p:timing>
     <p:tnLst>
       <p:par>
-        <p:cTn id="1" dur="indefinite" restart="never" nodeType="tmRoot"/>
+        <p:cTn xmlns:p14="http://schemas.microsoft.com/office/powerpoint/2010/main" id="1" dur="indefinite" restart="never" nodeType="tmRoot"/>
       </p:par>
     </p:tnLst>
   </p:timing>
@@ -24126,7 +24110,7 @@
   <p:timing>
     <p:tnLst>
       <p:par>
-        <p:cTn id="1" dur="indefinite" restart="never" nodeType="tmRoot"/>
+        <p:cTn xmlns:p14="http://schemas.microsoft.com/office/powerpoint/2010/main" id="1" dur="indefinite" restart="never" nodeType="tmRoot"/>
       </p:par>
     </p:tnLst>
   </p:timing>
@@ -24356,14 +24340,14 @@
             <a:noFill/>
           </a:ln>
           <a:extLst>
-            <a:ext uri="{909E8E84-426E-40DD-AFC4-6F175D3DCCD1}">
+            <a:ext uri="{909E8E84-426E-40dd-AFC4-6F175D3DCCD1}">
               <a14:hiddenFill xmlns:a14="http://schemas.microsoft.com/office/drawing/2010/main">
                 <a:solidFill>
                   <a:srgbClr val="FFFFFF"/>
                 </a:solidFill>
               </a14:hiddenFill>
             </a:ext>
-            <a:ext uri="{91240B29-F687-4F45-9708-019B960494DF}">
+            <a:ext uri="{91240B29-F687-4f45-9708-019B960494DF}">
               <a14:hiddenLine xmlns:a14="http://schemas.microsoft.com/office/drawing/2010/main" w="9525">
                 <a:solidFill>
                   <a:srgbClr val="000000"/>
@@ -24405,7 +24389,7 @@
   <p:timing>
     <p:tnLst>
       <p:par>
-        <p:cTn id="1" dur="indefinite" restart="never" nodeType="tmRoot"/>
+        <p:cTn xmlns:p14="http://schemas.microsoft.com/office/powerpoint/2010/main" id="1" dur="indefinite" restart="never" nodeType="tmRoot"/>
       </p:par>
     </p:tnLst>
   </p:timing>
@@ -24683,7 +24667,7 @@
   <p:timing>
     <p:tnLst>
       <p:par>
-        <p:cTn id="1" dur="indefinite" restart="never" nodeType="tmRoot"/>
+        <p:cTn xmlns:p14="http://schemas.microsoft.com/office/powerpoint/2010/main" id="1" dur="indefinite" restart="never" nodeType="tmRoot"/>
       </p:par>
     </p:tnLst>
   </p:timing>
@@ -24758,14 +24742,14 @@
             <a:noFill/>
           </a:ln>
           <a:extLst>
-            <a:ext uri="{909E8E84-426E-40DD-AFC4-6F175D3DCCD1}">
+            <a:ext uri="{909E8E84-426E-40dd-AFC4-6F175D3DCCD1}">
               <a14:hiddenFill xmlns:a14="http://schemas.microsoft.com/office/drawing/2010/main">
                 <a:solidFill>
                   <a:srgbClr val="FFFFFF"/>
                 </a:solidFill>
               </a14:hiddenFill>
             </a:ext>
-            <a:ext uri="{91240B29-F687-4F45-9708-019B960494DF}">
+            <a:ext uri="{91240B29-F687-4f45-9708-019B960494DF}">
               <a14:hiddenLine xmlns:a14="http://schemas.microsoft.com/office/drawing/2010/main" w="9525">
                 <a:solidFill>
                   <a:srgbClr val="000000"/>
@@ -24835,14 +24819,14 @@
             <a:noFill/>
           </a:ln>
           <a:extLst>
-            <a:ext uri="{909E8E84-426E-40DD-AFC4-6F175D3DCCD1}">
+            <a:ext uri="{909E8E84-426E-40dd-AFC4-6F175D3DCCD1}">
               <a14:hiddenFill xmlns:a14="http://schemas.microsoft.com/office/drawing/2010/main">
                 <a:solidFill>
                   <a:srgbClr val="FFFFFF"/>
                 </a:solidFill>
               </a14:hiddenFill>
             </a:ext>
-            <a:ext uri="{91240B29-F687-4F45-9708-019B960494DF}">
+            <a:ext uri="{91240B29-F687-4f45-9708-019B960494DF}">
               <a14:hiddenLine xmlns:a14="http://schemas.microsoft.com/office/drawing/2010/main" w="9525">
                 <a:solidFill>
                   <a:srgbClr val="000000"/>
@@ -24899,7 +24883,7 @@
           </a:ln>
           <a:effectLst/>
           <a:extLst>
-            <a:ext uri="{AF507438-7753-43E0-B8FC-AC1667EBCBE1}">
+            <a:ext uri="{AF507438-7753-43e0-B8FC-AC1667EBCBE1}">
               <a14:hiddenEffects xmlns:a14="http://schemas.microsoft.com/office/drawing/2010/main">
                 <a:effectLst>
                   <a:outerShdw blurRad="63500" dist="38099" dir="2700000" algn="ctr" rotWithShape="0">
@@ -24982,7 +24966,7 @@
   <p:timing>
     <p:tnLst>
       <p:par>
-        <p:cTn id="1" dur="indefinite" restart="never" nodeType="tmRoot">
+        <p:cTn xmlns:p14="http://schemas.microsoft.com/office/powerpoint/2010/main" id="1" dur="indefinite" restart="never" nodeType="tmRoot">
           <p:childTnLst>
             <p:seq concurrent="1" nextAc="seek">
               <p:cTn id="2" dur="indefinite" nodeType="mainSeq">
@@ -25152,14 +25136,14 @@
             <a:noFill/>
           </a:ln>
           <a:extLst>
-            <a:ext uri="{909E8E84-426E-40DD-AFC4-6F175D3DCCD1}">
+            <a:ext uri="{909E8E84-426E-40dd-AFC4-6F175D3DCCD1}">
               <a14:hiddenFill xmlns:a14="http://schemas.microsoft.com/office/drawing/2010/main">
                 <a:solidFill>
                   <a:srgbClr val="FFFFFF"/>
                 </a:solidFill>
               </a14:hiddenFill>
             </a:ext>
-            <a:ext uri="{91240B29-F687-4F45-9708-019B960494DF}">
+            <a:ext uri="{91240B29-F687-4f45-9708-019B960494DF}">
               <a14:hiddenLine xmlns:a14="http://schemas.microsoft.com/office/drawing/2010/main" w="9525">
                 <a:solidFill>
                   <a:srgbClr val="000000"/>
@@ -25229,14 +25213,14 @@
             <a:noFill/>
           </a:ln>
           <a:extLst>
-            <a:ext uri="{909E8E84-426E-40DD-AFC4-6F175D3DCCD1}">
+            <a:ext uri="{909E8E84-426E-40dd-AFC4-6F175D3DCCD1}">
               <a14:hiddenFill xmlns:a14="http://schemas.microsoft.com/office/drawing/2010/main">
                 <a:solidFill>
                   <a:srgbClr val="FFFFFF"/>
                 </a:solidFill>
               </a14:hiddenFill>
             </a:ext>
-            <a:ext uri="{91240B29-F687-4F45-9708-019B960494DF}">
+            <a:ext uri="{91240B29-F687-4f45-9708-019B960494DF}">
               <a14:hiddenLine xmlns:a14="http://schemas.microsoft.com/office/drawing/2010/main" w="9525">
                 <a:solidFill>
                   <a:srgbClr val="000000"/>
@@ -25308,7 +25292,7 @@
           </a:ln>
           <a:effectLst/>
           <a:extLst>
-            <a:ext uri="{AF507438-7753-43E0-B8FC-AC1667EBCBE1}">
+            <a:ext uri="{AF507438-7753-43e0-B8FC-AC1667EBCBE1}">
               <a14:hiddenEffects xmlns:a14="http://schemas.microsoft.com/office/drawing/2010/main">
                 <a:effectLst>
                   <a:outerShdw blurRad="63500" dist="38099" dir="2700000" algn="ctr" rotWithShape="0">
@@ -25421,7 +25405,7 @@
   <p:timing>
     <p:tnLst>
       <p:par>
-        <p:cTn id="1" dur="indefinite" restart="never" nodeType="tmRoot">
+        <p:cTn xmlns:p14="http://schemas.microsoft.com/office/powerpoint/2010/main" id="1" dur="indefinite" restart="never" nodeType="tmRoot">
           <p:childTnLst>
             <p:seq concurrent="1" nextAc="seek">
               <p:cTn id="2" dur="indefinite" nodeType="mainSeq">
@@ -25628,7 +25612,7 @@
             <a:tailEnd/>
           </a:ln>
           <a:extLst>
-            <a:ext uri="{909E8E84-426E-40DD-AFC4-6F175D3DCCD1}">
+            <a:ext uri="{909E8E84-426E-40dd-AFC4-6F175D3DCCD1}">
               <a14:hiddenFill xmlns:a14="http://schemas.microsoft.com/office/drawing/2010/main">
                 <a:solidFill>
                   <a:srgbClr val="FFFFFF"/>
@@ -25863,14 +25847,14 @@
             <a:noFill/>
           </a:ln>
           <a:extLst>
-            <a:ext uri="{909E8E84-426E-40DD-AFC4-6F175D3DCCD1}">
+            <a:ext uri="{909E8E84-426E-40dd-AFC4-6F175D3DCCD1}">
               <a14:hiddenFill xmlns:a14="http://schemas.microsoft.com/office/drawing/2010/main">
                 <a:solidFill>
                   <a:srgbClr val="FFFFFF"/>
                 </a:solidFill>
               </a14:hiddenFill>
             </a:ext>
-            <a:ext uri="{91240B29-F687-4F45-9708-019B960494DF}">
+            <a:ext uri="{91240B29-F687-4f45-9708-019B960494DF}">
               <a14:hiddenLine xmlns:a14="http://schemas.microsoft.com/office/drawing/2010/main" w="9525">
                 <a:solidFill>
                   <a:srgbClr val="000000"/>
@@ -25933,7 +25917,7 @@
   <p:timing>
     <p:tnLst>
       <p:par>
-        <p:cTn id="1" dur="indefinite" restart="never" nodeType="tmRoot">
+        <p:cTn xmlns:p14="http://schemas.microsoft.com/office/powerpoint/2010/main" id="1" dur="indefinite" restart="never" nodeType="tmRoot">
           <p:childTnLst>
             <p:seq concurrent="1" nextAc="seek">
               <p:cTn id="2" dur="indefinite" nodeType="mainSeq">
@@ -26130,7 +26114,7 @@
             <a:tailEnd/>
           </a:ln>
           <a:extLst>
-            <a:ext uri="{909E8E84-426E-40DD-AFC4-6F175D3DCCD1}">
+            <a:ext uri="{909E8E84-426E-40dd-AFC4-6F175D3DCCD1}">
               <a14:hiddenFill xmlns:a14="http://schemas.microsoft.com/office/drawing/2010/main">
                 <a:solidFill>
                   <a:srgbClr val="FFFFFF"/>
@@ -26365,14 +26349,14 @@
             <a:noFill/>
           </a:ln>
           <a:extLst>
-            <a:ext uri="{909E8E84-426E-40DD-AFC4-6F175D3DCCD1}">
+            <a:ext uri="{909E8E84-426E-40dd-AFC4-6F175D3DCCD1}">
               <a14:hiddenFill xmlns:a14="http://schemas.microsoft.com/office/drawing/2010/main">
                 <a:solidFill>
                   <a:srgbClr val="FFFFFF"/>
                 </a:solidFill>
               </a14:hiddenFill>
             </a:ext>
-            <a:ext uri="{91240B29-F687-4F45-9708-019B960494DF}">
+            <a:ext uri="{91240B29-F687-4f45-9708-019B960494DF}">
               <a14:hiddenLine xmlns:a14="http://schemas.microsoft.com/office/drawing/2010/main" w="9525">
                 <a:solidFill>
                   <a:srgbClr val="000000"/>
@@ -26430,7 +26414,7 @@
   <p:timing>
     <p:tnLst>
       <p:par>
-        <p:cTn id="1" dur="indefinite" restart="never" nodeType="tmRoot">
+        <p:cTn xmlns:p14="http://schemas.microsoft.com/office/powerpoint/2010/main" id="1" dur="indefinite" restart="never" nodeType="tmRoot">
           <p:childTnLst>
             <p:seq concurrent="1" nextAc="seek">
               <p:cTn id="2" dur="indefinite" nodeType="mainSeq">
@@ -26581,7 +26565,7 @@
             <a:tailEnd/>
           </a:ln>
           <a:extLst>
-            <a:ext uri="{909E8E84-426E-40DD-AFC4-6F175D3DCCD1}">
+            <a:ext uri="{909E8E84-426E-40dd-AFC4-6F175D3DCCD1}">
               <a14:hiddenFill xmlns:a14="http://schemas.microsoft.com/office/drawing/2010/main">
                 <a:solidFill>
                   <a:srgbClr val="FFFFFF"/>
@@ -26816,14 +26800,14 @@
             <a:noFill/>
           </a:ln>
           <a:extLst>
-            <a:ext uri="{909E8E84-426E-40DD-AFC4-6F175D3DCCD1}">
+            <a:ext uri="{909E8E84-426E-40dd-AFC4-6F175D3DCCD1}">
               <a14:hiddenFill xmlns:a14="http://schemas.microsoft.com/office/drawing/2010/main">
                 <a:solidFill>
                   <a:srgbClr val="FFFFFF"/>
                 </a:solidFill>
               </a14:hiddenFill>
             </a:ext>
-            <a:ext uri="{91240B29-F687-4F45-9708-019B960494DF}">
+            <a:ext uri="{91240B29-F687-4f45-9708-019B960494DF}">
               <a14:hiddenLine xmlns:a14="http://schemas.microsoft.com/office/drawing/2010/main" w="9525">
                 <a:solidFill>
                   <a:srgbClr val="000000"/>
@@ -26886,7 +26870,7 @@
   <p:timing>
     <p:tnLst>
       <p:par>
-        <p:cTn id="1" dur="indefinite" restart="never" nodeType="tmRoot">
+        <p:cTn xmlns:p14="http://schemas.microsoft.com/office/powerpoint/2010/main" id="1" dur="indefinite" restart="never" nodeType="tmRoot">
           <p:childTnLst>
             <p:seq concurrent="1" nextAc="seek">
               <p:cTn id="2" dur="indefinite" nodeType="mainSeq">
@@ -27083,7 +27067,7 @@
             <a:tailEnd/>
           </a:ln>
           <a:extLst>
-            <a:ext uri="{909E8E84-426E-40DD-AFC4-6F175D3DCCD1}">
+            <a:ext uri="{909E8E84-426E-40dd-AFC4-6F175D3DCCD1}">
               <a14:hiddenFill xmlns:a14="http://schemas.microsoft.com/office/drawing/2010/main">
                 <a:solidFill>
                   <a:srgbClr val="FFFFFF"/>
@@ -27300,14 +27284,14 @@
             <a:noFill/>
           </a:ln>
           <a:extLst>
-            <a:ext uri="{909E8E84-426E-40DD-AFC4-6F175D3DCCD1}">
+            <a:ext uri="{909E8E84-426E-40dd-AFC4-6F175D3DCCD1}">
               <a14:hiddenFill xmlns:a14="http://schemas.microsoft.com/office/drawing/2010/main">
                 <a:solidFill>
                   <a:srgbClr val="FFFFFF"/>
                 </a:solidFill>
               </a14:hiddenFill>
             </a:ext>
-            <a:ext uri="{91240B29-F687-4F45-9708-019B960494DF}">
+            <a:ext uri="{91240B29-F687-4f45-9708-019B960494DF}">
               <a14:hiddenLine xmlns:a14="http://schemas.microsoft.com/office/drawing/2010/main" w="9525">
                 <a:solidFill>
                   <a:srgbClr val="000000"/>
@@ -27381,7 +27365,7 @@
   <p:timing>
     <p:tnLst>
       <p:par>
-        <p:cTn id="1" dur="indefinite" restart="never" nodeType="tmRoot">
+        <p:cTn xmlns:p14="http://schemas.microsoft.com/office/powerpoint/2010/main" id="1" dur="indefinite" restart="never" nodeType="tmRoot">
           <p:childTnLst>
             <p:seq concurrent="1" nextAc="seek">
               <p:cTn id="2" dur="indefinite" nodeType="mainSeq">
@@ -27728,14 +27712,14 @@
           </a:ln>
           <a:effectLst/>
           <a:extLst>
-            <a:ext uri="{909E8E84-426E-40DD-AFC4-6F175D3DCCD1}">
+            <a:ext uri="{909E8E84-426E-40dd-AFC4-6F175D3DCCD1}">
               <a14:hiddenFill xmlns:a14="http://schemas.microsoft.com/office/drawing/2010/main">
                 <a:solidFill>
                   <a:srgbClr val="FFFFFF"/>
                 </a:solidFill>
               </a14:hiddenFill>
             </a:ext>
-            <a:ext uri="{91240B29-F687-4F45-9708-019B960494DF}">
+            <a:ext uri="{91240B29-F687-4f45-9708-019B960494DF}">
               <a14:hiddenLine xmlns:a14="http://schemas.microsoft.com/office/drawing/2010/main" w="9525" cap="flat">
                 <a:solidFill>
                   <a:srgbClr val="808080"/>
@@ -27745,7 +27729,7 @@
                 <a:tailEnd/>
               </a14:hiddenLine>
             </a:ext>
-            <a:ext uri="{AF507438-7753-43E0-B8FC-AC1667EBCBE1}">
+            <a:ext uri="{AF507438-7753-43e0-B8FC-AC1667EBCBE1}">
               <a14:hiddenEffects xmlns:a14="http://schemas.microsoft.com/office/drawing/2010/main">
                 <a:effectLst>
                   <a:outerShdw blurRad="63500" dist="38099" dir="2700000" algn="ctr" rotWithShape="0">
@@ -27757,7 +27741,7 @@
               </a14:hiddenEffects>
             </a:ext>
             <a:ext uri="{FAA26D3D-D897-4be2-8F04-BA451C77F1D7}">
-              <ma14:placeholderFlag xmlns:ma14="http://schemas.microsoft.com/office/mac/drawingml/2011/main" xmlns="" val="1"/>
+              <ma14:placeholderFlag xmlns:ma14="http://schemas.microsoft.com/office/mac/drawingml/2011/main" val="1"/>
             </a:ext>
           </a:extLst>
         </p:spPr>
@@ -28024,7 +28008,7 @@
   <p:timing>
     <p:tnLst>
       <p:par>
-        <p:cTn id="1" dur="indefinite" restart="never" nodeType="tmRoot"/>
+        <p:cTn xmlns:p14="http://schemas.microsoft.com/office/powerpoint/2010/main" id="1" dur="indefinite" restart="never" nodeType="tmRoot"/>
       </p:par>
     </p:tnLst>
   </p:timing>
@@ -28261,14 +28245,14 @@
           </a:ln>
           <a:effectLst/>
           <a:extLst>
-            <a:ext uri="{909E8E84-426E-40DD-AFC4-6F175D3DCCD1}">
+            <a:ext uri="{909E8E84-426E-40dd-AFC4-6F175D3DCCD1}">
               <a14:hiddenFill xmlns:a14="http://schemas.microsoft.com/office/drawing/2010/main">
                 <a:solidFill>
                   <a:srgbClr val="FFFFFF"/>
                 </a:solidFill>
               </a14:hiddenFill>
             </a:ext>
-            <a:ext uri="{91240B29-F687-4F45-9708-019B960494DF}">
+            <a:ext uri="{91240B29-F687-4f45-9708-019B960494DF}">
               <a14:hiddenLine xmlns:a14="http://schemas.microsoft.com/office/drawing/2010/main" w="9525" cap="flat">
                 <a:solidFill>
                   <a:srgbClr val="808080"/>
@@ -28278,7 +28262,7 @@
                 <a:tailEnd/>
               </a14:hiddenLine>
             </a:ext>
-            <a:ext uri="{AF507438-7753-43E0-B8FC-AC1667EBCBE1}">
+            <a:ext uri="{AF507438-7753-43e0-B8FC-AC1667EBCBE1}">
               <a14:hiddenEffects xmlns:a14="http://schemas.microsoft.com/office/drawing/2010/main">
                 <a:effectLst>
                   <a:outerShdw blurRad="63500" dist="38099" dir="2700000" algn="ctr" rotWithShape="0">
@@ -28290,7 +28274,7 @@
               </a14:hiddenEffects>
             </a:ext>
             <a:ext uri="{FAA26D3D-D897-4be2-8F04-BA451C77F1D7}">
-              <ma14:placeholderFlag xmlns:ma14="http://schemas.microsoft.com/office/mac/drawingml/2011/main" xmlns="" val="1"/>
+              <ma14:placeholderFlag xmlns:ma14="http://schemas.microsoft.com/office/mac/drawingml/2011/main" val="1"/>
             </a:ext>
           </a:extLst>
         </p:spPr>
@@ -28557,7 +28541,7 @@
   <p:timing>
     <p:tnLst>
       <p:par>
-        <p:cTn id="1" dur="indefinite" restart="never" nodeType="tmRoot"/>
+        <p:cTn xmlns:p14="http://schemas.microsoft.com/office/powerpoint/2010/main" id="1" dur="indefinite" restart="never" nodeType="tmRoot"/>
       </p:par>
     </p:tnLst>
   </p:timing>
@@ -28682,7 +28666,7 @@
   <p:timing>
     <p:tnLst>
       <p:par>
-        <p:cTn id="1" dur="indefinite" restart="never" nodeType="tmRoot"/>
+        <p:cTn xmlns:p14="http://schemas.microsoft.com/office/powerpoint/2010/main" id="1" dur="indefinite" restart="never" nodeType="tmRoot"/>
       </p:par>
     </p:tnLst>
   </p:timing>
@@ -28916,14 +28900,14 @@
           </a:ln>
           <a:effectLst/>
           <a:extLst>
-            <a:ext uri="{909E8E84-426E-40DD-AFC4-6F175D3DCCD1}">
+            <a:ext uri="{909E8E84-426E-40dd-AFC4-6F175D3DCCD1}">
               <a14:hiddenFill xmlns:a14="http://schemas.microsoft.com/office/drawing/2010/main">
                 <a:solidFill>
                   <a:srgbClr val="FFFFFF"/>
                 </a:solidFill>
               </a14:hiddenFill>
             </a:ext>
-            <a:ext uri="{91240B29-F687-4F45-9708-019B960494DF}">
+            <a:ext uri="{91240B29-F687-4f45-9708-019B960494DF}">
               <a14:hiddenLine xmlns:a14="http://schemas.microsoft.com/office/drawing/2010/main" w="9525" cap="flat">
                 <a:solidFill>
                   <a:srgbClr val="808080"/>
@@ -28933,7 +28917,7 @@
                 <a:tailEnd/>
               </a14:hiddenLine>
             </a:ext>
-            <a:ext uri="{AF507438-7753-43E0-B8FC-AC1667EBCBE1}">
+            <a:ext uri="{AF507438-7753-43e0-B8FC-AC1667EBCBE1}">
               <a14:hiddenEffects xmlns:a14="http://schemas.microsoft.com/office/drawing/2010/main">
                 <a:effectLst>
                   <a:outerShdw blurRad="63500" dist="38099" dir="2700000" algn="ctr" rotWithShape="0">
@@ -28945,7 +28929,7 @@
               </a14:hiddenEffects>
             </a:ext>
             <a:ext uri="{FAA26D3D-D897-4be2-8F04-BA451C77F1D7}">
-              <ma14:placeholderFlag xmlns:ma14="http://schemas.microsoft.com/office/mac/drawingml/2011/main" xmlns="" val="1"/>
+              <ma14:placeholderFlag xmlns:ma14="http://schemas.microsoft.com/office/mac/drawingml/2011/main" val="1"/>
             </a:ext>
           </a:extLst>
         </p:spPr>
@@ -29225,7 +29209,7 @@
   <p:timing>
     <p:tnLst>
       <p:par>
-        <p:cTn id="1" dur="indefinite" restart="never" nodeType="tmRoot"/>
+        <p:cTn xmlns:p14="http://schemas.microsoft.com/office/powerpoint/2010/main" id="1" dur="indefinite" restart="never" nodeType="tmRoot"/>
       </p:par>
     </p:tnLst>
   </p:timing>
@@ -29411,7 +29395,7 @@
   <p:timing>
     <p:tnLst>
       <p:par>
-        <p:cTn id="1" dur="indefinite" restart="never" nodeType="tmRoot"/>
+        <p:cTn xmlns:p14="http://schemas.microsoft.com/office/powerpoint/2010/main" id="1" dur="indefinite" restart="never" nodeType="tmRoot"/>
       </p:par>
     </p:tnLst>
   </p:timing>
@@ -29661,14 +29645,14 @@
           </a:ln>
           <a:effectLst/>
           <a:extLst>
-            <a:ext uri="{909E8E84-426E-40DD-AFC4-6F175D3DCCD1}">
+            <a:ext uri="{909E8E84-426E-40dd-AFC4-6F175D3DCCD1}">
               <a14:hiddenFill xmlns:a14="http://schemas.microsoft.com/office/drawing/2010/main">
                 <a:solidFill>
                   <a:srgbClr val="FFFFFF"/>
                 </a:solidFill>
               </a14:hiddenFill>
             </a:ext>
-            <a:ext uri="{91240B29-F687-4F45-9708-019B960494DF}">
+            <a:ext uri="{91240B29-F687-4f45-9708-019B960494DF}">
               <a14:hiddenLine xmlns:a14="http://schemas.microsoft.com/office/drawing/2010/main" w="9525" cap="flat">
                 <a:solidFill>
                   <a:srgbClr val="808080"/>
@@ -29678,7 +29662,7 @@
                 <a:tailEnd/>
               </a14:hiddenLine>
             </a:ext>
-            <a:ext uri="{AF507438-7753-43E0-B8FC-AC1667EBCBE1}">
+            <a:ext uri="{AF507438-7753-43e0-B8FC-AC1667EBCBE1}">
               <a14:hiddenEffects xmlns:a14="http://schemas.microsoft.com/office/drawing/2010/main">
                 <a:effectLst>
                   <a:outerShdw blurRad="63500" dist="38099" dir="2700000" algn="ctr" rotWithShape="0">
@@ -29690,7 +29674,7 @@
               </a14:hiddenEffects>
             </a:ext>
             <a:ext uri="{FAA26D3D-D897-4be2-8F04-BA451C77F1D7}">
-              <ma14:placeholderFlag xmlns:ma14="http://schemas.microsoft.com/office/mac/drawingml/2011/main" xmlns="" val="1"/>
+              <ma14:placeholderFlag xmlns:ma14="http://schemas.microsoft.com/office/mac/drawingml/2011/main" val="1"/>
             </a:ext>
           </a:extLst>
         </p:spPr>
@@ -29953,7 +29937,7 @@
   <p:timing>
     <p:tnLst>
       <p:par>
-        <p:cTn id="1" dur="indefinite" restart="never" nodeType="tmRoot"/>
+        <p:cTn xmlns:p14="http://schemas.microsoft.com/office/powerpoint/2010/main" id="1" dur="indefinite" restart="never" nodeType="tmRoot"/>
       </p:par>
     </p:tnLst>
   </p:timing>
@@ -30301,14 +30285,14 @@
           </a:ln>
           <a:effectLst/>
           <a:extLst>
-            <a:ext uri="{909E8E84-426E-40DD-AFC4-6F175D3DCCD1}">
+            <a:ext uri="{909E8E84-426E-40dd-AFC4-6F175D3DCCD1}">
               <a14:hiddenFill xmlns:a14="http://schemas.microsoft.com/office/drawing/2010/main">
                 <a:solidFill>
                   <a:srgbClr val="FFFFFF"/>
                 </a:solidFill>
               </a14:hiddenFill>
             </a:ext>
-            <a:ext uri="{91240B29-F687-4F45-9708-019B960494DF}">
+            <a:ext uri="{91240B29-F687-4f45-9708-019B960494DF}">
               <a14:hiddenLine xmlns:a14="http://schemas.microsoft.com/office/drawing/2010/main" w="9525" cap="flat">
                 <a:solidFill>
                   <a:srgbClr val="808080"/>
@@ -30318,7 +30302,7 @@
                 <a:tailEnd/>
               </a14:hiddenLine>
             </a:ext>
-            <a:ext uri="{AF507438-7753-43E0-B8FC-AC1667EBCBE1}">
+            <a:ext uri="{AF507438-7753-43e0-B8FC-AC1667EBCBE1}">
               <a14:hiddenEffects xmlns:a14="http://schemas.microsoft.com/office/drawing/2010/main">
                 <a:effectLst>
                   <a:outerShdw blurRad="63500" dist="38099" dir="2700000" algn="ctr" rotWithShape="0">
@@ -30330,7 +30314,7 @@
               </a14:hiddenEffects>
             </a:ext>
             <a:ext uri="{FAA26D3D-D897-4be2-8F04-BA451C77F1D7}">
-              <ma14:placeholderFlag xmlns:ma14="http://schemas.microsoft.com/office/mac/drawingml/2011/main" xmlns="" val="1"/>
+              <ma14:placeholderFlag xmlns:ma14="http://schemas.microsoft.com/office/mac/drawingml/2011/main" val="1"/>
             </a:ext>
           </a:extLst>
         </p:spPr>
@@ -30593,7 +30577,7 @@
   <p:timing>
     <p:tnLst>
       <p:par>
-        <p:cTn id="1" dur="indefinite" restart="never" nodeType="tmRoot"/>
+        <p:cTn xmlns:p14="http://schemas.microsoft.com/office/powerpoint/2010/main" id="1" dur="indefinite" restart="never" nodeType="tmRoot"/>
       </p:par>
     </p:tnLst>
   </p:timing>
@@ -30846,14 +30830,14 @@
           </a:ln>
           <a:effectLst/>
           <a:extLst>
-            <a:ext uri="{909E8E84-426E-40DD-AFC4-6F175D3DCCD1}">
+            <a:ext uri="{909E8E84-426E-40dd-AFC4-6F175D3DCCD1}">
               <a14:hiddenFill xmlns:a14="http://schemas.microsoft.com/office/drawing/2010/main">
                 <a:solidFill>
                   <a:srgbClr val="FFFFFF"/>
                 </a:solidFill>
               </a14:hiddenFill>
             </a:ext>
-            <a:ext uri="{91240B29-F687-4F45-9708-019B960494DF}">
+            <a:ext uri="{91240B29-F687-4f45-9708-019B960494DF}">
               <a14:hiddenLine xmlns:a14="http://schemas.microsoft.com/office/drawing/2010/main" w="9525" cap="flat">
                 <a:solidFill>
                   <a:srgbClr val="808080"/>
@@ -30863,7 +30847,7 @@
                 <a:tailEnd/>
               </a14:hiddenLine>
             </a:ext>
-            <a:ext uri="{AF507438-7753-43E0-B8FC-AC1667EBCBE1}">
+            <a:ext uri="{AF507438-7753-43e0-B8FC-AC1667EBCBE1}">
               <a14:hiddenEffects xmlns:a14="http://schemas.microsoft.com/office/drawing/2010/main">
                 <a:effectLst>
                   <a:outerShdw blurRad="63500" dist="38099" dir="2700000" algn="ctr" rotWithShape="0">
@@ -30875,7 +30859,7 @@
               </a14:hiddenEffects>
             </a:ext>
             <a:ext uri="{FAA26D3D-D897-4be2-8F04-BA451C77F1D7}">
-              <ma14:placeholderFlag xmlns:ma14="http://schemas.microsoft.com/office/mac/drawingml/2011/main" xmlns="" val="1"/>
+              <ma14:placeholderFlag xmlns:ma14="http://schemas.microsoft.com/office/mac/drawingml/2011/main" val="1"/>
             </a:ext>
           </a:extLst>
         </p:spPr>
@@ -31138,7 +31122,7 @@
   <p:timing>
     <p:tnLst>
       <p:par>
-        <p:cTn id="1" dur="indefinite" restart="never" nodeType="tmRoot"/>
+        <p:cTn xmlns:p14="http://schemas.microsoft.com/office/powerpoint/2010/main" id="1" dur="indefinite" restart="never" nodeType="tmRoot"/>
       </p:par>
     </p:tnLst>
   </p:timing>
@@ -31483,14 +31467,14 @@
           </a:ln>
           <a:effectLst/>
           <a:extLst>
-            <a:ext uri="{909E8E84-426E-40DD-AFC4-6F175D3DCCD1}">
+            <a:ext uri="{909E8E84-426E-40dd-AFC4-6F175D3DCCD1}">
               <a14:hiddenFill xmlns:a14="http://schemas.microsoft.com/office/drawing/2010/main">
                 <a:solidFill>
                   <a:srgbClr val="FFFFFF"/>
                 </a:solidFill>
               </a14:hiddenFill>
             </a:ext>
-            <a:ext uri="{91240B29-F687-4F45-9708-019B960494DF}">
+            <a:ext uri="{91240B29-F687-4f45-9708-019B960494DF}">
               <a14:hiddenLine xmlns:a14="http://schemas.microsoft.com/office/drawing/2010/main" w="9525" cap="flat">
                 <a:solidFill>
                   <a:srgbClr val="808080"/>
@@ -31500,7 +31484,7 @@
                 <a:tailEnd/>
               </a14:hiddenLine>
             </a:ext>
-            <a:ext uri="{AF507438-7753-43E0-B8FC-AC1667EBCBE1}">
+            <a:ext uri="{AF507438-7753-43e0-B8FC-AC1667EBCBE1}">
               <a14:hiddenEffects xmlns:a14="http://schemas.microsoft.com/office/drawing/2010/main">
                 <a:effectLst>
                   <a:outerShdw blurRad="63500" dist="38099" dir="2700000" algn="ctr" rotWithShape="0">
@@ -31512,7 +31496,7 @@
               </a14:hiddenEffects>
             </a:ext>
             <a:ext uri="{FAA26D3D-D897-4be2-8F04-BA451C77F1D7}">
-              <ma14:placeholderFlag xmlns:ma14="http://schemas.microsoft.com/office/mac/drawingml/2011/main" xmlns="" val="1"/>
+              <ma14:placeholderFlag xmlns:ma14="http://schemas.microsoft.com/office/mac/drawingml/2011/main" val="1"/>
             </a:ext>
           </a:extLst>
         </p:spPr>
@@ -31775,7 +31759,7 @@
   <p:timing>
     <p:tnLst>
       <p:par>
-        <p:cTn id="1" dur="indefinite" restart="never" nodeType="tmRoot"/>
+        <p:cTn xmlns:p14="http://schemas.microsoft.com/office/powerpoint/2010/main" id="1" dur="indefinite" restart="never" nodeType="tmRoot"/>
       </p:par>
     </p:tnLst>
   </p:timing>
@@ -31820,12 +31804,12 @@
           <a:lstStyle/>
           <a:p>
             <a:r>
-              <a:rPr lang="en-US" dirty="0" smtClean="0"/>
+              <a:rPr lang="en-US" smtClean="0"/>
               <a:t>Question </a:t>
             </a:r>
             <a:r>
               <a:rPr lang="en-US" dirty="0"/>
-              <a:t>8</a:t>
+              <a:t>9</a:t>
             </a:r>
           </a:p>
         </p:txBody>
@@ -31987,14 +31971,14 @@
           </a:ln>
           <a:effectLst/>
           <a:extLst>
-            <a:ext uri="{909E8E84-426E-40DD-AFC4-6F175D3DCCD1}">
+            <a:ext uri="{909E8E84-426E-40dd-AFC4-6F175D3DCCD1}">
               <a14:hiddenFill xmlns:a14="http://schemas.microsoft.com/office/drawing/2010/main">
                 <a:solidFill>
                   <a:srgbClr val="FFFFFF"/>
                 </a:solidFill>
               </a14:hiddenFill>
             </a:ext>
-            <a:ext uri="{91240B29-F687-4F45-9708-019B960494DF}">
+            <a:ext uri="{91240B29-F687-4f45-9708-019B960494DF}">
               <a14:hiddenLine xmlns:a14="http://schemas.microsoft.com/office/drawing/2010/main" w="9525" cap="flat">
                 <a:solidFill>
                   <a:srgbClr val="808080"/>
@@ -32004,7 +31988,7 @@
                 <a:tailEnd/>
               </a14:hiddenLine>
             </a:ext>
-            <a:ext uri="{AF507438-7753-43E0-B8FC-AC1667EBCBE1}">
+            <a:ext uri="{AF507438-7753-43e0-B8FC-AC1667EBCBE1}">
               <a14:hiddenEffects xmlns:a14="http://schemas.microsoft.com/office/drawing/2010/main">
                 <a:effectLst>
                   <a:outerShdw blurRad="63500" dist="38099" dir="2700000" algn="ctr" rotWithShape="0">
@@ -32016,7 +32000,7 @@
               </a14:hiddenEffects>
             </a:ext>
             <a:ext uri="{FAA26D3D-D897-4be2-8F04-BA451C77F1D7}">
-              <ma14:placeholderFlag xmlns:ma14="http://schemas.microsoft.com/office/mac/drawingml/2011/main" xmlns="" val="1"/>
+              <ma14:placeholderFlag xmlns:ma14="http://schemas.microsoft.com/office/mac/drawingml/2011/main" val="1"/>
             </a:ext>
           </a:extLst>
         </p:spPr>
@@ -32279,7 +32263,7 @@
   <p:timing>
     <p:tnLst>
       <p:par>
-        <p:cTn id="1" dur="indefinite" restart="never" nodeType="tmRoot"/>
+        <p:cTn xmlns:p14="http://schemas.microsoft.com/office/powerpoint/2010/main" id="1" dur="indefinite" restart="never" nodeType="tmRoot"/>
       </p:par>
     </p:tnLst>
   </p:timing>
@@ -32458,7 +32442,7 @@
   <p:timing>
     <p:tnLst>
       <p:par>
-        <p:cTn id="1" dur="indefinite" restart="never" nodeType="tmRoot"/>
+        <p:cTn xmlns:p14="http://schemas.microsoft.com/office/powerpoint/2010/main" id="1" dur="indefinite" restart="never" nodeType="tmRoot"/>
       </p:par>
     </p:tnLst>
   </p:timing>
@@ -32782,7 +32766,7 @@
   <p:timing>
     <p:tnLst>
       <p:par>
-        <p:cTn id="1" dur="indefinite" restart="never" nodeType="tmRoot"/>
+        <p:cTn xmlns:p14="http://schemas.microsoft.com/office/powerpoint/2010/main" id="1" dur="indefinite" restart="never" nodeType="tmRoot"/>
       </p:par>
     </p:tnLst>
   </p:timing>
@@ -32923,7 +32907,7 @@
   <p:timing>
     <p:tnLst>
       <p:par>
-        <p:cTn id="1" dur="indefinite" restart="never" nodeType="tmRoot"/>
+        <p:cTn xmlns:p14="http://schemas.microsoft.com/office/powerpoint/2010/main" id="1" dur="indefinite" restart="never" nodeType="tmRoot"/>
       </p:par>
     </p:tnLst>
   </p:timing>
@@ -33080,7 +33064,7 @@
   <p:timing>
     <p:tnLst>
       <p:par>
-        <p:cTn id="1" dur="indefinite" restart="never" nodeType="tmRoot"/>
+        <p:cTn xmlns:p14="http://schemas.microsoft.com/office/powerpoint/2010/main" id="1" dur="indefinite" restart="never" nodeType="tmRoot"/>
       </p:par>
     </p:tnLst>
   </p:timing>
@@ -33332,7 +33316,7 @@
         </a:ln>
         <a:effectLst/>
         <a:extLst>
-          <a:ext uri="{AF507438-7753-43E0-B8FC-AC1667EBCBE1}">
+          <a:ext uri="{AF507438-7753-43e0-B8FC-AC1667EBCBE1}">
             <a14:hiddenEffects xmlns:a14="http://schemas.microsoft.com/office/drawing/2010/main">
               <a:effectLst>
                 <a:outerShdw blurRad="63500" dist="38099" dir="2700000" algn="ctr" rotWithShape="0">
@@ -33411,7 +33395,7 @@
         </a:ln>
         <a:effectLst/>
         <a:extLst>
-          <a:ext uri="{AF507438-7753-43E0-B8FC-AC1667EBCBE1}">
+          <a:ext uri="{AF507438-7753-43e0-B8FC-AC1667EBCBE1}">
             <a14:hiddenEffects xmlns:a14="http://schemas.microsoft.com/office/drawing/2010/main">
               <a:effectLst>
                 <a:outerShdw blurRad="63500" dist="38099" dir="2700000" algn="ctr" rotWithShape="0">

</xml_diff>

<commit_message>
remove option c since not accurate (module-info must be in module file)
</commit_message>
<xml_diff>
--- a/2019-OracleCodeOne-HOL.pptx
+++ b/2019-OracleCodeOne-HOL.pptx
@@ -433,7 +433,7 @@
               <a:pPr>
                 <a:defRPr/>
               </a:pPr>
-              <a:t>9/11/19</a:t>
+              <a:t>9/21/19</a:t>
             </a:fld>
             <a:endParaRPr lang="en-US"/>
           </a:p>
@@ -1704,9 +1704,14 @@
           <a:lstStyle/>
           <a:p>
             <a:r>
-              <a:rPr lang="en-US" dirty="0" smtClean="0"/>
-              <a:t>B,C,D</a:t>
-            </a:r>
+              <a:rPr lang="en-US" smtClean="0"/>
+              <a:t>B</a:t>
+            </a:r>
+            <a:r>
+              <a:rPr lang="en-US" smtClean="0"/>
+              <a:t>,C</a:t>
+            </a:r>
+            <a:endParaRPr lang="en-US" dirty="0" smtClean="0"/>
           </a:p>
         </p:txBody>
       </p:sp>
@@ -12122,7 +12127,6 @@
               <a:rPr lang="en-US" dirty="0" smtClean="0"/>
               <a:t> {</a:t>
             </a:r>
-            <a:endParaRPr lang="en-US" dirty="0" smtClean="0"/>
           </a:p>
           <a:p>
             <a:pPr marL="0" indent="0"/>
@@ -14381,42 +14385,38 @@
             </a:pPr>
             <a:r>
               <a:rPr lang="en-US" dirty="0" smtClean="0"/>
-              <a:t>It cannot have a public modifier</a:t>
-            </a:r>
-          </a:p>
-          <a:p>
-            <a:pPr marL="514100" indent="-514100">
-              <a:buFont typeface="+mj-lt"/>
-              <a:buAutoNum type="alphaUcPeriod"/>
-            </a:pPr>
+              <a:t>It cannot have a public </a:t>
+            </a:r>
             <a:r>
               <a:rPr lang="en-US" dirty="0" smtClean="0"/>
-              <a:t>It is required to be in a module</a:t>
-            </a:r>
-          </a:p>
-          <a:p>
-            <a:pPr marL="514100" indent="-514100">
-              <a:buFont typeface="+mj-lt"/>
-              <a:buAutoNum type="alphaUcPeriod"/>
-            </a:pPr>
+              <a:t>modifier</a:t>
+            </a:r>
+            <a:endParaRPr lang="en-US" dirty="0" smtClean="0"/>
+          </a:p>
+          <a:p>
+            <a:pPr marL="0" indent="0"/>
+            <a:r>
+              <a:rPr lang="en-US" smtClean="0"/>
+              <a:t>C.  It </a:t>
+            </a:r>
             <a:r>
               <a:rPr lang="en-US" dirty="0" smtClean="0"/>
-              <a:t>It appears at the root of the module</a:t>
+              <a:t>appears at the root of the module</a:t>
             </a:r>
           </a:p>
           <a:p>
             <a:pPr marL="0" indent="0"/>
             <a:r>
+              <a:rPr lang="en-US" dirty="0"/>
+              <a:t>D</a:t>
+            </a:r>
+            <a:r>
               <a:rPr lang="en-US" dirty="0" smtClean="0"/>
-              <a:t>E.	 </a:t>
+              <a:t>.</a:t>
             </a:r>
             <a:r>
               <a:rPr lang="en-US" dirty="0" smtClean="0"/>
-              <a:t>Its </a:t>
-            </a:r>
-            <a:r>
-              <a:rPr lang="en-US" dirty="0" smtClean="0"/>
-              <a:t>name is </a:t>
+              <a:t>	 Its name is </a:t>
             </a:r>
             <a:r>
               <a:rPr lang="en-US" dirty="0" err="1" smtClean="0"/>
@@ -15599,11 +15599,7 @@
             </a:pPr>
             <a:r>
               <a:rPr lang="en-US" dirty="0" smtClean="0"/>
-              <a:t>$, numbers, and </a:t>
-            </a:r>
-            <a:r>
-              <a:rPr lang="en-US" dirty="0" smtClean="0"/>
-              <a:t>letters valid</a:t>
+              <a:t>$, numbers, and letters valid</a:t>
             </a:r>
           </a:p>
           <a:p>
@@ -19630,7 +19626,6 @@
               <a:rPr lang="en-US" dirty="0" smtClean="0"/>
               <a:t>?</a:t>
             </a:r>
-            <a:endParaRPr lang="en-US" dirty="0" smtClean="0"/>
           </a:p>
           <a:p>
             <a:endParaRPr lang="en-US" sz="2400" dirty="0">

</xml_diff>